<commit_message>
Minor tweak to slides
</commit_message>
<xml_diff>
--- a/Prioli_Final_Proj.pptx
+++ b/Prioli_Final_Proj.pptx
@@ -5,7 +5,7 @@
     <p:sldMasterId id="2147483726" r:id="rId1"/>
   </p:sldMasterIdLst>
   <p:notesMasterIdLst>
-    <p:notesMasterId r:id="rId16"/>
+    <p:notesMasterId r:id="rId17"/>
   </p:notesMasterIdLst>
   <p:sldIdLst>
     <p:sldId id="256" r:id="rId2"/>
@@ -13,15 +13,16 @@
     <p:sldId id="258" r:id="rId4"/>
     <p:sldId id="259" r:id="rId5"/>
     <p:sldId id="260" r:id="rId6"/>
-    <p:sldId id="267" r:id="rId7"/>
-    <p:sldId id="268" r:id="rId8"/>
-    <p:sldId id="265" r:id="rId9"/>
-    <p:sldId id="269" r:id="rId10"/>
-    <p:sldId id="270" r:id="rId11"/>
-    <p:sldId id="271" r:id="rId12"/>
-    <p:sldId id="264" r:id="rId13"/>
-    <p:sldId id="261" r:id="rId14"/>
-    <p:sldId id="262" r:id="rId15"/>
+    <p:sldId id="272" r:id="rId7"/>
+    <p:sldId id="267" r:id="rId8"/>
+    <p:sldId id="268" r:id="rId9"/>
+    <p:sldId id="265" r:id="rId10"/>
+    <p:sldId id="269" r:id="rId11"/>
+    <p:sldId id="270" r:id="rId12"/>
+    <p:sldId id="271" r:id="rId13"/>
+    <p:sldId id="264" r:id="rId14"/>
+    <p:sldId id="261" r:id="rId15"/>
+    <p:sldId id="262" r:id="rId16"/>
   </p:sldIdLst>
   <p:sldSz cx="12192000" cy="6858000"/>
   <p:notesSz cx="6858000" cy="9144000"/>
@@ -210,7 +211,7 @@
           <a:p>
             <a:fld id="{4EE169DE-67F4-4753-9B1C-F1A309C78068}" type="datetimeFigureOut">
               <a:rPr lang="en-US" smtClean="0"/>
-              <a:t>12/10/2018</a:t>
+              <a:t>12/11/2018</a:t>
             </a:fld>
             <a:endParaRPr lang="en-US"/>
           </a:p>
@@ -677,7 +678,7 @@
           <a:p>
             <a:fld id="{CF647BC4-379F-449B-8ACB-1D0356C51E22}" type="datetimeFigureOut">
               <a:rPr lang="en-US" smtClean="0"/>
-              <a:t>12/10/2018</a:t>
+              <a:t>12/11/2018</a:t>
             </a:fld>
             <a:endParaRPr lang="en-US"/>
           </a:p>
@@ -867,7 +868,7 @@
           <a:p>
             <a:fld id="{CF647BC4-379F-449B-8ACB-1D0356C51E22}" type="datetimeFigureOut">
               <a:rPr lang="en-US" smtClean="0"/>
-              <a:t>12/10/2018</a:t>
+              <a:t>12/11/2018</a:t>
             </a:fld>
             <a:endParaRPr lang="en-US"/>
           </a:p>
@@ -1047,7 +1048,7 @@
           <a:p>
             <a:fld id="{CF647BC4-379F-449B-8ACB-1D0356C51E22}" type="datetimeFigureOut">
               <a:rPr lang="en-US" smtClean="0"/>
-              <a:t>12/10/2018</a:t>
+              <a:t>12/11/2018</a:t>
             </a:fld>
             <a:endParaRPr lang="en-US"/>
           </a:p>
@@ -1238,7 +1239,7 @@
           <a:p>
             <a:fld id="{CF647BC4-379F-449B-8ACB-1D0356C51E22}" type="datetimeFigureOut">
               <a:rPr lang="en-US" smtClean="0"/>
-              <a:t>12/10/2018</a:t>
+              <a:t>12/11/2018</a:t>
             </a:fld>
             <a:endParaRPr lang="en-US"/>
           </a:p>
@@ -1494,7 +1495,7 @@
           <a:p>
             <a:fld id="{CF647BC4-379F-449B-8ACB-1D0356C51E22}" type="datetimeFigureOut">
               <a:rPr lang="en-US" smtClean="0"/>
-              <a:t>12/10/2018</a:t>
+              <a:t>12/11/2018</a:t>
             </a:fld>
             <a:endParaRPr lang="en-US"/>
           </a:p>
@@ -1782,7 +1783,7 @@
           <a:p>
             <a:fld id="{CF647BC4-379F-449B-8ACB-1D0356C51E22}" type="datetimeFigureOut">
               <a:rPr lang="en-US" smtClean="0"/>
-              <a:t>12/10/2018</a:t>
+              <a:t>12/11/2018</a:t>
             </a:fld>
             <a:endParaRPr lang="en-US"/>
           </a:p>
@@ -2220,7 +2221,7 @@
           <a:p>
             <a:fld id="{CF647BC4-379F-449B-8ACB-1D0356C51E22}" type="datetimeFigureOut">
               <a:rPr lang="en-US" smtClean="0"/>
-              <a:t>12/10/2018</a:t>
+              <a:t>12/11/2018</a:t>
             </a:fld>
             <a:endParaRPr lang="en-US"/>
           </a:p>
@@ -2338,7 +2339,7 @@
           <a:p>
             <a:fld id="{CF647BC4-379F-449B-8ACB-1D0356C51E22}" type="datetimeFigureOut">
               <a:rPr lang="en-US" smtClean="0"/>
-              <a:t>12/10/2018</a:t>
+              <a:t>12/11/2018</a:t>
             </a:fld>
             <a:endParaRPr lang="en-US"/>
           </a:p>
@@ -2433,7 +2434,7 @@
           <a:p>
             <a:fld id="{CF647BC4-379F-449B-8ACB-1D0356C51E22}" type="datetimeFigureOut">
               <a:rPr lang="en-US" smtClean="0"/>
-              <a:t>12/10/2018</a:t>
+              <a:t>12/11/2018</a:t>
             </a:fld>
             <a:endParaRPr lang="en-US"/>
           </a:p>
@@ -2789,7 +2790,7 @@
           <a:p>
             <a:fld id="{CF647BC4-379F-449B-8ACB-1D0356C51E22}" type="datetimeFigureOut">
               <a:rPr lang="en-US" smtClean="0"/>
-              <a:t>12/10/2018</a:t>
+              <a:t>12/11/2018</a:t>
             </a:fld>
             <a:endParaRPr lang="en-US"/>
           </a:p>
@@ -3105,7 +3106,7 @@
           <a:p>
             <a:fld id="{CF647BC4-379F-449B-8ACB-1D0356C51E22}" type="datetimeFigureOut">
               <a:rPr lang="en-US" smtClean="0"/>
-              <a:t>12/10/2018</a:t>
+              <a:t>12/11/2018</a:t>
             </a:fld>
             <a:endParaRPr lang="en-US"/>
           </a:p>
@@ -3337,7 +3338,7 @@
             <a:fld id="{CF647BC4-379F-449B-8ACB-1D0356C51E22}" type="datetimeFigureOut">
               <a:rPr lang="en-US" smtClean="0"/>
               <a:pPr/>
-              <a:t>12/10/2018</a:t>
+              <a:t>12/11/2018</a:t>
             </a:fld>
             <a:endParaRPr lang="en-US"/>
           </a:p>
@@ -3932,6 +3933,186 @@
           <a:p>
             <a:r>
               <a:rPr lang="en-US" dirty="0"/>
+              <a:t>SELECTED RESULTS: ANALYSIS 4</a:t>
+            </a:r>
+          </a:p>
+        </p:txBody>
+      </p:sp>
+      <p:pic>
+        <p:nvPicPr>
+          <p:cNvPr id="4" name="Content Placeholder 3">
+            <a:extLst>
+              <a:ext uri="{FF2B5EF4-FFF2-40B4-BE49-F238E27FC236}">
+                <a16:creationId xmlns:a16="http://schemas.microsoft.com/office/drawing/2014/main" id="{E40EE026-C233-44BC-8BA6-0C4BE4CA0D12}"/>
+              </a:ext>
+            </a:extLst>
+          </p:cNvPr>
+          <p:cNvPicPr>
+            <a:picLocks noGrp="1" noChangeAspect="1"/>
+          </p:cNvPicPr>
+          <p:nvPr>
+            <p:ph idx="1"/>
+          </p:nvPr>
+        </p:nvPicPr>
+        <p:blipFill rotWithShape="1">
+          <a:blip r:embed="rId2"/>
+          <a:srcRect t="7610"/>
+          <a:stretch/>
+        </p:blipFill>
+        <p:spPr>
+          <a:xfrm>
+            <a:off x="590296" y="2387149"/>
+            <a:ext cx="10984936" cy="4059585"/>
+          </a:xfrm>
+          <a:prstGeom prst="rect">
+            <a:avLst/>
+          </a:prstGeom>
+        </p:spPr>
+      </p:pic>
+      <p:sp>
+        <p:nvSpPr>
+          <p:cNvPr id="5" name="TextBox 4">
+            <a:extLst>
+              <a:ext uri="{FF2B5EF4-FFF2-40B4-BE49-F238E27FC236}">
+                <a16:creationId xmlns:a16="http://schemas.microsoft.com/office/drawing/2014/main" id="{8E375F77-84DB-4FC0-99AB-ED4D29C50289}"/>
+              </a:ext>
+            </a:extLst>
+          </p:cNvPr>
+          <p:cNvSpPr txBox="1"/>
+          <p:nvPr/>
+        </p:nvSpPr>
+        <p:spPr>
+          <a:xfrm>
+            <a:off x="1143933" y="1653323"/>
+            <a:ext cx="4797908" cy="369332"/>
+          </a:xfrm>
+          <a:prstGeom prst="rect">
+            <a:avLst/>
+          </a:prstGeom>
+          <a:noFill/>
+        </p:spPr>
+        <p:txBody>
+          <a:bodyPr wrap="square" rtlCol="0">
+            <a:spAutoFit/>
+          </a:bodyPr>
+          <a:lstStyle/>
+          <a:p>
+            <a:r>
+              <a:rPr lang="en-US" b="1" dirty="0">
+                <a:solidFill>
+                  <a:srgbClr val="545454"/>
+                </a:solidFill>
+                <a:latin typeface="Calibri" panose="020F0502020204030204" pitchFamily="34" charset="0"/>
+                <a:cs typeface="Calibri" panose="020F0502020204030204" pitchFamily="34" charset="0"/>
+              </a:rPr>
+              <a:t>Happiness Score with N(</a:t>
+            </a:r>
+            <a:r>
+              <a:rPr lang="el-GR" b="1" i="1" dirty="0">
+                <a:solidFill>
+                  <a:srgbClr val="545454"/>
+                </a:solidFill>
+                <a:latin typeface="Calibri" panose="020F0502020204030204" pitchFamily="34" charset="0"/>
+                <a:cs typeface="Calibri" panose="020F0502020204030204" pitchFamily="34" charset="0"/>
+              </a:rPr>
+              <a:t>μ</a:t>
+            </a:r>
+            <a:r>
+              <a:rPr lang="en-US" b="1" dirty="0">
+                <a:solidFill>
+                  <a:srgbClr val="545454"/>
+                </a:solidFill>
+                <a:latin typeface="Calibri" panose="020F0502020204030204" pitchFamily="34" charset="0"/>
+                <a:cs typeface="Calibri" panose="020F0502020204030204" pitchFamily="34" charset="0"/>
+              </a:rPr>
+              <a:t> = 5.553, </a:t>
+            </a:r>
+            <a:r>
+              <a:rPr lang="el-GR" b="1" i="1" dirty="0">
+                <a:solidFill>
+                  <a:srgbClr val="545454"/>
+                </a:solidFill>
+                <a:latin typeface="Calibri" panose="020F0502020204030204" pitchFamily="34" charset="0"/>
+                <a:cs typeface="Calibri" panose="020F0502020204030204" pitchFamily="34" charset="0"/>
+              </a:rPr>
+              <a:t>σ</a:t>
+            </a:r>
+            <a:r>
+              <a:rPr lang="en-US" b="1" baseline="30000" dirty="0">
+                <a:solidFill>
+                  <a:srgbClr val="545454"/>
+                </a:solidFill>
+                <a:latin typeface="Calibri" panose="020F0502020204030204" pitchFamily="34" charset="0"/>
+                <a:cs typeface="Calibri" panose="020F0502020204030204" pitchFamily="34" charset="0"/>
+              </a:rPr>
+              <a:t>2</a:t>
+            </a:r>
+            <a:r>
+              <a:rPr lang="en-US" b="1" dirty="0">
+                <a:solidFill>
+                  <a:srgbClr val="545454"/>
+                </a:solidFill>
+                <a:latin typeface="Calibri" panose="020F0502020204030204" pitchFamily="34" charset="0"/>
+                <a:cs typeface="Calibri" panose="020F0502020204030204" pitchFamily="34" charset="0"/>
+              </a:rPr>
+              <a:t> = 1.139)</a:t>
+            </a:r>
+          </a:p>
+        </p:txBody>
+      </p:sp>
+    </p:spTree>
+    <p:extLst>
+      <p:ext uri="{BB962C8B-B14F-4D97-AF65-F5344CB8AC3E}">
+        <p14:creationId xmlns:p14="http://schemas.microsoft.com/office/powerpoint/2010/main" val="3956234319"/>
+      </p:ext>
+    </p:extLst>
+  </p:cSld>
+  <p:clrMapOvr>
+    <a:masterClrMapping/>
+  </p:clrMapOvr>
+</p:sld>
+</file>
+
+<file path=ppt/slides/slide11.xml><?xml version="1.0" encoding="utf-8"?>
+<p:sld xmlns:a="http://schemas.openxmlformats.org/drawingml/2006/main" xmlns:r="http://schemas.openxmlformats.org/officeDocument/2006/relationships" xmlns:p="http://schemas.openxmlformats.org/presentationml/2006/main">
+  <p:cSld>
+    <p:spTree>
+      <p:nvGrpSpPr>
+        <p:cNvPr id="1" name=""/>
+        <p:cNvGrpSpPr/>
+        <p:nvPr/>
+      </p:nvGrpSpPr>
+      <p:grpSpPr>
+        <a:xfrm>
+          <a:off x="0" y="0"/>
+          <a:ext cx="0" cy="0"/>
+          <a:chOff x="0" y="0"/>
+          <a:chExt cx="0" cy="0"/>
+        </a:xfrm>
+      </p:grpSpPr>
+      <p:sp>
+        <p:nvSpPr>
+          <p:cNvPr id="2" name="Title 1">
+            <a:extLst>
+              <a:ext uri="{FF2B5EF4-FFF2-40B4-BE49-F238E27FC236}">
+                <a16:creationId xmlns:a16="http://schemas.microsoft.com/office/drawing/2014/main" id="{9C375C1D-A60F-47D9-82DB-79EDD0A16512}"/>
+              </a:ext>
+            </a:extLst>
+          </p:cNvPr>
+          <p:cNvSpPr>
+            <a:spLocks noGrp="1"/>
+          </p:cNvSpPr>
+          <p:nvPr>
+            <p:ph type="title"/>
+          </p:nvPr>
+        </p:nvSpPr>
+        <p:spPr/>
+        <p:txBody>
+          <a:bodyPr/>
+          <a:lstStyle/>
+          <a:p>
+            <a:r>
+              <a:rPr lang="en-US" dirty="0"/>
               <a:t>SELECTED RESULTS: ANALYSIS 5</a:t>
             </a:r>
           </a:p>
@@ -4537,7 +4718,7 @@
 </p:sld>
 </file>
 
-<file path=ppt/slides/slide11.xml><?xml version="1.0" encoding="utf-8"?>
+<file path=ppt/slides/slide12.xml><?xml version="1.0" encoding="utf-8"?>
 <p:sld xmlns:a="http://schemas.openxmlformats.org/drawingml/2006/main" xmlns:r="http://schemas.openxmlformats.org/officeDocument/2006/relationships" xmlns:p="http://schemas.openxmlformats.org/presentationml/2006/main">
   <p:cSld>
     <p:spTree>
@@ -4665,89 +4846,6 @@
 </p:sld>
 </file>
 
-<file path=ppt/slides/slide12.xml><?xml version="1.0" encoding="utf-8"?>
-<p:sld xmlns:a="http://schemas.openxmlformats.org/drawingml/2006/main" xmlns:r="http://schemas.openxmlformats.org/officeDocument/2006/relationships" xmlns:p="http://schemas.openxmlformats.org/presentationml/2006/main">
-  <p:cSld>
-    <p:spTree>
-      <p:nvGrpSpPr>
-        <p:cNvPr id="1" name=""/>
-        <p:cNvGrpSpPr/>
-        <p:nvPr/>
-      </p:nvGrpSpPr>
-      <p:grpSpPr>
-        <a:xfrm>
-          <a:off x="0" y="0"/>
-          <a:ext cx="0" cy="0"/>
-          <a:chOff x="0" y="0"/>
-          <a:chExt cx="0" cy="0"/>
-        </a:xfrm>
-      </p:grpSpPr>
-      <p:sp>
-        <p:nvSpPr>
-          <p:cNvPr id="2" name="Title 1">
-            <a:extLst>
-              <a:ext uri="{FF2B5EF4-FFF2-40B4-BE49-F238E27FC236}">
-                <a16:creationId xmlns:a16="http://schemas.microsoft.com/office/drawing/2014/main" id="{219FC961-4E73-41A2-A54A-93E766693C90}"/>
-              </a:ext>
-            </a:extLst>
-          </p:cNvPr>
-          <p:cNvSpPr>
-            <a:spLocks noGrp="1"/>
-          </p:cNvSpPr>
-          <p:nvPr>
-            <p:ph type="title"/>
-          </p:nvPr>
-        </p:nvSpPr>
-        <p:spPr/>
-        <p:txBody>
-          <a:bodyPr/>
-          <a:lstStyle/>
-          <a:p>
-            <a:r>
-              <a:rPr lang="en-US" dirty="0"/>
-              <a:t>DISCUSSION</a:t>
-            </a:r>
-          </a:p>
-        </p:txBody>
-      </p:sp>
-      <p:sp>
-        <p:nvSpPr>
-          <p:cNvPr id="3" name="Content Placeholder 2">
-            <a:extLst>
-              <a:ext uri="{FF2B5EF4-FFF2-40B4-BE49-F238E27FC236}">
-                <a16:creationId xmlns:a16="http://schemas.microsoft.com/office/drawing/2014/main" id="{148AF7E9-44A2-48A8-A8CF-67A80389B59B}"/>
-              </a:ext>
-            </a:extLst>
-          </p:cNvPr>
-          <p:cNvSpPr>
-            <a:spLocks noGrp="1"/>
-          </p:cNvSpPr>
-          <p:nvPr>
-            <p:ph idx="1"/>
-          </p:nvPr>
-        </p:nvSpPr>
-        <p:spPr/>
-        <p:txBody>
-          <a:bodyPr/>
-          <a:lstStyle/>
-          <a:p>
-            <a:endParaRPr lang="en-US"/>
-          </a:p>
-        </p:txBody>
-      </p:sp>
-    </p:spTree>
-    <p:extLst>
-      <p:ext uri="{BB962C8B-B14F-4D97-AF65-F5344CB8AC3E}">
-        <p14:creationId xmlns:p14="http://schemas.microsoft.com/office/powerpoint/2010/main" val="1397751707"/>
-      </p:ext>
-    </p:extLst>
-  </p:cSld>
-  <p:clrMapOvr>
-    <a:masterClrMapping/>
-  </p:clrMapOvr>
-</p:sld>
-</file>
-
 <file path=ppt/slides/slide13.xml><?xml version="1.0" encoding="utf-8"?>
 <p:sld xmlns:a="http://schemas.openxmlformats.org/drawingml/2006/main" xmlns:r="http://schemas.openxmlformats.org/officeDocument/2006/relationships" xmlns:p="http://schemas.openxmlformats.org/presentationml/2006/main">
   <p:cSld>
@@ -4770,6 +4868,89 @@
           <p:cNvPr id="2" name="Title 1">
             <a:extLst>
               <a:ext uri="{FF2B5EF4-FFF2-40B4-BE49-F238E27FC236}">
+                <a16:creationId xmlns:a16="http://schemas.microsoft.com/office/drawing/2014/main" id="{219FC961-4E73-41A2-A54A-93E766693C90}"/>
+              </a:ext>
+            </a:extLst>
+          </p:cNvPr>
+          <p:cNvSpPr>
+            <a:spLocks noGrp="1"/>
+          </p:cNvSpPr>
+          <p:nvPr>
+            <p:ph type="title"/>
+          </p:nvPr>
+        </p:nvSpPr>
+        <p:spPr/>
+        <p:txBody>
+          <a:bodyPr/>
+          <a:lstStyle/>
+          <a:p>
+            <a:r>
+              <a:rPr lang="en-US" dirty="0"/>
+              <a:t>DISCUSSION</a:t>
+            </a:r>
+          </a:p>
+        </p:txBody>
+      </p:sp>
+      <p:sp>
+        <p:nvSpPr>
+          <p:cNvPr id="3" name="Content Placeholder 2">
+            <a:extLst>
+              <a:ext uri="{FF2B5EF4-FFF2-40B4-BE49-F238E27FC236}">
+                <a16:creationId xmlns:a16="http://schemas.microsoft.com/office/drawing/2014/main" id="{148AF7E9-44A2-48A8-A8CF-67A80389B59B}"/>
+              </a:ext>
+            </a:extLst>
+          </p:cNvPr>
+          <p:cNvSpPr>
+            <a:spLocks noGrp="1"/>
+          </p:cNvSpPr>
+          <p:nvPr>
+            <p:ph idx="1"/>
+          </p:nvPr>
+        </p:nvSpPr>
+        <p:spPr/>
+        <p:txBody>
+          <a:bodyPr/>
+          <a:lstStyle/>
+          <a:p>
+            <a:endParaRPr lang="en-US"/>
+          </a:p>
+        </p:txBody>
+      </p:sp>
+    </p:spTree>
+    <p:extLst>
+      <p:ext uri="{BB962C8B-B14F-4D97-AF65-F5344CB8AC3E}">
+        <p14:creationId xmlns:p14="http://schemas.microsoft.com/office/powerpoint/2010/main" val="1397751707"/>
+      </p:ext>
+    </p:extLst>
+  </p:cSld>
+  <p:clrMapOvr>
+    <a:masterClrMapping/>
+  </p:clrMapOvr>
+</p:sld>
+</file>
+
+<file path=ppt/slides/slide14.xml><?xml version="1.0" encoding="utf-8"?>
+<p:sld xmlns:a="http://schemas.openxmlformats.org/drawingml/2006/main" xmlns:r="http://schemas.openxmlformats.org/officeDocument/2006/relationships" xmlns:p="http://schemas.openxmlformats.org/presentationml/2006/main">
+  <p:cSld>
+    <p:spTree>
+      <p:nvGrpSpPr>
+        <p:cNvPr id="1" name=""/>
+        <p:cNvGrpSpPr/>
+        <p:nvPr/>
+      </p:nvGrpSpPr>
+      <p:grpSpPr>
+        <a:xfrm>
+          <a:off x="0" y="0"/>
+          <a:ext cx="0" cy="0"/>
+          <a:chOff x="0" y="0"/>
+          <a:chExt cx="0" cy="0"/>
+        </a:xfrm>
+      </p:grpSpPr>
+      <p:sp>
+        <p:nvSpPr>
+          <p:cNvPr id="2" name="Title 1">
+            <a:extLst>
+              <a:ext uri="{FF2B5EF4-FFF2-40B4-BE49-F238E27FC236}">
                 <a16:creationId xmlns:a16="http://schemas.microsoft.com/office/drawing/2014/main" id="{6DC7B1ED-694E-40A6-8BFD-E0658AE4A81F}"/>
               </a:ext>
             </a:extLst>
@@ -5022,7 +5203,7 @@
 </p:sld>
 </file>
 
-<file path=ppt/slides/slide14.xml><?xml version="1.0" encoding="utf-8"?>
+<file path=ppt/slides/slide15.xml><?xml version="1.0" encoding="utf-8"?>
 <p:sld xmlns:a="http://schemas.openxmlformats.org/drawingml/2006/main" xmlns:r="http://schemas.openxmlformats.org/officeDocument/2006/relationships" xmlns:p="http://schemas.openxmlformats.org/presentationml/2006/main">
   <p:cSld>
     <p:spTree>
@@ -6407,6 +6588,89 @@
           <p:cNvPr id="2" name="Title 1">
             <a:extLst>
               <a:ext uri="{FF2B5EF4-FFF2-40B4-BE49-F238E27FC236}">
+                <a16:creationId xmlns:a16="http://schemas.microsoft.com/office/drawing/2014/main" id="{B9F118EA-9581-481E-9737-5FBEC7E88C69}"/>
+              </a:ext>
+            </a:extLst>
+          </p:cNvPr>
+          <p:cNvSpPr>
+            <a:spLocks noGrp="1"/>
+          </p:cNvSpPr>
+          <p:nvPr>
+            <p:ph type="title"/>
+          </p:nvPr>
+        </p:nvSpPr>
+        <p:spPr/>
+        <p:txBody>
+          <a:bodyPr/>
+          <a:lstStyle/>
+          <a:p>
+            <a:r>
+              <a:rPr lang="en-US" dirty="0"/>
+              <a:t>UNIVARIATE ANALYSES</a:t>
+            </a:r>
+          </a:p>
+        </p:txBody>
+      </p:sp>
+      <p:sp>
+        <p:nvSpPr>
+          <p:cNvPr id="3" name="Content Placeholder 2">
+            <a:extLst>
+              <a:ext uri="{FF2B5EF4-FFF2-40B4-BE49-F238E27FC236}">
+                <a16:creationId xmlns:a16="http://schemas.microsoft.com/office/drawing/2014/main" id="{FEE7B444-FFD1-4FD3-91EA-637538C0397D}"/>
+              </a:ext>
+            </a:extLst>
+          </p:cNvPr>
+          <p:cNvSpPr>
+            <a:spLocks noGrp="1"/>
+          </p:cNvSpPr>
+          <p:nvPr>
+            <p:ph idx="1"/>
+          </p:nvPr>
+        </p:nvSpPr>
+        <p:spPr/>
+        <p:txBody>
+          <a:bodyPr/>
+          <a:lstStyle/>
+          <a:p>
+            <a:endParaRPr lang="en-US"/>
+          </a:p>
+        </p:txBody>
+      </p:sp>
+    </p:spTree>
+    <p:extLst>
+      <p:ext uri="{BB962C8B-B14F-4D97-AF65-F5344CB8AC3E}">
+        <p14:creationId xmlns:p14="http://schemas.microsoft.com/office/powerpoint/2010/main" val="4192870897"/>
+      </p:ext>
+    </p:extLst>
+  </p:cSld>
+  <p:clrMapOvr>
+    <a:masterClrMapping/>
+  </p:clrMapOvr>
+</p:sld>
+</file>
+
+<file path=ppt/slides/slide7.xml><?xml version="1.0" encoding="utf-8"?>
+<p:sld xmlns:a="http://schemas.openxmlformats.org/drawingml/2006/main" xmlns:r="http://schemas.openxmlformats.org/officeDocument/2006/relationships" xmlns:p="http://schemas.openxmlformats.org/presentationml/2006/main">
+  <p:cSld>
+    <p:spTree>
+      <p:nvGrpSpPr>
+        <p:cNvPr id="1" name=""/>
+        <p:cNvGrpSpPr/>
+        <p:nvPr/>
+      </p:nvGrpSpPr>
+      <p:grpSpPr>
+        <a:xfrm>
+          <a:off x="0" y="0"/>
+          <a:ext cx="0" cy="0"/>
+          <a:chOff x="0" y="0"/>
+          <a:chExt cx="0" cy="0"/>
+        </a:xfrm>
+      </p:grpSpPr>
+      <p:sp>
+        <p:nvSpPr>
+          <p:cNvPr id="2" name="Title 1">
+            <a:extLst>
+              <a:ext uri="{FF2B5EF4-FFF2-40B4-BE49-F238E27FC236}">
                 <a16:creationId xmlns:a16="http://schemas.microsoft.com/office/drawing/2014/main" id="{91A44E3A-8928-435B-8372-105E37A3D380}"/>
               </a:ext>
             </a:extLst>
@@ -6453,7 +6717,7 @@
         </p:blipFill>
         <p:spPr>
           <a:xfrm>
-            <a:off x="4578923" y="1213805"/>
+            <a:off x="4803513" y="1213805"/>
             <a:ext cx="7137174" cy="5434877"/>
           </a:xfrm>
           <a:prstGeom prst="rect">
@@ -6476,7 +6740,7 @@
         <p:spPr>
           <a:xfrm>
             <a:off x="475903" y="1288829"/>
-            <a:ext cx="4103020" cy="3939540"/>
+            <a:ext cx="4256518" cy="3939540"/>
           </a:xfrm>
           <a:prstGeom prst="rect">
             <a:avLst/>
@@ -6488,6 +6752,52 @@
             <a:spAutoFit/>
           </a:bodyPr>
           <a:lstStyle/>
+          <a:p>
+            <a:pPr marL="285750" indent="-285750">
+              <a:buFont typeface="Arial" panose="020B0604020202020204" pitchFamily="34" charset="0"/>
+              <a:buChar char="•"/>
+            </a:pPr>
+            <a:r>
+              <a:rPr lang="en-US" dirty="0"/>
+              <a:t>Generated using </a:t>
+            </a:r>
+            <a:r>
+              <a:rPr lang="en-US" sz="1600" dirty="0" err="1">
+                <a:solidFill>
+                  <a:srgbClr val="545454"/>
+                </a:solidFill>
+                <a:latin typeface="Lucida Console" panose="020B0609040504020204" pitchFamily="49" charset="0"/>
+              </a:rPr>
+              <a:t>GGAlly</a:t>
+            </a:r>
+            <a:r>
+              <a:rPr lang="en-US" sz="1600" dirty="0">
+                <a:solidFill>
+                  <a:srgbClr val="545454"/>
+                </a:solidFill>
+                <a:latin typeface="Lucida Console" panose="020B0609040504020204" pitchFamily="49" charset="0"/>
+              </a:rPr>
+              <a:t>::</a:t>
+            </a:r>
+            <a:r>
+              <a:rPr lang="en-US" sz="1600" dirty="0" err="1">
+                <a:solidFill>
+                  <a:srgbClr val="545454"/>
+                </a:solidFill>
+                <a:latin typeface="Lucida Console" panose="020B0609040504020204" pitchFamily="49" charset="0"/>
+              </a:rPr>
+              <a:t>ggpairs</a:t>
+            </a:r>
+            <a:r>
+              <a:rPr lang="en-US" sz="1600" dirty="0">
+                <a:solidFill>
+                  <a:srgbClr val="545454"/>
+                </a:solidFill>
+                <a:latin typeface="Lucida Console" panose="020B0609040504020204" pitchFamily="49" charset="0"/>
+              </a:rPr>
+              <a:t>()</a:t>
+            </a:r>
+          </a:p>
           <a:p>
             <a:pPr marL="285750" indent="-285750">
               <a:buFont typeface="Arial" panose="020B0604020202020204" pitchFamily="34" charset="0"/>
@@ -6635,7 +6945,7 @@
         </p:nvSpPr>
         <p:spPr>
           <a:xfrm>
-            <a:off x="4867274" y="2022923"/>
+            <a:off x="5091864" y="2022923"/>
             <a:ext cx="793337" cy="625027"/>
           </a:xfrm>
           <a:prstGeom prst="rect">
@@ -6687,7 +6997,7 @@
         </p:nvSpPr>
         <p:spPr>
           <a:xfrm>
-            <a:off x="6515098" y="4561334"/>
+            <a:off x="6739688" y="4561334"/>
             <a:ext cx="793337" cy="625027"/>
           </a:xfrm>
           <a:prstGeom prst="rect">
@@ -6738,7 +7048,7 @@
 </p:sld>
 </file>
 
-<file path=ppt/slides/slide7.xml><?xml version="1.0" encoding="utf-8"?>
+<file path=ppt/slides/slide8.xml><?xml version="1.0" encoding="utf-8"?>
 <p:sld xmlns:a="http://schemas.openxmlformats.org/drawingml/2006/main" xmlns:r="http://schemas.openxmlformats.org/officeDocument/2006/relationships" xmlns:p="http://schemas.openxmlformats.org/presentationml/2006/main">
   <p:cSld>
     <p:spTree>
@@ -6799,7 +7109,7 @@
             <p:ph idx="1"/>
             <p:extLst>
               <p:ext uri="{D42A27DB-BD31-4B8C-83A1-F6EECF244321}">
-                <p14:modId xmlns:p14="http://schemas.microsoft.com/office/powerpoint/2010/main" val="2258743869"/>
+                <p14:modId xmlns:p14="http://schemas.microsoft.com/office/powerpoint/2010/main" val="2290571783"/>
               </p:ext>
             </p:extLst>
           </p:nvPr>
@@ -7014,6 +7324,11 @@
                         <a:rPr lang="en-US" dirty="0"/>
                         <a:t>The sample median is equal to the mean</a:t>
                       </a:r>
+                      <a:endParaRPr lang="en-US" dirty="0">
+                        <a:solidFill>
+                          <a:srgbClr val="FF0000"/>
+                        </a:solidFill>
+                      </a:endParaRPr>
                     </a:p>
                   </a:txBody>
                   <a:tcPr/>
@@ -7156,6 +7471,11 @@
                         <a:rPr lang="en-US" dirty="0"/>
                         <a:t>Kendall’s Tau</a:t>
                       </a:r>
+                      <a:endParaRPr lang="en-US" dirty="0">
+                        <a:solidFill>
+                          <a:srgbClr val="FF0000"/>
+                        </a:solidFill>
+                      </a:endParaRPr>
                     </a:p>
                   </a:txBody>
                   <a:tcPr/>
@@ -7257,6 +7577,11 @@
                         <a:rPr lang="en-US" dirty="0"/>
                         <a:t>There is a relationship between log(GDP) and infant mortality</a:t>
                       </a:r>
+                      <a:endParaRPr lang="en-US" dirty="0">
+                        <a:solidFill>
+                          <a:srgbClr val="FF0000"/>
+                        </a:solidFill>
+                      </a:endParaRPr>
                     </a:p>
                   </a:txBody>
                   <a:tcPr/>
@@ -7364,6 +7689,11 @@
                         <a:rPr lang="en-US" dirty="0"/>
                         <a:t>One-Sample Kolmogorov-Smirnov Test</a:t>
                       </a:r>
+                      <a:endParaRPr lang="en-US" dirty="0">
+                        <a:solidFill>
+                          <a:srgbClr val="FF0000"/>
+                        </a:solidFill>
+                      </a:endParaRPr>
                     </a:p>
                   </a:txBody>
                   <a:tcPr/>
@@ -7465,6 +7795,11 @@
                         <a:rPr lang="en-US" dirty="0"/>
                         <a:t>Infant mortality rate differs by human development category</a:t>
                       </a:r>
+                      <a:endParaRPr lang="en-US" dirty="0">
+                        <a:solidFill>
+                          <a:srgbClr val="FF0000"/>
+                        </a:solidFill>
+                      </a:endParaRPr>
                     </a:p>
                   </a:txBody>
                   <a:tcPr/>
@@ -7518,7 +7853,7 @@
 </p:sld>
 </file>
 
-<file path=ppt/slides/slide8.xml><?xml version="1.0" encoding="utf-8"?>
+<file path=ppt/slides/slide9.xml><?xml version="1.0" encoding="utf-8"?>
 <p:sld xmlns:a="http://schemas.openxmlformats.org/drawingml/2006/main" xmlns:r="http://schemas.openxmlformats.org/officeDocument/2006/relationships" xmlns:p="http://schemas.openxmlformats.org/presentationml/2006/main">
   <p:cSld>
     <p:spTree>
@@ -8093,186 +8428,6 @@
     <p:extLst>
       <p:ext uri="{BB962C8B-B14F-4D97-AF65-F5344CB8AC3E}">
         <p14:creationId xmlns:p14="http://schemas.microsoft.com/office/powerpoint/2010/main" val="870407094"/>
-      </p:ext>
-    </p:extLst>
-  </p:cSld>
-  <p:clrMapOvr>
-    <a:masterClrMapping/>
-  </p:clrMapOvr>
-</p:sld>
-</file>
-
-<file path=ppt/slides/slide9.xml><?xml version="1.0" encoding="utf-8"?>
-<p:sld xmlns:a="http://schemas.openxmlformats.org/drawingml/2006/main" xmlns:r="http://schemas.openxmlformats.org/officeDocument/2006/relationships" xmlns:p="http://schemas.openxmlformats.org/presentationml/2006/main">
-  <p:cSld>
-    <p:spTree>
-      <p:nvGrpSpPr>
-        <p:cNvPr id="1" name=""/>
-        <p:cNvGrpSpPr/>
-        <p:nvPr/>
-      </p:nvGrpSpPr>
-      <p:grpSpPr>
-        <a:xfrm>
-          <a:off x="0" y="0"/>
-          <a:ext cx="0" cy="0"/>
-          <a:chOff x="0" y="0"/>
-          <a:chExt cx="0" cy="0"/>
-        </a:xfrm>
-      </p:grpSpPr>
-      <p:sp>
-        <p:nvSpPr>
-          <p:cNvPr id="2" name="Title 1">
-            <a:extLst>
-              <a:ext uri="{FF2B5EF4-FFF2-40B4-BE49-F238E27FC236}">
-                <a16:creationId xmlns:a16="http://schemas.microsoft.com/office/drawing/2014/main" id="{9C375C1D-A60F-47D9-82DB-79EDD0A16512}"/>
-              </a:ext>
-            </a:extLst>
-          </p:cNvPr>
-          <p:cNvSpPr>
-            <a:spLocks noGrp="1"/>
-          </p:cNvSpPr>
-          <p:nvPr>
-            <p:ph type="title"/>
-          </p:nvPr>
-        </p:nvSpPr>
-        <p:spPr/>
-        <p:txBody>
-          <a:bodyPr/>
-          <a:lstStyle/>
-          <a:p>
-            <a:r>
-              <a:rPr lang="en-US" dirty="0"/>
-              <a:t>SELECTED RESULTS: ANALYSIS 4</a:t>
-            </a:r>
-          </a:p>
-        </p:txBody>
-      </p:sp>
-      <p:pic>
-        <p:nvPicPr>
-          <p:cNvPr id="4" name="Content Placeholder 3">
-            <a:extLst>
-              <a:ext uri="{FF2B5EF4-FFF2-40B4-BE49-F238E27FC236}">
-                <a16:creationId xmlns:a16="http://schemas.microsoft.com/office/drawing/2014/main" id="{E40EE026-C233-44BC-8BA6-0C4BE4CA0D12}"/>
-              </a:ext>
-            </a:extLst>
-          </p:cNvPr>
-          <p:cNvPicPr>
-            <a:picLocks noGrp="1" noChangeAspect="1"/>
-          </p:cNvPicPr>
-          <p:nvPr>
-            <p:ph idx="1"/>
-          </p:nvPr>
-        </p:nvPicPr>
-        <p:blipFill rotWithShape="1">
-          <a:blip r:embed="rId2"/>
-          <a:srcRect t="7610"/>
-          <a:stretch/>
-        </p:blipFill>
-        <p:spPr>
-          <a:xfrm>
-            <a:off x="590296" y="2387149"/>
-            <a:ext cx="10984936" cy="4059585"/>
-          </a:xfrm>
-          <a:prstGeom prst="rect">
-            <a:avLst/>
-          </a:prstGeom>
-        </p:spPr>
-      </p:pic>
-      <p:sp>
-        <p:nvSpPr>
-          <p:cNvPr id="5" name="TextBox 4">
-            <a:extLst>
-              <a:ext uri="{FF2B5EF4-FFF2-40B4-BE49-F238E27FC236}">
-                <a16:creationId xmlns:a16="http://schemas.microsoft.com/office/drawing/2014/main" id="{8E375F77-84DB-4FC0-99AB-ED4D29C50289}"/>
-              </a:ext>
-            </a:extLst>
-          </p:cNvPr>
-          <p:cNvSpPr txBox="1"/>
-          <p:nvPr/>
-        </p:nvSpPr>
-        <p:spPr>
-          <a:xfrm>
-            <a:off x="1143933" y="1653323"/>
-            <a:ext cx="4797908" cy="369332"/>
-          </a:xfrm>
-          <a:prstGeom prst="rect">
-            <a:avLst/>
-          </a:prstGeom>
-          <a:noFill/>
-        </p:spPr>
-        <p:txBody>
-          <a:bodyPr wrap="square" rtlCol="0">
-            <a:spAutoFit/>
-          </a:bodyPr>
-          <a:lstStyle/>
-          <a:p>
-            <a:r>
-              <a:rPr lang="en-US" b="1" dirty="0">
-                <a:solidFill>
-                  <a:srgbClr val="545454"/>
-                </a:solidFill>
-                <a:latin typeface="Calibri" panose="020F0502020204030204" pitchFamily="34" charset="0"/>
-                <a:cs typeface="Calibri" panose="020F0502020204030204" pitchFamily="34" charset="0"/>
-              </a:rPr>
-              <a:t>Happiness Score with N(</a:t>
-            </a:r>
-            <a:r>
-              <a:rPr lang="el-GR" b="1" i="1" dirty="0">
-                <a:solidFill>
-                  <a:srgbClr val="545454"/>
-                </a:solidFill>
-                <a:latin typeface="Calibri" panose="020F0502020204030204" pitchFamily="34" charset="0"/>
-                <a:cs typeface="Calibri" panose="020F0502020204030204" pitchFamily="34" charset="0"/>
-              </a:rPr>
-              <a:t>μ</a:t>
-            </a:r>
-            <a:r>
-              <a:rPr lang="en-US" b="1" dirty="0">
-                <a:solidFill>
-                  <a:srgbClr val="545454"/>
-                </a:solidFill>
-                <a:latin typeface="Calibri" panose="020F0502020204030204" pitchFamily="34" charset="0"/>
-                <a:cs typeface="Calibri" panose="020F0502020204030204" pitchFamily="34" charset="0"/>
-              </a:rPr>
-              <a:t> = 5.553, </a:t>
-            </a:r>
-            <a:r>
-              <a:rPr lang="el-GR" b="1" i="1" dirty="0">
-                <a:solidFill>
-                  <a:srgbClr val="545454"/>
-                </a:solidFill>
-                <a:latin typeface="Calibri" panose="020F0502020204030204" pitchFamily="34" charset="0"/>
-                <a:cs typeface="Calibri" panose="020F0502020204030204" pitchFamily="34" charset="0"/>
-              </a:rPr>
-              <a:t>σ</a:t>
-            </a:r>
-            <a:r>
-              <a:rPr lang="en-US" b="1" baseline="30000" dirty="0">
-                <a:solidFill>
-                  <a:srgbClr val="545454"/>
-                </a:solidFill>
-                <a:latin typeface="Calibri" panose="020F0502020204030204" pitchFamily="34" charset="0"/>
-                <a:cs typeface="Calibri" panose="020F0502020204030204" pitchFamily="34" charset="0"/>
-              </a:rPr>
-              <a:t>2</a:t>
-            </a:r>
-            <a:r>
-              <a:rPr lang="en-US" b="1" dirty="0">
-                <a:solidFill>
-                  <a:srgbClr val="545454"/>
-                </a:solidFill>
-                <a:latin typeface="Calibri" panose="020F0502020204030204" pitchFamily="34" charset="0"/>
-                <a:cs typeface="Calibri" panose="020F0502020204030204" pitchFamily="34" charset="0"/>
-              </a:rPr>
-              <a:t> = 1.139)</a:t>
-            </a:r>
-          </a:p>
-        </p:txBody>
-      </p:sp>
-    </p:spTree>
-    <p:extLst>
-      <p:ext uri="{BB962C8B-B14F-4D97-AF65-F5344CB8AC3E}">
-        <p14:creationId xmlns:p14="http://schemas.microsoft.com/office/powerpoint/2010/main" val="3956234319"/>
       </p:ext>
     </p:extLst>
   </p:cSld>

</xml_diff>

<commit_message>
Fixing Analyses 2 & 4
</commit_message>
<xml_diff>
--- a/Prioli_Final_Proj.pptx
+++ b/Prioli_Final_Proj.pptx
@@ -5763,7 +5763,7 @@
             <p:ph idx="1"/>
             <p:extLst>
               <p:ext uri="{D42A27DB-BD31-4B8C-83A1-F6EECF244321}">
-                <p14:modId xmlns:p14="http://schemas.microsoft.com/office/powerpoint/2010/main" val="2527348564"/>
+                <p14:modId xmlns:p14="http://schemas.microsoft.com/office/powerpoint/2010/main" val="1388639979"/>
               </p:ext>
             </p:extLst>
           </p:nvPr>
@@ -6611,31 +6611,6 @@
           </a:p>
         </p:txBody>
       </p:sp>
-      <p:sp>
-        <p:nvSpPr>
-          <p:cNvPr id="3" name="Content Placeholder 2">
-            <a:extLst>
-              <a:ext uri="{FF2B5EF4-FFF2-40B4-BE49-F238E27FC236}">
-                <a16:creationId xmlns:a16="http://schemas.microsoft.com/office/drawing/2014/main" id="{FEE7B444-FFD1-4FD3-91EA-637538C0397D}"/>
-              </a:ext>
-            </a:extLst>
-          </p:cNvPr>
-          <p:cNvSpPr>
-            <a:spLocks noGrp="1"/>
-          </p:cNvSpPr>
-          <p:nvPr>
-            <p:ph idx="1"/>
-          </p:nvPr>
-        </p:nvSpPr>
-        <p:spPr/>
-        <p:txBody>
-          <a:bodyPr/>
-          <a:lstStyle/>
-          <a:p>
-            <a:endParaRPr lang="en-US"/>
-          </a:p>
-        </p:txBody>
-      </p:sp>
     </p:spTree>
     <p:extLst>
       <p:ext uri="{BB962C8B-B14F-4D97-AF65-F5344CB8AC3E}">
@@ -6768,7 +6743,7 @@
                 </a:solidFill>
                 <a:latin typeface="Lucida Console" panose="020B0609040504020204" pitchFamily="49" charset="0"/>
               </a:rPr>
-              <a:t>GGAlly</a:t>
+              <a:t>GGally</a:t>
             </a:r>
             <a:r>
               <a:rPr lang="en-US" sz="1600" dirty="0">
@@ -6878,6 +6853,24 @@
               </a:rPr>
               <a:t>SPI</a:t>
             </a:r>
+            <a:r>
+              <a:rPr lang="en-US" sz="1600" dirty="0">
+                <a:solidFill>
+                  <a:srgbClr val="545454"/>
+                </a:solidFill>
+              </a:rPr>
+              <a:t> </a:t>
+            </a:r>
+            <a:r>
+              <a:rPr lang="en-US" sz="1600" dirty="0"/>
+              <a:t>(clear correlation)</a:t>
+            </a:r>
+            <a:endParaRPr lang="en-US" sz="1600" dirty="0">
+              <a:solidFill>
+                <a:srgbClr val="545454"/>
+              </a:solidFill>
+              <a:latin typeface="Lucida Console" panose="020B0609040504020204" pitchFamily="49" charset="0"/>
+            </a:endParaRPr>
           </a:p>
           <a:p>
             <a:pPr marL="742950" lvl="1" indent="-285750">
@@ -6905,20 +6898,19 @@
                 </a:solidFill>
                 <a:latin typeface="Lucida Console" panose="020B0609040504020204" pitchFamily="49" charset="0"/>
               </a:rPr>
-              <a:t>infantmort</a:t>
-            </a:r>
-            <a:r>
-              <a:rPr lang="en-US" sz="1600" dirty="0">
+              <a:t>gendereq</a:t>
+            </a:r>
+            <a:r>
+              <a:rPr lang="en-US" dirty="0">
                 <a:solidFill>
                   <a:srgbClr val="545454"/>
                 </a:solidFill>
-                <a:latin typeface="Lucida Console" panose="020B0609040504020204" pitchFamily="49" charset="0"/>
               </a:rPr>
               <a:t> </a:t>
             </a:r>
             <a:r>
               <a:rPr lang="en-US" sz="1600" dirty="0"/>
-              <a:t>(possible nonlinear association?)</a:t>
+              <a:t>(no clear association)</a:t>
             </a:r>
           </a:p>
           <a:p>
@@ -6945,7 +6937,7 @@
         </p:nvSpPr>
         <p:spPr>
           <a:xfrm>
-            <a:off x="5091864" y="2022923"/>
+            <a:off x="5108048" y="2022923"/>
             <a:ext cx="793337" cy="625027"/>
           </a:xfrm>
           <a:prstGeom prst="rect">
@@ -6997,7 +6989,7 @@
         </p:nvSpPr>
         <p:spPr>
           <a:xfrm>
-            <a:off x="6739688" y="4561334"/>
+            <a:off x="6739688" y="3939335"/>
             <a:ext cx="793337" cy="625027"/>
           </a:xfrm>
           <a:prstGeom prst="rect">

</xml_diff>

<commit_message>
Adding univariate output to slides
</commit_message>
<xml_diff>
--- a/Prioli_Final_Proj.pptx
+++ b/Prioli_Final_Proj.pptx
@@ -5,7 +5,7 @@
     <p:sldMasterId id="2147483726" r:id="rId1"/>
   </p:sldMasterIdLst>
   <p:notesMasterIdLst>
-    <p:notesMasterId r:id="rId17"/>
+    <p:notesMasterId r:id="rId19"/>
   </p:notesMasterIdLst>
   <p:sldIdLst>
     <p:sldId id="256" r:id="rId2"/>
@@ -14,15 +14,17 @@
     <p:sldId id="259" r:id="rId5"/>
     <p:sldId id="260" r:id="rId6"/>
     <p:sldId id="272" r:id="rId7"/>
-    <p:sldId id="267" r:id="rId8"/>
-    <p:sldId id="268" r:id="rId9"/>
-    <p:sldId id="265" r:id="rId10"/>
-    <p:sldId id="269" r:id="rId11"/>
-    <p:sldId id="270" r:id="rId12"/>
-    <p:sldId id="271" r:id="rId13"/>
-    <p:sldId id="264" r:id="rId14"/>
-    <p:sldId id="261" r:id="rId15"/>
-    <p:sldId id="262" r:id="rId16"/>
+    <p:sldId id="273" r:id="rId8"/>
+    <p:sldId id="274" r:id="rId9"/>
+    <p:sldId id="267" r:id="rId10"/>
+    <p:sldId id="268" r:id="rId11"/>
+    <p:sldId id="265" r:id="rId12"/>
+    <p:sldId id="269" r:id="rId13"/>
+    <p:sldId id="270" r:id="rId14"/>
+    <p:sldId id="271" r:id="rId15"/>
+    <p:sldId id="264" r:id="rId16"/>
+    <p:sldId id="261" r:id="rId17"/>
+    <p:sldId id="262" r:id="rId18"/>
   </p:sldIdLst>
   <p:sldSz cx="12192000" cy="6858000"/>
   <p:notesSz cx="6858000" cy="9144000"/>
@@ -123,7 +125,23 @@
   </p:defaultTextStyle>
   <p:extLst>
     <p:ext uri="{EFAFB233-063F-42B5-8137-9DF3F51BA10A}">
-      <p15:sldGuideLst xmlns:p15="http://schemas.microsoft.com/office/powerpoint/2012/main"/>
+      <p15:sldGuideLst xmlns:p15="http://schemas.microsoft.com/office/powerpoint/2012/main">
+        <p15:guide id="1" pos="576" userDrawn="1">
+          <p15:clr>
+            <a:srgbClr val="A4A3A4"/>
+          </p15:clr>
+        </p15:guide>
+        <p15:guide id="2" orient="horz" pos="1680" userDrawn="1">
+          <p15:clr>
+            <a:srgbClr val="A4A3A4"/>
+          </p15:clr>
+        </p15:guide>
+        <p15:guide id="3" orient="horz" pos="1464" userDrawn="1">
+          <p15:clr>
+            <a:srgbClr val="A4A3A4"/>
+          </p15:clr>
+        </p15:guide>
+      </p15:sldGuideLst>
     </p:ext>
   </p:extLst>
 </p:presentation>
@@ -211,7 +229,7 @@
           <a:p>
             <a:fld id="{4EE169DE-67F4-4753-9B1C-F1A309C78068}" type="datetimeFigureOut">
               <a:rPr lang="en-US" smtClean="0"/>
-              <a:t>12/11/2018</a:t>
+              <a:t>12/12/2018</a:t>
             </a:fld>
             <a:endParaRPr lang="en-US"/>
           </a:p>
@@ -678,7 +696,7 @@
           <a:p>
             <a:fld id="{CF647BC4-379F-449B-8ACB-1D0356C51E22}" type="datetimeFigureOut">
               <a:rPr lang="en-US" smtClean="0"/>
-              <a:t>12/11/2018</a:t>
+              <a:t>12/12/2018</a:t>
             </a:fld>
             <a:endParaRPr lang="en-US"/>
           </a:p>
@@ -868,7 +886,7 @@
           <a:p>
             <a:fld id="{CF647BC4-379F-449B-8ACB-1D0356C51E22}" type="datetimeFigureOut">
               <a:rPr lang="en-US" smtClean="0"/>
-              <a:t>12/11/2018</a:t>
+              <a:t>12/12/2018</a:t>
             </a:fld>
             <a:endParaRPr lang="en-US"/>
           </a:p>
@@ -1048,7 +1066,7 @@
           <a:p>
             <a:fld id="{CF647BC4-379F-449B-8ACB-1D0356C51E22}" type="datetimeFigureOut">
               <a:rPr lang="en-US" smtClean="0"/>
-              <a:t>12/11/2018</a:t>
+              <a:t>12/12/2018</a:t>
             </a:fld>
             <a:endParaRPr lang="en-US"/>
           </a:p>
@@ -1239,7 +1257,7 @@
           <a:p>
             <a:fld id="{CF647BC4-379F-449B-8ACB-1D0356C51E22}" type="datetimeFigureOut">
               <a:rPr lang="en-US" smtClean="0"/>
-              <a:t>12/11/2018</a:t>
+              <a:t>12/12/2018</a:t>
             </a:fld>
             <a:endParaRPr lang="en-US"/>
           </a:p>
@@ -1495,7 +1513,7 @@
           <a:p>
             <a:fld id="{CF647BC4-379F-449B-8ACB-1D0356C51E22}" type="datetimeFigureOut">
               <a:rPr lang="en-US" smtClean="0"/>
-              <a:t>12/11/2018</a:t>
+              <a:t>12/12/2018</a:t>
             </a:fld>
             <a:endParaRPr lang="en-US"/>
           </a:p>
@@ -1783,7 +1801,7 @@
           <a:p>
             <a:fld id="{CF647BC4-379F-449B-8ACB-1D0356C51E22}" type="datetimeFigureOut">
               <a:rPr lang="en-US" smtClean="0"/>
-              <a:t>12/11/2018</a:t>
+              <a:t>12/12/2018</a:t>
             </a:fld>
             <a:endParaRPr lang="en-US"/>
           </a:p>
@@ -2221,7 +2239,7 @@
           <a:p>
             <a:fld id="{CF647BC4-379F-449B-8ACB-1D0356C51E22}" type="datetimeFigureOut">
               <a:rPr lang="en-US" smtClean="0"/>
-              <a:t>12/11/2018</a:t>
+              <a:t>12/12/2018</a:t>
             </a:fld>
             <a:endParaRPr lang="en-US"/>
           </a:p>
@@ -2339,7 +2357,7 @@
           <a:p>
             <a:fld id="{CF647BC4-379F-449B-8ACB-1D0356C51E22}" type="datetimeFigureOut">
               <a:rPr lang="en-US" smtClean="0"/>
-              <a:t>12/11/2018</a:t>
+              <a:t>12/12/2018</a:t>
             </a:fld>
             <a:endParaRPr lang="en-US"/>
           </a:p>
@@ -2434,7 +2452,7 @@
           <a:p>
             <a:fld id="{CF647BC4-379F-449B-8ACB-1D0356C51E22}" type="datetimeFigureOut">
               <a:rPr lang="en-US" smtClean="0"/>
-              <a:t>12/11/2018</a:t>
+              <a:t>12/12/2018</a:t>
             </a:fld>
             <a:endParaRPr lang="en-US"/>
           </a:p>
@@ -2790,7 +2808,7 @@
           <a:p>
             <a:fld id="{CF647BC4-379F-449B-8ACB-1D0356C51E22}" type="datetimeFigureOut">
               <a:rPr lang="en-US" smtClean="0"/>
-              <a:t>12/11/2018</a:t>
+              <a:t>12/12/2018</a:t>
             </a:fld>
             <a:endParaRPr lang="en-US"/>
           </a:p>
@@ -3106,7 +3124,7 @@
           <a:p>
             <a:fld id="{CF647BC4-379F-449B-8ACB-1D0356C51E22}" type="datetimeFigureOut">
               <a:rPr lang="en-US" smtClean="0"/>
-              <a:t>12/11/2018</a:t>
+              <a:t>12/12/2018</a:t>
             </a:fld>
             <a:endParaRPr lang="en-US"/>
           </a:p>
@@ -3338,7 +3356,7 @@
             <a:fld id="{CF647BC4-379F-449B-8ACB-1D0356C51E22}" type="datetimeFigureOut">
               <a:rPr lang="en-US" smtClean="0"/>
               <a:pPr/>
-              <a:t>12/11/2018</a:t>
+              <a:t>12/12/2018</a:t>
             </a:fld>
             <a:endParaRPr lang="en-US"/>
           </a:p>
@@ -3915,7 +3933,7 @@
           <p:cNvPr id="2" name="Title 1">
             <a:extLst>
               <a:ext uri="{FF2B5EF4-FFF2-40B4-BE49-F238E27FC236}">
-                <a16:creationId xmlns:a16="http://schemas.microsoft.com/office/drawing/2014/main" id="{9C375C1D-A60F-47D9-82DB-79EDD0A16512}"/>
+                <a16:creationId xmlns:a16="http://schemas.microsoft.com/office/drawing/2014/main" id="{B7383051-138B-4DB9-9ABB-C3BBE79305E8}"/>
               </a:ext>
             </a:extLst>
           </p:cNvPr>
@@ -3933,137 +3951,771 @@
           <a:p>
             <a:r>
               <a:rPr lang="en-US" dirty="0"/>
-              <a:t>SELECTED RESULTS: ANALYSIS 4</a:t>
-            </a:r>
-          </a:p>
-        </p:txBody>
-      </p:sp>
-      <p:pic>
-        <p:nvPicPr>
+              <a:t>ANALYSES PERFORMED</a:t>
+            </a:r>
+          </a:p>
+        </p:txBody>
+      </p:sp>
+      <p:graphicFrame>
+        <p:nvGraphicFramePr>
           <p:cNvPr id="4" name="Content Placeholder 3">
             <a:extLst>
               <a:ext uri="{FF2B5EF4-FFF2-40B4-BE49-F238E27FC236}">
-                <a16:creationId xmlns:a16="http://schemas.microsoft.com/office/drawing/2014/main" id="{E40EE026-C233-44BC-8BA6-0C4BE4CA0D12}"/>
+                <a16:creationId xmlns:a16="http://schemas.microsoft.com/office/drawing/2014/main" id="{B075988C-CA5D-4C1C-A400-095EA418AAF6}"/>
               </a:ext>
             </a:extLst>
           </p:cNvPr>
-          <p:cNvPicPr>
-            <a:picLocks noGrp="1" noChangeAspect="1"/>
-          </p:cNvPicPr>
+          <p:cNvGraphicFramePr>
+            <a:graphicFrameLocks noGrp="1"/>
+          </p:cNvGraphicFramePr>
           <p:nvPr>
             <p:ph idx="1"/>
-          </p:nvPr>
-        </p:nvPicPr>
-        <p:blipFill rotWithShape="1">
-          <a:blip r:embed="rId2"/>
-          <a:srcRect t="7610"/>
-          <a:stretch/>
-        </p:blipFill>
-        <p:spPr>
-          <a:xfrm>
-            <a:off x="590296" y="2387149"/>
-            <a:ext cx="10984936" cy="4059585"/>
-          </a:xfrm>
-          <a:prstGeom prst="rect">
-            <a:avLst/>
-          </a:prstGeom>
-        </p:spPr>
-      </p:pic>
-      <p:sp>
-        <p:nvSpPr>
-          <p:cNvPr id="5" name="TextBox 4">
-            <a:extLst>
-              <a:ext uri="{FF2B5EF4-FFF2-40B4-BE49-F238E27FC236}">
-                <a16:creationId xmlns:a16="http://schemas.microsoft.com/office/drawing/2014/main" id="{8E375F77-84DB-4FC0-99AB-ED4D29C50289}"/>
-              </a:ext>
-            </a:extLst>
-          </p:cNvPr>
-          <p:cNvSpPr txBox="1"/>
-          <p:nvPr/>
-        </p:nvSpPr>
-        <p:spPr>
-          <a:xfrm>
-            <a:off x="1143933" y="1653323"/>
-            <a:ext cx="4797908" cy="369332"/>
-          </a:xfrm>
-          <a:prstGeom prst="rect">
-            <a:avLst/>
-          </a:prstGeom>
-          <a:noFill/>
-        </p:spPr>
-        <p:txBody>
-          <a:bodyPr wrap="square" rtlCol="0">
-            <a:spAutoFit/>
-          </a:bodyPr>
-          <a:lstStyle/>
-          <a:p>
-            <a:r>
-              <a:rPr lang="en-US" b="1" dirty="0">
-                <a:solidFill>
-                  <a:srgbClr val="545454"/>
-                </a:solidFill>
-                <a:latin typeface="Calibri" panose="020F0502020204030204" pitchFamily="34" charset="0"/>
-                <a:cs typeface="Calibri" panose="020F0502020204030204" pitchFamily="34" charset="0"/>
-              </a:rPr>
-              <a:t>Happiness Score with N(</a:t>
-            </a:r>
-            <a:r>
-              <a:rPr lang="el-GR" b="1" i="1" dirty="0">
-                <a:solidFill>
-                  <a:srgbClr val="545454"/>
-                </a:solidFill>
-                <a:latin typeface="Calibri" panose="020F0502020204030204" pitchFamily="34" charset="0"/>
-                <a:cs typeface="Calibri" panose="020F0502020204030204" pitchFamily="34" charset="0"/>
-              </a:rPr>
-              <a:t>μ</a:t>
-            </a:r>
-            <a:r>
-              <a:rPr lang="en-US" b="1" dirty="0">
-                <a:solidFill>
-                  <a:srgbClr val="545454"/>
-                </a:solidFill>
-                <a:latin typeface="Calibri" panose="020F0502020204030204" pitchFamily="34" charset="0"/>
-                <a:cs typeface="Calibri" panose="020F0502020204030204" pitchFamily="34" charset="0"/>
-              </a:rPr>
-              <a:t> = 5.553, </a:t>
-            </a:r>
-            <a:r>
-              <a:rPr lang="el-GR" b="1" i="1" dirty="0">
-                <a:solidFill>
-                  <a:srgbClr val="545454"/>
-                </a:solidFill>
-                <a:latin typeface="Calibri" panose="020F0502020204030204" pitchFamily="34" charset="0"/>
-                <a:cs typeface="Calibri" panose="020F0502020204030204" pitchFamily="34" charset="0"/>
-              </a:rPr>
-              <a:t>σ</a:t>
-            </a:r>
-            <a:r>
-              <a:rPr lang="en-US" b="1" baseline="30000" dirty="0">
-                <a:solidFill>
-                  <a:srgbClr val="545454"/>
-                </a:solidFill>
-                <a:latin typeface="Calibri" panose="020F0502020204030204" pitchFamily="34" charset="0"/>
-                <a:cs typeface="Calibri" panose="020F0502020204030204" pitchFamily="34" charset="0"/>
-              </a:rPr>
-              <a:t>2</a:t>
-            </a:r>
-            <a:r>
-              <a:rPr lang="en-US" b="1" dirty="0">
-                <a:solidFill>
-                  <a:srgbClr val="545454"/>
-                </a:solidFill>
-                <a:latin typeface="Calibri" panose="020F0502020204030204" pitchFamily="34" charset="0"/>
-                <a:cs typeface="Calibri" panose="020F0502020204030204" pitchFamily="34" charset="0"/>
-              </a:rPr>
-              <a:t> = 1.139)</a:t>
-            </a:r>
-          </a:p>
-        </p:txBody>
-      </p:sp>
+            <p:extLst>
+              <p:ext uri="{D42A27DB-BD31-4B8C-83A1-F6EECF244321}">
+                <p14:modId xmlns:p14="http://schemas.microsoft.com/office/powerpoint/2010/main" val="2900697385"/>
+              </p:ext>
+            </p:extLst>
+          </p:nvPr>
+        </p:nvGraphicFramePr>
+        <p:xfrm>
+          <a:off x="476250" y="1358900"/>
+          <a:ext cx="11214102" cy="4942840"/>
+        </p:xfrm>
+        <a:graphic>
+          <a:graphicData uri="http://schemas.openxmlformats.org/drawingml/2006/table">
+            <a:tbl>
+              <a:tblPr firstRow="1" bandRow="1">
+                <a:tableStyleId>{5C22544A-7EE6-4342-B048-85BDC9FD1C3A}</a:tableStyleId>
+              </a:tblPr>
+              <a:tblGrid>
+                <a:gridCol w="963529">
+                  <a:extLst>
+                    <a:ext uri="{9D8B030D-6E8A-4147-A177-3AD203B41FA5}">
+                      <a16:colId xmlns:a16="http://schemas.microsoft.com/office/drawing/2014/main" val="1459026659"/>
+                    </a:ext>
+                  </a:extLst>
+                </a:gridCol>
+                <a:gridCol w="1641351">
+                  <a:extLst>
+                    <a:ext uri="{9D8B030D-6E8A-4147-A177-3AD203B41FA5}">
+                      <a16:colId xmlns:a16="http://schemas.microsoft.com/office/drawing/2014/main" val="2510600754"/>
+                    </a:ext>
+                  </a:extLst>
+                </a:gridCol>
+                <a:gridCol w="2435594">
+                  <a:extLst>
+                    <a:ext uri="{9D8B030D-6E8A-4147-A177-3AD203B41FA5}">
+                      <a16:colId xmlns:a16="http://schemas.microsoft.com/office/drawing/2014/main" val="85376525"/>
+                    </a:ext>
+                  </a:extLst>
+                </a:gridCol>
+                <a:gridCol w="2075202">
+                  <a:extLst>
+                    <a:ext uri="{9D8B030D-6E8A-4147-A177-3AD203B41FA5}">
+                      <a16:colId xmlns:a16="http://schemas.microsoft.com/office/drawing/2014/main" val="3039715562"/>
+                    </a:ext>
+                  </a:extLst>
+                </a:gridCol>
+                <a:gridCol w="2049213">
+                  <a:extLst>
+                    <a:ext uri="{9D8B030D-6E8A-4147-A177-3AD203B41FA5}">
+                      <a16:colId xmlns:a16="http://schemas.microsoft.com/office/drawing/2014/main" val="3694282208"/>
+                    </a:ext>
+                  </a:extLst>
+                </a:gridCol>
+                <a:gridCol w="2049213">
+                  <a:extLst>
+                    <a:ext uri="{9D8B030D-6E8A-4147-A177-3AD203B41FA5}">
+                      <a16:colId xmlns:a16="http://schemas.microsoft.com/office/drawing/2014/main" val="3977966083"/>
+                    </a:ext>
+                  </a:extLst>
+                </a:gridCol>
+              </a:tblGrid>
+              <a:tr h="370840">
+                <a:tc>
+                  <a:txBody>
+                    <a:bodyPr/>
+                    <a:lstStyle/>
+                    <a:p>
+                      <a:r>
+                        <a:rPr lang="en-US" sz="1500" b="1" dirty="0"/>
+                        <a:t>ANALYSIS</a:t>
+                      </a:r>
+                    </a:p>
+                  </a:txBody>
+                  <a:tcPr/>
+                </a:tc>
+                <a:tc>
+                  <a:txBody>
+                    <a:bodyPr/>
+                    <a:lstStyle/>
+                    <a:p>
+                      <a:r>
+                        <a:rPr lang="en-US" sz="1500" b="1" dirty="0"/>
+                        <a:t>VARIABLE(S)</a:t>
+                      </a:r>
+                    </a:p>
+                  </a:txBody>
+                  <a:tcPr/>
+                </a:tc>
+                <a:tc>
+                  <a:txBody>
+                    <a:bodyPr/>
+                    <a:lstStyle/>
+                    <a:p>
+                      <a:r>
+                        <a:rPr lang="en-US" sz="1500" b="1" i="1" dirty="0">
+                          <a:latin typeface="CMU Serif" panose="02000603000000000000" pitchFamily="2" charset="0"/>
+                          <a:ea typeface="CMU Serif" panose="02000603000000000000" pitchFamily="2" charset="0"/>
+                          <a:cs typeface="CMU Serif" panose="02000603000000000000" pitchFamily="2" charset="0"/>
+                        </a:rPr>
+                        <a:t>H</a:t>
+                      </a:r>
+                      <a:r>
+                        <a:rPr lang="en-US" sz="1500" b="1" i="1" baseline="-25000" dirty="0">
+                          <a:latin typeface="CMU Serif" panose="02000603000000000000" pitchFamily="2" charset="0"/>
+                          <a:ea typeface="CMU Serif" panose="02000603000000000000" pitchFamily="2" charset="0"/>
+                          <a:cs typeface="CMU Serif" panose="02000603000000000000" pitchFamily="2" charset="0"/>
+                        </a:rPr>
+                        <a:t>0</a:t>
+                      </a:r>
+                    </a:p>
+                  </a:txBody>
+                  <a:tcPr/>
+                </a:tc>
+                <a:tc>
+                  <a:txBody>
+                    <a:bodyPr/>
+                    <a:lstStyle/>
+                    <a:p>
+                      <a:r>
+                        <a:rPr lang="en-US" sz="1500" b="1" i="1" dirty="0">
+                          <a:latin typeface="CMU Serif" panose="02000603000000000000" pitchFamily="2" charset="0"/>
+                          <a:ea typeface="CMU Serif" panose="02000603000000000000" pitchFamily="2" charset="0"/>
+                          <a:cs typeface="CMU Serif" panose="02000603000000000000" pitchFamily="2" charset="0"/>
+                        </a:rPr>
+                        <a:t>H</a:t>
+                      </a:r>
+                      <a:r>
+                        <a:rPr lang="en-US" sz="1500" b="1" i="1" baseline="-25000" dirty="0">
+                          <a:latin typeface="CMU Serif" panose="02000603000000000000" pitchFamily="2" charset="0"/>
+                          <a:ea typeface="CMU Serif" panose="02000603000000000000" pitchFamily="2" charset="0"/>
+                          <a:cs typeface="CMU Serif" panose="02000603000000000000" pitchFamily="2" charset="0"/>
+                        </a:rPr>
+                        <a:t>A</a:t>
+                      </a:r>
+                    </a:p>
+                  </a:txBody>
+                  <a:tcPr/>
+                </a:tc>
+                <a:tc>
+                  <a:txBody>
+                    <a:bodyPr/>
+                    <a:lstStyle/>
+                    <a:p>
+                      <a:r>
+                        <a:rPr lang="en-US" sz="1500" b="1" dirty="0"/>
+                        <a:t>NONPARAMETRIC TEST</a:t>
+                      </a:r>
+                    </a:p>
+                  </a:txBody>
+                  <a:tcPr/>
+                </a:tc>
+                <a:tc>
+                  <a:txBody>
+                    <a:bodyPr/>
+                    <a:lstStyle/>
+                    <a:p>
+                      <a:r>
+                        <a:rPr lang="en-US" sz="1500" b="1" dirty="0"/>
+                        <a:t>PARAMETRIC TEST</a:t>
+                      </a:r>
+                    </a:p>
+                  </a:txBody>
+                  <a:tcPr/>
+                </a:tc>
+                <a:extLst>
+                  <a:ext uri="{0D108BD9-81ED-4DB2-BD59-A6C34878D82A}">
+                    <a16:rowId xmlns:a16="http://schemas.microsoft.com/office/drawing/2014/main" val="2795953357"/>
+                  </a:ext>
+                </a:extLst>
+              </a:tr>
+              <a:tr h="370840">
+                <a:tc>
+                  <a:txBody>
+                    <a:bodyPr/>
+                    <a:lstStyle/>
+                    <a:p>
+                      <a:r>
+                        <a:rPr lang="en-US" sz="1500" dirty="0"/>
+                        <a:t>1</a:t>
+                      </a:r>
+                    </a:p>
+                  </a:txBody>
+                  <a:tcPr/>
+                </a:tc>
+                <a:tc>
+                  <a:txBody>
+                    <a:bodyPr/>
+                    <a:lstStyle/>
+                    <a:p>
+                      <a:r>
+                        <a:rPr lang="en-US" sz="1300" dirty="0" err="1">
+                          <a:solidFill>
+                            <a:srgbClr val="545454"/>
+                          </a:solidFill>
+                          <a:latin typeface="Lucida Console" panose="020B0609040504020204" pitchFamily="49" charset="0"/>
+                        </a:rPr>
+                        <a:t>HDIindex</a:t>
+                      </a:r>
+                      <a:endParaRPr lang="en-US" sz="1300" dirty="0">
+                        <a:solidFill>
+                          <a:srgbClr val="545454"/>
+                        </a:solidFill>
+                        <a:latin typeface="Lucida Console" panose="020B0609040504020204" pitchFamily="49" charset="0"/>
+                      </a:endParaRPr>
+                    </a:p>
+                  </a:txBody>
+                  <a:tcPr/>
+                </a:tc>
+                <a:tc>
+                  <a:txBody>
+                    <a:bodyPr/>
+                    <a:lstStyle/>
+                    <a:p>
+                      <a:r>
+                        <a:rPr lang="en-US" sz="1500" dirty="0"/>
+                        <a:t>Population measure of location = 0 (used to find 95% CI for population median and mean)</a:t>
+                      </a:r>
+                      <a:endParaRPr lang="en-US" sz="1500" dirty="0">
+                        <a:solidFill>
+                          <a:srgbClr val="FF0000"/>
+                        </a:solidFill>
+                      </a:endParaRPr>
+                    </a:p>
+                  </a:txBody>
+                  <a:tcPr/>
+                </a:tc>
+                <a:tc>
+                  <a:txBody>
+                    <a:bodyPr/>
+                    <a:lstStyle/>
+                    <a:p>
+                      <a:r>
+                        <a:rPr lang="en-US" sz="1500" dirty="0"/>
+                        <a:t>Population measure of location ≠ 0</a:t>
+                      </a:r>
+                    </a:p>
+                  </a:txBody>
+                  <a:tcPr/>
+                </a:tc>
+                <a:tc>
+                  <a:txBody>
+                    <a:bodyPr/>
+                    <a:lstStyle/>
+                    <a:p>
+                      <a:r>
+                        <a:rPr lang="en-US" sz="1500" dirty="0"/>
+                        <a:t>One-Sample Sign Test</a:t>
+                      </a:r>
+                    </a:p>
+                  </a:txBody>
+                  <a:tcPr/>
+                </a:tc>
+                <a:tc>
+                  <a:txBody>
+                    <a:bodyPr/>
+                    <a:lstStyle/>
+                    <a:p>
+                      <a:r>
+                        <a:rPr lang="en-US" sz="1500" dirty="0"/>
+                        <a:t>One-Sample </a:t>
+                      </a:r>
+                      <a:r>
+                        <a:rPr lang="en-US" sz="1500" i="1" dirty="0"/>
+                        <a:t>t</a:t>
+                      </a:r>
+                      <a:r>
+                        <a:rPr lang="en-US" sz="1500" dirty="0"/>
+                        <a:t>-test</a:t>
+                      </a:r>
+                    </a:p>
+                  </a:txBody>
+                  <a:tcPr/>
+                </a:tc>
+                <a:extLst>
+                  <a:ext uri="{0D108BD9-81ED-4DB2-BD59-A6C34878D82A}">
+                    <a16:rowId xmlns:a16="http://schemas.microsoft.com/office/drawing/2014/main" val="4052663564"/>
+                  </a:ext>
+                </a:extLst>
+              </a:tr>
+              <a:tr h="370840">
+                <a:tc>
+                  <a:txBody>
+                    <a:bodyPr/>
+                    <a:lstStyle/>
+                    <a:p>
+                      <a:r>
+                        <a:rPr lang="en-US" sz="1500" dirty="0"/>
+                        <a:t>2</a:t>
+                      </a:r>
+                    </a:p>
+                  </a:txBody>
+                  <a:tcPr/>
+                </a:tc>
+                <a:tc>
+                  <a:txBody>
+                    <a:bodyPr/>
+                    <a:lstStyle/>
+                    <a:p>
+                      <a:r>
+                        <a:rPr lang="en-US" sz="1300" dirty="0" err="1">
+                          <a:solidFill>
+                            <a:srgbClr val="545454"/>
+                          </a:solidFill>
+                          <a:latin typeface="Lucida Console" panose="020B0609040504020204" pitchFamily="49" charset="0"/>
+                        </a:rPr>
+                        <a:t>HDIindex</a:t>
+                      </a:r>
+                      <a:r>
+                        <a:rPr lang="en-US" sz="1300" dirty="0">
+                          <a:solidFill>
+                            <a:schemeClr val="tx1"/>
+                          </a:solidFill>
+                          <a:latin typeface="+mn-lt"/>
+                        </a:rPr>
+                        <a:t>, </a:t>
+                      </a:r>
+                      <a:r>
+                        <a:rPr lang="en-US" sz="1300" dirty="0">
+                          <a:solidFill>
+                            <a:srgbClr val="545454"/>
+                          </a:solidFill>
+                          <a:latin typeface="Lucida Console" panose="020B0609040504020204" pitchFamily="49" charset="0"/>
+                        </a:rPr>
+                        <a:t>SPI</a:t>
+                      </a:r>
+                    </a:p>
+                  </a:txBody>
+                  <a:tcPr/>
+                </a:tc>
+                <a:tc>
+                  <a:txBody>
+                    <a:bodyPr/>
+                    <a:lstStyle/>
+                    <a:p>
+                      <a:r>
+                        <a:rPr lang="en-US" sz="1500" dirty="0"/>
+                        <a:t>Human development and social progress are not associated</a:t>
+                      </a:r>
+                    </a:p>
+                  </a:txBody>
+                  <a:tcPr/>
+                </a:tc>
+                <a:tc>
+                  <a:txBody>
+                    <a:bodyPr/>
+                    <a:lstStyle/>
+                    <a:p>
+                      <a:r>
+                        <a:rPr lang="en-US" sz="1500" dirty="0"/>
+                        <a:t>Human development and social progress are correlated</a:t>
+                      </a:r>
+                    </a:p>
+                  </a:txBody>
+                  <a:tcPr/>
+                </a:tc>
+                <a:tc>
+                  <a:txBody>
+                    <a:bodyPr/>
+                    <a:lstStyle/>
+                    <a:p>
+                      <a:r>
+                        <a:rPr lang="en-US" sz="1500" dirty="0"/>
+                        <a:t>Kendall’s Tau</a:t>
+                      </a:r>
+                      <a:endParaRPr lang="en-US" sz="1500" dirty="0">
+                        <a:solidFill>
+                          <a:srgbClr val="FF0000"/>
+                        </a:solidFill>
+                      </a:endParaRPr>
+                    </a:p>
+                  </a:txBody>
+                  <a:tcPr/>
+                </a:tc>
+                <a:tc>
+                  <a:txBody>
+                    <a:bodyPr/>
+                    <a:lstStyle/>
+                    <a:p>
+                      <a:r>
+                        <a:rPr lang="en-US" sz="1500" dirty="0"/>
+                        <a:t>Pearson’s Correlation Test</a:t>
+                      </a:r>
+                    </a:p>
+                  </a:txBody>
+                  <a:tcPr/>
+                </a:tc>
+                <a:extLst>
+                  <a:ext uri="{0D108BD9-81ED-4DB2-BD59-A6C34878D82A}">
+                    <a16:rowId xmlns:a16="http://schemas.microsoft.com/office/drawing/2014/main" val="2133545750"/>
+                  </a:ext>
+                </a:extLst>
+              </a:tr>
+              <a:tr h="370840">
+                <a:tc>
+                  <a:txBody>
+                    <a:bodyPr/>
+                    <a:lstStyle/>
+                    <a:p>
+                      <a:r>
+                        <a:rPr lang="en-US" sz="1500" dirty="0"/>
+                        <a:t>3</a:t>
+                      </a:r>
+                    </a:p>
+                  </a:txBody>
+                  <a:tcPr/>
+                </a:tc>
+                <a:tc>
+                  <a:txBody>
+                    <a:bodyPr/>
+                    <a:lstStyle/>
+                    <a:p>
+                      <a:r>
+                        <a:rPr lang="en-US" sz="1300" dirty="0" err="1">
+                          <a:solidFill>
+                            <a:srgbClr val="545454"/>
+                          </a:solidFill>
+                          <a:latin typeface="Lucida Console" panose="020B0609040504020204" pitchFamily="49" charset="0"/>
+                        </a:rPr>
+                        <a:t>logGDP</a:t>
+                      </a:r>
+                      <a:r>
+                        <a:rPr lang="en-US" sz="1300" dirty="0">
+                          <a:solidFill>
+                            <a:schemeClr val="tx1"/>
+                          </a:solidFill>
+                          <a:latin typeface="+mn-lt"/>
+                        </a:rPr>
+                        <a:t>, </a:t>
+                      </a:r>
+                      <a:r>
+                        <a:rPr lang="en-US" sz="1300" dirty="0" err="1">
+                          <a:solidFill>
+                            <a:srgbClr val="545454"/>
+                          </a:solidFill>
+                          <a:latin typeface="Lucida Console" panose="020B0609040504020204" pitchFamily="49" charset="0"/>
+                        </a:rPr>
+                        <a:t>gendereq</a:t>
+                      </a:r>
+                      <a:endParaRPr lang="en-US" sz="1300" dirty="0">
+                        <a:solidFill>
+                          <a:srgbClr val="545454"/>
+                        </a:solidFill>
+                        <a:latin typeface="Lucida Console" panose="020B0609040504020204" pitchFamily="49" charset="0"/>
+                      </a:endParaRPr>
+                    </a:p>
+                  </a:txBody>
+                  <a:tcPr/>
+                </a:tc>
+                <a:tc>
+                  <a:txBody>
+                    <a:bodyPr/>
+                    <a:lstStyle/>
+                    <a:p>
+                      <a:r>
+                        <a:rPr lang="en-US" sz="1500" dirty="0"/>
+                        <a:t>There is no relationship between log(GDP) and gender equality index</a:t>
+                      </a:r>
+                    </a:p>
+                  </a:txBody>
+                  <a:tcPr/>
+                </a:tc>
+                <a:tc>
+                  <a:txBody>
+                    <a:bodyPr/>
+                    <a:lstStyle/>
+                    <a:p>
+                      <a:r>
+                        <a:rPr lang="en-US" sz="1500" dirty="0"/>
+                        <a:t>There is a relationship between log(GDP) and gender equality index</a:t>
+                      </a:r>
+                      <a:endParaRPr lang="en-US" sz="1500" dirty="0">
+                        <a:solidFill>
+                          <a:srgbClr val="FF0000"/>
+                        </a:solidFill>
+                      </a:endParaRPr>
+                    </a:p>
+                  </a:txBody>
+                  <a:tcPr/>
+                </a:tc>
+                <a:tc>
+                  <a:txBody>
+                    <a:bodyPr/>
+                    <a:lstStyle/>
+                    <a:p>
+                      <a:r>
+                        <a:rPr lang="en-US" sz="1500" dirty="0" err="1"/>
+                        <a:t>Hoeffding’s</a:t>
+                      </a:r>
+                      <a:r>
+                        <a:rPr lang="en-US" sz="1500" dirty="0"/>
+                        <a:t> Test</a:t>
+                      </a:r>
+                    </a:p>
+                  </a:txBody>
+                  <a:tcPr/>
+                </a:tc>
+                <a:tc>
+                  <a:txBody>
+                    <a:bodyPr/>
+                    <a:lstStyle/>
+                    <a:p>
+                      <a:r>
+                        <a:rPr lang="en-US" sz="1500" dirty="0"/>
+                        <a:t>Pearson’s Correlation Test</a:t>
+                      </a:r>
+                    </a:p>
+                  </a:txBody>
+                  <a:tcPr/>
+                </a:tc>
+                <a:extLst>
+                  <a:ext uri="{0D108BD9-81ED-4DB2-BD59-A6C34878D82A}">
+                    <a16:rowId xmlns:a16="http://schemas.microsoft.com/office/drawing/2014/main" val="2550345065"/>
+                  </a:ext>
+                </a:extLst>
+              </a:tr>
+              <a:tr h="370840">
+                <a:tc>
+                  <a:txBody>
+                    <a:bodyPr/>
+                    <a:lstStyle/>
+                    <a:p>
+                      <a:r>
+                        <a:rPr lang="en-US" sz="1500" dirty="0"/>
+                        <a:t>4</a:t>
+                      </a:r>
+                    </a:p>
+                  </a:txBody>
+                  <a:tcPr/>
+                </a:tc>
+                <a:tc>
+                  <a:txBody>
+                    <a:bodyPr/>
+                    <a:lstStyle/>
+                    <a:p>
+                      <a:r>
+                        <a:rPr lang="en-US" sz="1300" dirty="0">
+                          <a:solidFill>
+                            <a:srgbClr val="545454"/>
+                          </a:solidFill>
+                          <a:latin typeface="Lucida Console" panose="020B0609040504020204" pitchFamily="49" charset="0"/>
+                        </a:rPr>
+                        <a:t>happiness</a:t>
+                      </a:r>
+                    </a:p>
+                  </a:txBody>
+                  <a:tcPr/>
+                </a:tc>
+                <a:tc>
+                  <a:txBody>
+                    <a:bodyPr/>
+                    <a:lstStyle/>
+                    <a:p>
+                      <a:r>
+                        <a:rPr lang="en-US" sz="1500" dirty="0"/>
+                        <a:t>Happiness is normally distributed</a:t>
+                      </a:r>
+                    </a:p>
+                  </a:txBody>
+                  <a:tcPr/>
+                </a:tc>
+                <a:tc>
+                  <a:txBody>
+                    <a:bodyPr/>
+                    <a:lstStyle/>
+                    <a:p>
+                      <a:r>
+                        <a:rPr lang="en-US" sz="1500" dirty="0"/>
+                        <a:t>Happiness is not normally distributed</a:t>
+                      </a:r>
+                    </a:p>
+                  </a:txBody>
+                  <a:tcPr/>
+                </a:tc>
+                <a:tc>
+                  <a:txBody>
+                    <a:bodyPr/>
+                    <a:lstStyle/>
+                    <a:p>
+                      <a:r>
+                        <a:rPr lang="en-US" sz="1500" dirty="0"/>
+                        <a:t>Lilliefors Test for Normality (a type of one-sample Kolmogorov-Smirnov test)</a:t>
+                      </a:r>
+                      <a:endParaRPr lang="en-US" sz="1500" dirty="0">
+                        <a:solidFill>
+                          <a:srgbClr val="FF0000"/>
+                        </a:solidFill>
+                      </a:endParaRPr>
+                    </a:p>
+                  </a:txBody>
+                  <a:tcPr/>
+                </a:tc>
+                <a:tc>
+                  <a:txBody>
+                    <a:bodyPr/>
+                    <a:lstStyle/>
+                    <a:p>
+                      <a:r>
+                        <a:rPr lang="en-US" sz="1500" dirty="0"/>
+                        <a:t>Shapiro-Wilk Test</a:t>
+                      </a:r>
+                    </a:p>
+                  </a:txBody>
+                  <a:tcPr/>
+                </a:tc>
+                <a:extLst>
+                  <a:ext uri="{0D108BD9-81ED-4DB2-BD59-A6C34878D82A}">
+                    <a16:rowId xmlns:a16="http://schemas.microsoft.com/office/drawing/2014/main" val="1591929313"/>
+                  </a:ext>
+                </a:extLst>
+              </a:tr>
+              <a:tr h="370840">
+                <a:tc>
+                  <a:txBody>
+                    <a:bodyPr/>
+                    <a:lstStyle/>
+                    <a:p>
+                      <a:r>
+                        <a:rPr lang="en-US" sz="1500" dirty="0"/>
+                        <a:t>5</a:t>
+                      </a:r>
+                    </a:p>
+                  </a:txBody>
+                  <a:tcPr/>
+                </a:tc>
+                <a:tc>
+                  <a:txBody>
+                    <a:bodyPr/>
+                    <a:lstStyle/>
+                    <a:p>
+                      <a:r>
+                        <a:rPr lang="en-US" sz="1300" dirty="0" err="1">
+                          <a:solidFill>
+                            <a:srgbClr val="545454"/>
+                          </a:solidFill>
+                          <a:latin typeface="Lucida Console" panose="020B0609040504020204" pitchFamily="49" charset="0"/>
+                        </a:rPr>
+                        <a:t>HDI_cat</a:t>
+                      </a:r>
+                      <a:r>
+                        <a:rPr lang="en-US" sz="1500" dirty="0">
+                          <a:solidFill>
+                            <a:schemeClr val="tx1"/>
+                          </a:solidFill>
+                          <a:latin typeface="+mn-lt"/>
+                        </a:rPr>
+                        <a:t>, log(</a:t>
+                      </a:r>
+                      <a:r>
+                        <a:rPr lang="en-US" sz="1300" dirty="0" err="1">
+                          <a:solidFill>
+                            <a:srgbClr val="545454"/>
+                          </a:solidFill>
+                          <a:latin typeface="Lucida Console" panose="020B0609040504020204" pitchFamily="49" charset="0"/>
+                        </a:rPr>
+                        <a:t>infantmort</a:t>
+                      </a:r>
+                      <a:r>
+                        <a:rPr lang="en-US" sz="1500" dirty="0">
+                          <a:solidFill>
+                            <a:schemeClr val="tx1"/>
+                          </a:solidFill>
+                          <a:latin typeface="+mn-lt"/>
+                        </a:rPr>
+                        <a:t>)</a:t>
+                      </a:r>
+                      <a:endParaRPr lang="en-US" sz="1500" dirty="0">
+                        <a:solidFill>
+                          <a:srgbClr val="545454"/>
+                        </a:solidFill>
+                        <a:latin typeface="Lucida Console" panose="020B0609040504020204" pitchFamily="49" charset="0"/>
+                      </a:endParaRPr>
+                    </a:p>
+                  </a:txBody>
+                  <a:tcPr/>
+                </a:tc>
+                <a:tc>
+                  <a:txBody>
+                    <a:bodyPr/>
+                    <a:lstStyle/>
+                    <a:p>
+                      <a:r>
+                        <a:rPr lang="en-US" sz="1500" dirty="0"/>
+                        <a:t>Log infant mortality rate is the same across human development categories</a:t>
+                      </a:r>
+                    </a:p>
+                  </a:txBody>
+                  <a:tcPr/>
+                </a:tc>
+                <a:tc>
+                  <a:txBody>
+                    <a:bodyPr/>
+                    <a:lstStyle/>
+                    <a:p>
+                      <a:r>
+                        <a:rPr lang="en-US" sz="1500" dirty="0"/>
+                        <a:t>Log infant mortality rate differs by human development category</a:t>
+                      </a:r>
+                      <a:endParaRPr lang="en-US" sz="1500" dirty="0">
+                        <a:solidFill>
+                          <a:srgbClr val="FF0000"/>
+                        </a:solidFill>
+                      </a:endParaRPr>
+                    </a:p>
+                  </a:txBody>
+                  <a:tcPr/>
+                </a:tc>
+                <a:tc>
+                  <a:txBody>
+                    <a:bodyPr/>
+                    <a:lstStyle/>
+                    <a:p>
+                      <a:r>
+                        <a:rPr lang="en-US" sz="1500" dirty="0"/>
+                        <a:t>Permutation F-Test</a:t>
+                      </a:r>
+                    </a:p>
+                  </a:txBody>
+                  <a:tcPr/>
+                </a:tc>
+                <a:tc>
+                  <a:txBody>
+                    <a:bodyPr/>
+                    <a:lstStyle/>
+                    <a:p>
+                      <a:r>
+                        <a:rPr lang="en-US" sz="1500" dirty="0"/>
+                        <a:t>ANOVA</a:t>
+                      </a:r>
+                    </a:p>
+                  </a:txBody>
+                  <a:tcPr/>
+                </a:tc>
+                <a:extLst>
+                  <a:ext uri="{0D108BD9-81ED-4DB2-BD59-A6C34878D82A}">
+                    <a16:rowId xmlns:a16="http://schemas.microsoft.com/office/drawing/2014/main" val="3210183669"/>
+                  </a:ext>
+                </a:extLst>
+              </a:tr>
+            </a:tbl>
+          </a:graphicData>
+        </a:graphic>
+      </p:graphicFrame>
     </p:spTree>
     <p:extLst>
       <p:ext uri="{BB962C8B-B14F-4D97-AF65-F5344CB8AC3E}">
-        <p14:creationId xmlns:p14="http://schemas.microsoft.com/office/powerpoint/2010/main" val="3956234319"/>
+        <p14:creationId xmlns:p14="http://schemas.microsoft.com/office/powerpoint/2010/main" val="2107817399"/>
       </p:ext>
     </p:extLst>
   </p:cSld>
@@ -4113,7 +4765,7 @@
           <a:p>
             <a:r>
               <a:rPr lang="en-US" dirty="0"/>
-              <a:t>SELECTED RESULTS: ANALYSIS 5</a:t>
+              <a:t>SELECTED RESULTS: ANALYSIS 4</a:t>
             </a:r>
           </a:p>
         </p:txBody>
@@ -4137,39 +4789,26 @@
         <p:spPr/>
         <p:txBody>
           <a:bodyPr>
-            <a:normAutofit fontScale="85000" lnSpcReduction="20000"/>
+            <a:normAutofit fontScale="92500" lnSpcReduction="20000"/>
           </a:bodyPr>
           <a:lstStyle/>
           <a:p>
             <a:r>
               <a:rPr lang="en-US" dirty="0"/>
-              <a:t>Testing for difference in </a:t>
-            </a:r>
-            <a:r>
-              <a:rPr lang="en-US" sz="2400" dirty="0" err="1">
+              <a:t>Testing for normality of </a:t>
+            </a:r>
+            <a:r>
+              <a:rPr lang="en-US" sz="2400" dirty="0">
                 <a:solidFill>
                   <a:srgbClr val="545454"/>
                 </a:solidFill>
                 <a:latin typeface="Lucida Console" panose="020B0609040504020204" pitchFamily="49" charset="0"/>
               </a:rPr>
-              <a:t>infantmort</a:t>
+              <a:t>happiness</a:t>
             </a:r>
             <a:r>
               <a:rPr lang="en-US" dirty="0"/>
-              <a:t> across levels of </a:t>
-            </a:r>
-            <a:r>
-              <a:rPr lang="en-US" sz="2400" dirty="0" err="1">
-                <a:solidFill>
-                  <a:srgbClr val="545454"/>
-                </a:solidFill>
-                <a:latin typeface="Lucida Console" panose="020B0609040504020204" pitchFamily="49" charset="0"/>
-              </a:rPr>
-              <a:t>HDI_cat</a:t>
-            </a:r>
-            <a:r>
-              <a:rPr lang="en-US" dirty="0"/>
-              <a:t> via permutation F-test (nonparametric) vs ANOVA (parametric)</a:t>
+              <a:t> via one-sample Kolmogorov-Smirnov (nonparametric) vs Shapiro-Wilk (parametric)</a:t>
             </a:r>
           </a:p>
           <a:p>
@@ -4180,28 +4819,52 @@
             </a:r>
           </a:p>
           <a:p>
-            <a:pPr lvl="1"/>
             <a:endParaRPr lang="en-US" dirty="0"/>
           </a:p>
           <a:p>
-            <a:pPr lvl="1"/>
+            <a:pPr marL="0" indent="0">
+              <a:buNone/>
+            </a:pPr>
             <a:endParaRPr lang="en-US" dirty="0"/>
           </a:p>
           <a:p>
-            <a:endParaRPr lang="en-US" dirty="0"/>
-          </a:p>
-          <a:p>
+            <a:r>
+              <a:rPr lang="en-US" i="1" dirty="0" err="1"/>
+              <a:t>p</a:t>
+            </a:r>
+            <a:r>
+              <a:rPr lang="en-US" i="1" baseline="-25000" dirty="0" err="1"/>
+              <a:t>KS</a:t>
+            </a:r>
             <a:r>
               <a:rPr lang="en-US" dirty="0"/>
-              <a:t>Both tests yielded </a:t>
-            </a:r>
-            <a:r>
-              <a:rPr lang="en-US" i="1" dirty="0"/>
+              <a:t> = 0.915 and </a:t>
+            </a:r>
+            <a:r>
+              <a:rPr lang="en-US" i="1" dirty="0" err="1"/>
               <a:t>p</a:t>
             </a:r>
             <a:r>
+              <a:rPr lang="en-US" i="1" baseline="-25000" dirty="0" err="1"/>
+              <a:t>SW</a:t>
+            </a:r>
+            <a:r>
               <a:rPr lang="en-US" dirty="0"/>
-              <a:t> &lt; 0.001, leading to rejection of </a:t>
+              <a:t> = 0.129</a:t>
+            </a:r>
+          </a:p>
+          <a:p>
+            <a:r>
+              <a:rPr lang="en-US" dirty="0"/>
+              <a:t>Both exceed </a:t>
+            </a:r>
+            <a:r>
+              <a:rPr lang="el-GR" i="1" dirty="0"/>
+              <a:t>α</a:t>
+            </a:r>
+            <a:r>
+              <a:rPr lang="en-US" dirty="0"/>
+              <a:t> so </a:t>
             </a:r>
             <a:r>
               <a:rPr lang="en-US" dirty="0">
@@ -4221,64 +4884,79 @@
             </a:r>
             <a:r>
               <a:rPr lang="en-US" dirty="0"/>
-              <a:t> in both cases</a:t>
+              <a:t> is retained for both tests</a:t>
             </a:r>
           </a:p>
           <a:p>
             <a:pPr lvl="1"/>
             <a:r>
               <a:rPr lang="en-US" dirty="0"/>
-              <a:t>Conclusion:  at the </a:t>
-            </a:r>
-            <a:r>
-              <a:rPr lang="el-GR" i="1" dirty="0"/>
-              <a:t>α</a:t>
-            </a:r>
+              <a:t>Conclusion:  there is insufficient evidence to assert that the happiness score is not normally distributed</a:t>
+            </a:r>
+          </a:p>
+          <a:p>
             <a:r>
               <a:rPr lang="en-US" dirty="0"/>
-              <a:t> = 0.05 level, there is evidence of a difference in infant mortality rate across human development categories</a:t>
-            </a:r>
-          </a:p>
-          <a:p>
+              <a:t>Both tests assume a continuous distribution</a:t>
+            </a:r>
+          </a:p>
+          <a:p>
+            <a:pPr lvl="1"/>
             <a:r>
               <a:rPr lang="en-US" dirty="0"/>
-              <a:t>Both tests assume independence</a:t>
-            </a:r>
+              <a:t>Satisfied by the data ∴ both approaches are acceptable</a:t>
+            </a:r>
+          </a:p>
+          <a:p>
+            <a:r>
+              <a:rPr lang="en-US" dirty="0"/>
+              <a:t>Although neither </a:t>
+            </a:r>
+            <a:r>
+              <a:rPr lang="en-US" i="1" dirty="0"/>
+              <a:t>p</a:t>
+            </a:r>
+            <a:r>
+              <a:rPr lang="en-US" dirty="0"/>
+              <a:t>-value is significant, </a:t>
+            </a:r>
+            <a:r>
+              <a:rPr lang="en-US" i="1" dirty="0" err="1"/>
+              <a:t>p</a:t>
+            </a:r>
+            <a:r>
+              <a:rPr lang="en-US" i="1" baseline="-25000" dirty="0" err="1"/>
+              <a:t>SW</a:t>
+            </a:r>
+            <a:r>
+              <a:rPr lang="en-US" dirty="0"/>
+              <a:t> is much smaller than </a:t>
+            </a:r>
+            <a:r>
+              <a:rPr lang="en-US" i="1" dirty="0" err="1"/>
+              <a:t>p</a:t>
+            </a:r>
+            <a:r>
+              <a:rPr lang="en-US" i="1" baseline="-25000" dirty="0" err="1"/>
+              <a:t>KS</a:t>
+            </a:r>
+            <a:endParaRPr lang="en-US" dirty="0"/>
           </a:p>
           <a:p>
             <a:pPr lvl="1"/>
             <a:r>
               <a:rPr lang="en-US" dirty="0"/>
-              <a:t>Satisfied by the data</a:t>
-            </a:r>
-          </a:p>
-          <a:p>
-            <a:r>
-              <a:rPr lang="en-US" dirty="0"/>
-              <a:t>ANOVA assumes constant variance and normality</a:t>
-            </a:r>
-          </a:p>
-          <a:p>
-            <a:pPr lvl="1"/>
-            <a:r>
-              <a:rPr lang="en-US" dirty="0"/>
-              <a:t>Violated (see next slide)</a:t>
-            </a:r>
-          </a:p>
-          <a:p>
-            <a:r>
-              <a:rPr lang="en-US" dirty="0"/>
-              <a:t>The parametric method is inappropriate in this case but the nonparametric approach works</a:t>
-            </a:r>
-          </a:p>
-        </p:txBody>
-      </p:sp>
-      <p:sp>
-        <p:nvSpPr>
-          <p:cNvPr id="4" name="TextBox 3">
+              <a:t>KS test may be less sensitive to deviations from normality</a:t>
+            </a:r>
+          </a:p>
+        </p:txBody>
+      </p:sp>
+      <p:sp>
+        <p:nvSpPr>
+          <p:cNvPr id="5" name="TextBox 4">
             <a:extLst>
               <a:ext uri="{FF2B5EF4-FFF2-40B4-BE49-F238E27FC236}">
-                <a16:creationId xmlns:a16="http://schemas.microsoft.com/office/drawing/2014/main" id="{86D98678-2787-42A6-954F-48747D9AE0C6}"/>
+                <a16:creationId xmlns:a16="http://schemas.microsoft.com/office/drawing/2014/main" id="{25C33BF1-66AB-468F-B174-C14F6571B331}"/>
               </a:ext>
             </a:extLst>
           </p:cNvPr>
@@ -4315,6 +4993,647 @@
                 </a:solidFill>
                 <a:latin typeface="Lucida Console" panose="020B0609040504020204" pitchFamily="49" charset="0"/>
               </a:rPr>
+              <a:t>analysis4_nonpara </a:t>
+            </a:r>
+            <a:r>
+              <a:rPr lang="en-US" sz="1200" dirty="0">
+                <a:solidFill>
+                  <a:schemeClr val="accent1"/>
+                </a:solidFill>
+                <a:latin typeface="Lucida Console" panose="020B0609040504020204" pitchFamily="49" charset="0"/>
+              </a:rPr>
+              <a:t>&lt;-</a:t>
+            </a:r>
+            <a:r>
+              <a:rPr lang="en-US" sz="1200" dirty="0">
+                <a:solidFill>
+                  <a:schemeClr val="bg1"/>
+                </a:solidFill>
+                <a:latin typeface="Lucida Console" panose="020B0609040504020204" pitchFamily="49" charset="0"/>
+              </a:rPr>
+              <a:t> </a:t>
+            </a:r>
+            <a:r>
+              <a:rPr lang="en-US" sz="1200" dirty="0" err="1">
+                <a:solidFill>
+                  <a:schemeClr val="bg1"/>
+                </a:solidFill>
+                <a:latin typeface="Lucida Console" panose="020B0609040504020204" pitchFamily="49" charset="0"/>
+              </a:rPr>
+              <a:t>ks.test</a:t>
+            </a:r>
+            <a:r>
+              <a:rPr lang="en-US" sz="1200" dirty="0">
+                <a:solidFill>
+                  <a:schemeClr val="accent1"/>
+                </a:solidFill>
+                <a:latin typeface="Lucida Console" panose="020B0609040504020204" pitchFamily="49" charset="0"/>
+              </a:rPr>
+              <a:t>(</a:t>
+            </a:r>
+            <a:r>
+              <a:rPr lang="en-US" sz="1200" dirty="0" err="1">
+                <a:solidFill>
+                  <a:schemeClr val="bg1"/>
+                </a:solidFill>
+                <a:latin typeface="Lucida Console" panose="020B0609040504020204" pitchFamily="49" charset="0"/>
+              </a:rPr>
+              <a:t>alldata</a:t>
+            </a:r>
+            <a:r>
+              <a:rPr lang="en-US" sz="1200" dirty="0" err="1">
+                <a:solidFill>
+                  <a:schemeClr val="accent1"/>
+                </a:solidFill>
+                <a:latin typeface="Lucida Console" panose="020B0609040504020204" pitchFamily="49" charset="0"/>
+              </a:rPr>
+              <a:t>$</a:t>
+            </a:r>
+            <a:r>
+              <a:rPr lang="en-US" sz="1200" dirty="0" err="1">
+                <a:solidFill>
+                  <a:schemeClr val="bg1"/>
+                </a:solidFill>
+                <a:latin typeface="Lucida Console" panose="020B0609040504020204" pitchFamily="49" charset="0"/>
+              </a:rPr>
+              <a:t>happiness</a:t>
+            </a:r>
+            <a:r>
+              <a:rPr lang="en-US" sz="1200" dirty="0">
+                <a:solidFill>
+                  <a:schemeClr val="bg1"/>
+                </a:solidFill>
+                <a:latin typeface="Lucida Console" panose="020B0609040504020204" pitchFamily="49" charset="0"/>
+              </a:rPr>
+              <a:t>, </a:t>
+            </a:r>
+            <a:r>
+              <a:rPr lang="en-US" sz="1200" dirty="0">
+                <a:solidFill>
+                  <a:schemeClr val="accent6">
+                    <a:lumMod val="40000"/>
+                    <a:lumOff val="60000"/>
+                  </a:schemeClr>
+                </a:solidFill>
+                <a:latin typeface="Lucida Console" panose="020B0609040504020204" pitchFamily="49" charset="0"/>
+              </a:rPr>
+              <a:t>"</a:t>
+            </a:r>
+            <a:r>
+              <a:rPr lang="en-US" sz="1200" dirty="0" err="1">
+                <a:solidFill>
+                  <a:schemeClr val="accent6">
+                    <a:lumMod val="40000"/>
+                    <a:lumOff val="60000"/>
+                  </a:schemeClr>
+                </a:solidFill>
+                <a:latin typeface="Lucida Console" panose="020B0609040504020204" pitchFamily="49" charset="0"/>
+              </a:rPr>
+              <a:t>pnorm</a:t>
+            </a:r>
+            <a:r>
+              <a:rPr lang="en-US" sz="1200" dirty="0">
+                <a:solidFill>
+                  <a:schemeClr val="accent6">
+                    <a:lumMod val="40000"/>
+                    <a:lumOff val="60000"/>
+                  </a:schemeClr>
+                </a:solidFill>
+                <a:latin typeface="Lucida Console" panose="020B0609040504020204" pitchFamily="49" charset="0"/>
+              </a:rPr>
+              <a:t>"</a:t>
+            </a:r>
+            <a:r>
+              <a:rPr lang="en-US" sz="1200" dirty="0">
+                <a:solidFill>
+                  <a:schemeClr val="bg1"/>
+                </a:solidFill>
+                <a:latin typeface="Lucida Console" panose="020B0609040504020204" pitchFamily="49" charset="0"/>
+              </a:rPr>
+              <a:t>, mean</a:t>
+            </a:r>
+            <a:r>
+              <a:rPr lang="en-US" sz="1200" dirty="0">
+                <a:solidFill>
+                  <a:schemeClr val="accent1"/>
+                </a:solidFill>
+                <a:latin typeface="Lucida Console" panose="020B0609040504020204" pitchFamily="49" charset="0"/>
+              </a:rPr>
+              <a:t>(</a:t>
+            </a:r>
+            <a:r>
+              <a:rPr lang="en-US" sz="1200" dirty="0" err="1">
+                <a:solidFill>
+                  <a:schemeClr val="bg1"/>
+                </a:solidFill>
+                <a:latin typeface="Lucida Console" panose="020B0609040504020204" pitchFamily="49" charset="0"/>
+              </a:rPr>
+              <a:t>alldata$happiness</a:t>
+            </a:r>
+            <a:r>
+              <a:rPr lang="en-US" sz="1200" dirty="0">
+                <a:solidFill>
+                  <a:schemeClr val="accent1"/>
+                </a:solidFill>
+                <a:latin typeface="Lucida Console" panose="020B0609040504020204" pitchFamily="49" charset="0"/>
+              </a:rPr>
+              <a:t>)</a:t>
+            </a:r>
+            <a:r>
+              <a:rPr lang="en-US" sz="1200" dirty="0">
+                <a:solidFill>
+                  <a:schemeClr val="bg1"/>
+                </a:solidFill>
+                <a:latin typeface="Lucida Console" panose="020B0609040504020204" pitchFamily="49" charset="0"/>
+              </a:rPr>
+              <a:t>, </a:t>
+            </a:r>
+            <a:r>
+              <a:rPr lang="en-US" sz="1200" dirty="0" err="1">
+                <a:solidFill>
+                  <a:schemeClr val="bg1"/>
+                </a:solidFill>
+                <a:latin typeface="Lucida Console" panose="020B0609040504020204" pitchFamily="49" charset="0"/>
+              </a:rPr>
+              <a:t>sd</a:t>
+            </a:r>
+            <a:r>
+              <a:rPr lang="en-US" sz="1200" dirty="0">
+                <a:solidFill>
+                  <a:schemeClr val="accent1"/>
+                </a:solidFill>
+                <a:latin typeface="Lucida Console" panose="020B0609040504020204" pitchFamily="49" charset="0"/>
+              </a:rPr>
+              <a:t>(</a:t>
+            </a:r>
+            <a:r>
+              <a:rPr lang="en-US" sz="1200" dirty="0" err="1">
+                <a:solidFill>
+                  <a:schemeClr val="bg1"/>
+                </a:solidFill>
+                <a:latin typeface="Lucida Console" panose="020B0609040504020204" pitchFamily="49" charset="0"/>
+              </a:rPr>
+              <a:t>alldata</a:t>
+            </a:r>
+            <a:r>
+              <a:rPr lang="en-US" sz="1200" dirty="0" err="1">
+                <a:solidFill>
+                  <a:schemeClr val="accent1"/>
+                </a:solidFill>
+                <a:latin typeface="Lucida Console" panose="020B0609040504020204" pitchFamily="49" charset="0"/>
+              </a:rPr>
+              <a:t>$</a:t>
+            </a:r>
+            <a:r>
+              <a:rPr lang="en-US" sz="1200" dirty="0" err="1">
+                <a:solidFill>
+                  <a:schemeClr val="bg1"/>
+                </a:solidFill>
+                <a:latin typeface="Lucida Console" panose="020B0609040504020204" pitchFamily="49" charset="0"/>
+              </a:rPr>
+              <a:t>happiness</a:t>
+            </a:r>
+            <a:r>
+              <a:rPr lang="en-US" sz="1200" dirty="0">
+                <a:solidFill>
+                  <a:schemeClr val="accent1"/>
+                </a:solidFill>
+                <a:latin typeface="Lucida Console" panose="020B0609040504020204" pitchFamily="49" charset="0"/>
+              </a:rPr>
+              <a:t>))</a:t>
+            </a:r>
+          </a:p>
+          <a:p>
+            <a:endParaRPr lang="en-US" sz="1200" dirty="0">
+              <a:solidFill>
+                <a:schemeClr val="bg1"/>
+              </a:solidFill>
+              <a:latin typeface="Lucida Console" panose="020B0609040504020204" pitchFamily="49" charset="0"/>
+            </a:endParaRPr>
+          </a:p>
+          <a:p>
+            <a:r>
+              <a:rPr lang="en-US" sz="1200" dirty="0">
+                <a:solidFill>
+                  <a:schemeClr val="bg1"/>
+                </a:solidFill>
+                <a:latin typeface="Lucida Console" panose="020B0609040504020204" pitchFamily="49" charset="0"/>
+              </a:rPr>
+              <a:t>analysis4_para </a:t>
+            </a:r>
+            <a:r>
+              <a:rPr lang="en-US" sz="1200" dirty="0">
+                <a:solidFill>
+                  <a:schemeClr val="accent1"/>
+                </a:solidFill>
+                <a:latin typeface="Lucida Console" panose="020B0609040504020204" pitchFamily="49" charset="0"/>
+              </a:rPr>
+              <a:t>&lt;-</a:t>
+            </a:r>
+            <a:r>
+              <a:rPr lang="en-US" sz="1200" dirty="0">
+                <a:solidFill>
+                  <a:schemeClr val="bg1"/>
+                </a:solidFill>
+                <a:latin typeface="Lucida Console" panose="020B0609040504020204" pitchFamily="49" charset="0"/>
+              </a:rPr>
+              <a:t> </a:t>
+            </a:r>
+            <a:r>
+              <a:rPr lang="en-US" sz="1200" dirty="0" err="1">
+                <a:solidFill>
+                  <a:schemeClr val="bg1"/>
+                </a:solidFill>
+                <a:latin typeface="Lucida Console" panose="020B0609040504020204" pitchFamily="49" charset="0"/>
+              </a:rPr>
+              <a:t>shapiro.test</a:t>
+            </a:r>
+            <a:r>
+              <a:rPr lang="en-US" sz="1200" dirty="0">
+                <a:solidFill>
+                  <a:schemeClr val="accent1"/>
+                </a:solidFill>
+                <a:latin typeface="Lucida Console" panose="020B0609040504020204" pitchFamily="49" charset="0"/>
+              </a:rPr>
+              <a:t>(</a:t>
+            </a:r>
+            <a:r>
+              <a:rPr lang="en-US" sz="1200" dirty="0" err="1">
+                <a:solidFill>
+                  <a:schemeClr val="bg1"/>
+                </a:solidFill>
+                <a:latin typeface="Lucida Console" panose="020B0609040504020204" pitchFamily="49" charset="0"/>
+              </a:rPr>
+              <a:t>alldata</a:t>
+            </a:r>
+            <a:r>
+              <a:rPr lang="en-US" sz="1200" dirty="0" err="1">
+                <a:solidFill>
+                  <a:schemeClr val="accent1"/>
+                </a:solidFill>
+                <a:latin typeface="Lucida Console" panose="020B0609040504020204" pitchFamily="49" charset="0"/>
+              </a:rPr>
+              <a:t>$</a:t>
+            </a:r>
+            <a:r>
+              <a:rPr lang="en-US" sz="1200" dirty="0" err="1">
+                <a:solidFill>
+                  <a:schemeClr val="bg1"/>
+                </a:solidFill>
+                <a:latin typeface="Lucida Console" panose="020B0609040504020204" pitchFamily="49" charset="0"/>
+              </a:rPr>
+              <a:t>happiness</a:t>
+            </a:r>
+            <a:r>
+              <a:rPr lang="en-US" sz="1200" dirty="0">
+                <a:solidFill>
+                  <a:schemeClr val="accent1"/>
+                </a:solidFill>
+                <a:latin typeface="Lucida Console" panose="020B0609040504020204" pitchFamily="49" charset="0"/>
+              </a:rPr>
+              <a:t>)</a:t>
+            </a:r>
+          </a:p>
+        </p:txBody>
+      </p:sp>
+    </p:spTree>
+    <p:extLst>
+      <p:ext uri="{BB962C8B-B14F-4D97-AF65-F5344CB8AC3E}">
+        <p14:creationId xmlns:p14="http://schemas.microsoft.com/office/powerpoint/2010/main" val="870407094"/>
+      </p:ext>
+    </p:extLst>
+  </p:cSld>
+  <p:clrMapOvr>
+    <a:masterClrMapping/>
+  </p:clrMapOvr>
+</p:sld>
+</file>
+
+<file path=ppt/slides/slide12.xml><?xml version="1.0" encoding="utf-8"?>
+<p:sld xmlns:a="http://schemas.openxmlformats.org/drawingml/2006/main" xmlns:r="http://schemas.openxmlformats.org/officeDocument/2006/relationships" xmlns:p="http://schemas.openxmlformats.org/presentationml/2006/main">
+  <p:cSld>
+    <p:spTree>
+      <p:nvGrpSpPr>
+        <p:cNvPr id="1" name=""/>
+        <p:cNvGrpSpPr/>
+        <p:nvPr/>
+      </p:nvGrpSpPr>
+      <p:grpSpPr>
+        <a:xfrm>
+          <a:off x="0" y="0"/>
+          <a:ext cx="0" cy="0"/>
+          <a:chOff x="0" y="0"/>
+          <a:chExt cx="0" cy="0"/>
+        </a:xfrm>
+      </p:grpSpPr>
+      <p:sp>
+        <p:nvSpPr>
+          <p:cNvPr id="2" name="Title 1">
+            <a:extLst>
+              <a:ext uri="{FF2B5EF4-FFF2-40B4-BE49-F238E27FC236}">
+                <a16:creationId xmlns:a16="http://schemas.microsoft.com/office/drawing/2014/main" id="{9C375C1D-A60F-47D9-82DB-79EDD0A16512}"/>
+              </a:ext>
+            </a:extLst>
+          </p:cNvPr>
+          <p:cNvSpPr>
+            <a:spLocks noGrp="1"/>
+          </p:cNvSpPr>
+          <p:nvPr>
+            <p:ph type="title"/>
+          </p:nvPr>
+        </p:nvSpPr>
+        <p:spPr/>
+        <p:txBody>
+          <a:bodyPr/>
+          <a:lstStyle/>
+          <a:p>
+            <a:r>
+              <a:rPr lang="en-US" dirty="0"/>
+              <a:t>ANALYSIS 4</a:t>
+            </a:r>
+          </a:p>
+        </p:txBody>
+      </p:sp>
+      <p:sp>
+        <p:nvSpPr>
+          <p:cNvPr id="6" name="Content Placeholder 5">
+            <a:extLst>
+              <a:ext uri="{FF2B5EF4-FFF2-40B4-BE49-F238E27FC236}">
+                <a16:creationId xmlns:a16="http://schemas.microsoft.com/office/drawing/2014/main" id="{61C50387-F220-4361-AD1C-FE49784D7C6B}"/>
+              </a:ext>
+            </a:extLst>
+          </p:cNvPr>
+          <p:cNvSpPr>
+            <a:spLocks noGrp="1"/>
+          </p:cNvSpPr>
+          <p:nvPr>
+            <p:ph idx="1"/>
+          </p:nvPr>
+        </p:nvSpPr>
+        <p:spPr/>
+        <p:txBody>
+          <a:bodyPr/>
+          <a:lstStyle/>
+          <a:p>
+            <a:endParaRPr lang="en-US"/>
+          </a:p>
+        </p:txBody>
+      </p:sp>
+    </p:spTree>
+    <p:extLst>
+      <p:ext uri="{BB962C8B-B14F-4D97-AF65-F5344CB8AC3E}">
+        <p14:creationId xmlns:p14="http://schemas.microsoft.com/office/powerpoint/2010/main" val="3956234319"/>
+      </p:ext>
+    </p:extLst>
+  </p:cSld>
+  <p:clrMapOvr>
+    <a:masterClrMapping/>
+  </p:clrMapOvr>
+</p:sld>
+</file>
+
+<file path=ppt/slides/slide13.xml><?xml version="1.0" encoding="utf-8"?>
+<p:sld xmlns:a="http://schemas.openxmlformats.org/drawingml/2006/main" xmlns:r="http://schemas.openxmlformats.org/officeDocument/2006/relationships" xmlns:p="http://schemas.openxmlformats.org/presentationml/2006/main">
+  <p:cSld>
+    <p:spTree>
+      <p:nvGrpSpPr>
+        <p:cNvPr id="1" name=""/>
+        <p:cNvGrpSpPr/>
+        <p:nvPr/>
+      </p:nvGrpSpPr>
+      <p:grpSpPr>
+        <a:xfrm>
+          <a:off x="0" y="0"/>
+          <a:ext cx="0" cy="0"/>
+          <a:chOff x="0" y="0"/>
+          <a:chExt cx="0" cy="0"/>
+        </a:xfrm>
+      </p:grpSpPr>
+      <p:sp>
+        <p:nvSpPr>
+          <p:cNvPr id="2" name="Title 1">
+            <a:extLst>
+              <a:ext uri="{FF2B5EF4-FFF2-40B4-BE49-F238E27FC236}">
+                <a16:creationId xmlns:a16="http://schemas.microsoft.com/office/drawing/2014/main" id="{9C375C1D-A60F-47D9-82DB-79EDD0A16512}"/>
+              </a:ext>
+            </a:extLst>
+          </p:cNvPr>
+          <p:cNvSpPr>
+            <a:spLocks noGrp="1"/>
+          </p:cNvSpPr>
+          <p:nvPr>
+            <p:ph type="title"/>
+          </p:nvPr>
+        </p:nvSpPr>
+        <p:spPr/>
+        <p:txBody>
+          <a:bodyPr/>
+          <a:lstStyle/>
+          <a:p>
+            <a:r>
+              <a:rPr lang="en-US" dirty="0"/>
+              <a:t>SELECTED RESULTS: ANALYSIS 5</a:t>
+            </a:r>
+          </a:p>
+        </p:txBody>
+      </p:sp>
+      <p:sp>
+        <p:nvSpPr>
+          <p:cNvPr id="3" name="Content Placeholder 2">
+            <a:extLst>
+              <a:ext uri="{FF2B5EF4-FFF2-40B4-BE49-F238E27FC236}">
+                <a16:creationId xmlns:a16="http://schemas.microsoft.com/office/drawing/2014/main" id="{7A2BAD76-95DD-43BA-8566-7768201FE42A}"/>
+              </a:ext>
+            </a:extLst>
+          </p:cNvPr>
+          <p:cNvSpPr>
+            <a:spLocks noGrp="1"/>
+          </p:cNvSpPr>
+          <p:nvPr>
+            <p:ph idx="1"/>
+          </p:nvPr>
+        </p:nvSpPr>
+        <p:spPr/>
+        <p:txBody>
+          <a:bodyPr>
+            <a:normAutofit fontScale="85000" lnSpcReduction="20000"/>
+          </a:bodyPr>
+          <a:lstStyle/>
+          <a:p>
+            <a:r>
+              <a:rPr lang="en-US" dirty="0"/>
+              <a:t>Testing for difference in </a:t>
+            </a:r>
+            <a:r>
+              <a:rPr lang="en-US" sz="2400" dirty="0" err="1">
+                <a:solidFill>
+                  <a:srgbClr val="545454"/>
+                </a:solidFill>
+                <a:latin typeface="Lucida Console" panose="020B0609040504020204" pitchFamily="49" charset="0"/>
+              </a:rPr>
+              <a:t>infantmort</a:t>
+            </a:r>
+            <a:r>
+              <a:rPr lang="en-US" dirty="0"/>
+              <a:t> across levels of </a:t>
+            </a:r>
+            <a:r>
+              <a:rPr lang="en-US" sz="2400" dirty="0" err="1">
+                <a:solidFill>
+                  <a:srgbClr val="545454"/>
+                </a:solidFill>
+                <a:latin typeface="Lucida Console" panose="020B0609040504020204" pitchFamily="49" charset="0"/>
+              </a:rPr>
+              <a:t>HDI_cat</a:t>
+            </a:r>
+            <a:r>
+              <a:rPr lang="en-US" dirty="0"/>
+              <a:t> via permutation F-test (nonparametric) vs ANOVA (parametric)</a:t>
+            </a:r>
+          </a:p>
+          <a:p>
+            <a:pPr lvl="1"/>
+            <a:r>
+              <a:rPr lang="en-US" dirty="0"/>
+              <a:t>Code:</a:t>
+            </a:r>
+          </a:p>
+          <a:p>
+            <a:pPr lvl="1"/>
+            <a:endParaRPr lang="en-US" dirty="0"/>
+          </a:p>
+          <a:p>
+            <a:pPr lvl="1"/>
+            <a:endParaRPr lang="en-US" dirty="0"/>
+          </a:p>
+          <a:p>
+            <a:endParaRPr lang="en-US" dirty="0"/>
+          </a:p>
+          <a:p>
+            <a:r>
+              <a:rPr lang="en-US" dirty="0"/>
+              <a:t>Both tests yielded </a:t>
+            </a:r>
+            <a:r>
+              <a:rPr lang="en-US" i="1" dirty="0"/>
+              <a:t>p</a:t>
+            </a:r>
+            <a:r>
+              <a:rPr lang="en-US" dirty="0"/>
+              <a:t> &lt; 0.001, leading to rejection of </a:t>
+            </a:r>
+            <a:r>
+              <a:rPr lang="en-US" dirty="0">
+                <a:latin typeface="CMU Classical Serif" panose="02000603000000000000" pitchFamily="2" charset="0"/>
+                <a:ea typeface="CMU Classical Serif" panose="02000603000000000000" pitchFamily="2" charset="0"/>
+                <a:cs typeface="CMU Classical Serif" panose="02000603000000000000" pitchFamily="2" charset="0"/>
+              </a:rPr>
+              <a:t>H</a:t>
+            </a:r>
+            <a:r>
+              <a:rPr lang="en-US" baseline="-25000" dirty="0">
+                <a:latin typeface="CMU Classical Serif" panose="02000603000000000000" pitchFamily="2" charset="0"/>
+                <a:ea typeface="CMU Classical Serif" panose="02000603000000000000" pitchFamily="2" charset="0"/>
+                <a:cs typeface="CMU Classical Serif" panose="02000603000000000000" pitchFamily="2" charset="0"/>
+              </a:rPr>
+              <a:t>0</a:t>
+            </a:r>
+            <a:r>
+              <a:rPr lang="en-US" dirty="0"/>
+              <a:t> in both cases</a:t>
+            </a:r>
+          </a:p>
+          <a:p>
+            <a:pPr lvl="1"/>
+            <a:r>
+              <a:rPr lang="en-US" dirty="0"/>
+              <a:t>Conclusion:  at the </a:t>
+            </a:r>
+            <a:r>
+              <a:rPr lang="el-GR" i="1" dirty="0"/>
+              <a:t>α</a:t>
+            </a:r>
+            <a:r>
+              <a:rPr lang="en-US" dirty="0"/>
+              <a:t> = 0.05 level, there is evidence of a difference in infant mortality rate across human development categories</a:t>
+            </a:r>
+          </a:p>
+          <a:p>
+            <a:r>
+              <a:rPr lang="en-US" dirty="0"/>
+              <a:t>Both tests assume independence</a:t>
+            </a:r>
+          </a:p>
+          <a:p>
+            <a:pPr lvl="1"/>
+            <a:r>
+              <a:rPr lang="en-US" dirty="0"/>
+              <a:t>Satisfied by the data</a:t>
+            </a:r>
+          </a:p>
+          <a:p>
+            <a:r>
+              <a:rPr lang="en-US" dirty="0"/>
+              <a:t>ANOVA assumes constant variance and normality</a:t>
+            </a:r>
+          </a:p>
+          <a:p>
+            <a:pPr lvl="1"/>
+            <a:r>
+              <a:rPr lang="en-US" dirty="0"/>
+              <a:t>Violated (see next slide)</a:t>
+            </a:r>
+          </a:p>
+          <a:p>
+            <a:r>
+              <a:rPr lang="en-US" dirty="0"/>
+              <a:t>The parametric method is inappropriate in this case but the nonparametric approach works</a:t>
+            </a:r>
+          </a:p>
+        </p:txBody>
+      </p:sp>
+      <p:sp>
+        <p:nvSpPr>
+          <p:cNvPr id="4" name="TextBox 3">
+            <a:extLst>
+              <a:ext uri="{FF2B5EF4-FFF2-40B4-BE49-F238E27FC236}">
+                <a16:creationId xmlns:a16="http://schemas.microsoft.com/office/drawing/2014/main" id="{86D98678-2787-42A6-954F-48747D9AE0C6}"/>
+              </a:ext>
+            </a:extLst>
+          </p:cNvPr>
+          <p:cNvSpPr txBox="1"/>
+          <p:nvPr/>
+        </p:nvSpPr>
+        <p:spPr>
+          <a:xfrm>
+            <a:off x="1479315" y="2341260"/>
+            <a:ext cx="9809074" cy="646331"/>
+          </a:xfrm>
+          <a:prstGeom prst="rect">
+            <a:avLst/>
+          </a:prstGeom>
+          <a:solidFill>
+            <a:srgbClr val="404040"/>
+          </a:solidFill>
+          <a:ln>
+            <a:solidFill>
+              <a:schemeClr val="tx1"/>
+            </a:solidFill>
+          </a:ln>
+        </p:spPr>
+        <p:txBody>
+          <a:bodyPr wrap="square" rtlCol="0">
+            <a:spAutoFit/>
+          </a:bodyPr>
+          <a:lstStyle/>
+          <a:p>
+            <a:r>
+              <a:rPr lang="en-US" sz="1200" dirty="0">
+                <a:solidFill>
+                  <a:schemeClr val="bg1"/>
+                </a:solidFill>
+                <a:latin typeface="Lucida Console" panose="020B0609040504020204" pitchFamily="49" charset="0"/>
+              </a:rPr>
               <a:t>analysis5_nonpara </a:t>
             </a:r>
             <a:r>
@@ -4718,7 +6037,7 @@
 </p:sld>
 </file>
 
-<file path=ppt/slides/slide12.xml><?xml version="1.0" encoding="utf-8"?>
+<file path=ppt/slides/slide14.xml><?xml version="1.0" encoding="utf-8"?>
 <p:sld xmlns:a="http://schemas.openxmlformats.org/drawingml/2006/main" xmlns:r="http://schemas.openxmlformats.org/officeDocument/2006/relationships" xmlns:p="http://schemas.openxmlformats.org/presentationml/2006/main">
   <p:cSld>
     <p:spTree>
@@ -4846,7 +6165,7 @@
 </p:sld>
 </file>
 
-<file path=ppt/slides/slide13.xml><?xml version="1.0" encoding="utf-8"?>
+<file path=ppt/slides/slide15.xml><?xml version="1.0" encoding="utf-8"?>
 <p:sld xmlns:a="http://schemas.openxmlformats.org/drawingml/2006/main" xmlns:r="http://schemas.openxmlformats.org/officeDocument/2006/relationships" xmlns:p="http://schemas.openxmlformats.org/presentationml/2006/main">
   <p:cSld>
     <p:spTree>
@@ -4929,7 +6248,7 @@
 </p:sld>
 </file>
 
-<file path=ppt/slides/slide14.xml><?xml version="1.0" encoding="utf-8"?>
+<file path=ppt/slides/slide16.xml><?xml version="1.0" encoding="utf-8"?>
 <p:sld xmlns:a="http://schemas.openxmlformats.org/drawingml/2006/main" xmlns:r="http://schemas.openxmlformats.org/officeDocument/2006/relationships" xmlns:p="http://schemas.openxmlformats.org/presentationml/2006/main">
   <p:cSld>
     <p:spTree>
@@ -5203,7 +6522,7 @@
 </p:sld>
 </file>
 
-<file path=ppt/slides/slide15.xml><?xml version="1.0" encoding="utf-8"?>
+<file path=ppt/slides/slide17.xml><?xml version="1.0" encoding="utf-8"?>
 <p:sld xmlns:a="http://schemas.openxmlformats.org/drawingml/2006/main" xmlns:r="http://schemas.openxmlformats.org/officeDocument/2006/relationships" xmlns:p="http://schemas.openxmlformats.org/presentationml/2006/main">
   <p:cSld>
     <p:spTree>
@@ -6611,6 +7930,308 @@
           </a:p>
         </p:txBody>
       </p:sp>
+      <p:grpSp>
+        <p:nvGrpSpPr>
+          <p:cNvPr id="8" name="Group 7">
+            <a:extLst>
+              <a:ext uri="{FF2B5EF4-FFF2-40B4-BE49-F238E27FC236}">
+                <a16:creationId xmlns:a16="http://schemas.microsoft.com/office/drawing/2014/main" id="{C325CFE6-ABFB-4D7C-95F8-E4993FD36E3E}"/>
+              </a:ext>
+            </a:extLst>
+          </p:cNvPr>
+          <p:cNvGrpSpPr/>
+          <p:nvPr/>
+        </p:nvGrpSpPr>
+        <p:grpSpPr>
+          <a:xfrm>
+            <a:off x="510686" y="1104162"/>
+            <a:ext cx="5143081" cy="5616417"/>
+            <a:chOff x="510687" y="1104163"/>
+            <a:chExt cx="4913796" cy="5366030"/>
+          </a:xfrm>
+        </p:grpSpPr>
+        <p:pic>
+          <p:nvPicPr>
+            <p:cNvPr id="3" name="Picture 2">
+              <a:extLst>
+                <a:ext uri="{FF2B5EF4-FFF2-40B4-BE49-F238E27FC236}">
+                  <a16:creationId xmlns:a16="http://schemas.microsoft.com/office/drawing/2014/main" id="{946BA352-02F7-4658-B20E-6E0881773C5D}"/>
+                </a:ext>
+              </a:extLst>
+            </p:cNvPr>
+            <p:cNvPicPr>
+              <a:picLocks noChangeAspect="1"/>
+            </p:cNvPicPr>
+            <p:nvPr/>
+          </p:nvPicPr>
+          <p:blipFill rotWithShape="1">
+            <a:blip r:embed="rId2"/>
+            <a:srcRect t="7565" r="49426"/>
+            <a:stretch/>
+          </p:blipFill>
+          <p:spPr>
+            <a:xfrm>
+              <a:off x="510687" y="1511965"/>
+              <a:ext cx="3604114" cy="2634919"/>
+            </a:xfrm>
+            <a:prstGeom prst="rect">
+              <a:avLst/>
+            </a:prstGeom>
+          </p:spPr>
+        </p:pic>
+        <p:sp>
+          <p:nvSpPr>
+            <p:cNvPr id="4" name="TextBox 3">
+              <a:extLst>
+                <a:ext uri="{FF2B5EF4-FFF2-40B4-BE49-F238E27FC236}">
+                  <a16:creationId xmlns:a16="http://schemas.microsoft.com/office/drawing/2014/main" id="{2D88EDA4-56B4-4193-AB01-6A7D793586E0}"/>
+                </a:ext>
+              </a:extLst>
+            </p:cNvPr>
+            <p:cNvSpPr txBox="1"/>
+            <p:nvPr/>
+          </p:nvSpPr>
+          <p:spPr>
+            <a:xfrm>
+              <a:off x="626575" y="1104163"/>
+              <a:ext cx="4797908" cy="307777"/>
+            </a:xfrm>
+            <a:prstGeom prst="rect">
+              <a:avLst/>
+            </a:prstGeom>
+            <a:noFill/>
+          </p:spPr>
+          <p:txBody>
+            <a:bodyPr wrap="square" rtlCol="0">
+              <a:spAutoFit/>
+            </a:bodyPr>
+            <a:lstStyle/>
+            <a:p>
+              <a:r>
+                <a:rPr lang="en-US" sz="1400" b="1" dirty="0">
+                  <a:solidFill>
+                    <a:srgbClr val="545454"/>
+                  </a:solidFill>
+                  <a:latin typeface="Calibri" panose="020F0502020204030204" pitchFamily="34" charset="0"/>
+                  <a:cs typeface="Calibri" panose="020F0502020204030204" pitchFamily="34" charset="0"/>
+                </a:rPr>
+                <a:t>Human Development Index</a:t>
+              </a:r>
+            </a:p>
+          </p:txBody>
+        </p:sp>
+        <p:pic>
+          <p:nvPicPr>
+            <p:cNvPr id="7" name="Picture 6">
+              <a:extLst>
+                <a:ext uri="{FF2B5EF4-FFF2-40B4-BE49-F238E27FC236}">
+                  <a16:creationId xmlns:a16="http://schemas.microsoft.com/office/drawing/2014/main" id="{A94EB576-EF05-4043-A9C3-D7352ECDBD89}"/>
+                </a:ext>
+              </a:extLst>
+            </p:cNvPr>
+            <p:cNvPicPr>
+              <a:picLocks noChangeAspect="1"/>
+            </p:cNvPicPr>
+            <p:nvPr/>
+          </p:nvPicPr>
+          <p:blipFill rotWithShape="1">
+            <a:blip r:embed="rId2"/>
+            <a:srcRect l="50630" t="7565" b="18759"/>
+            <a:stretch/>
+          </p:blipFill>
+          <p:spPr>
+            <a:xfrm>
+              <a:off x="555588" y="4370020"/>
+              <a:ext cx="3518320" cy="2100173"/>
+            </a:xfrm>
+            <a:prstGeom prst="rect">
+              <a:avLst/>
+            </a:prstGeom>
+          </p:spPr>
+        </p:pic>
+      </p:grpSp>
+      <p:grpSp>
+        <p:nvGrpSpPr>
+          <p:cNvPr id="10" name="Group 9">
+            <a:extLst>
+              <a:ext uri="{FF2B5EF4-FFF2-40B4-BE49-F238E27FC236}">
+                <a16:creationId xmlns:a16="http://schemas.microsoft.com/office/drawing/2014/main" id="{73E516AF-5732-4FDE-B4A2-08B5560B1CDC}"/>
+              </a:ext>
+            </a:extLst>
+          </p:cNvPr>
+          <p:cNvGrpSpPr/>
+          <p:nvPr/>
+        </p:nvGrpSpPr>
+        <p:grpSpPr>
+          <a:xfrm>
+            <a:off x="5548951" y="1134940"/>
+            <a:ext cx="6245491" cy="2592202"/>
+            <a:chOff x="5857874" y="1134940"/>
+            <a:chExt cx="6245491" cy="2592202"/>
+          </a:xfrm>
+        </p:grpSpPr>
+        <p:pic>
+          <p:nvPicPr>
+            <p:cNvPr id="6" name="Picture 5">
+              <a:extLst>
+                <a:ext uri="{FF2B5EF4-FFF2-40B4-BE49-F238E27FC236}">
+                  <a16:creationId xmlns:a16="http://schemas.microsoft.com/office/drawing/2014/main" id="{F090A11D-10C0-446D-9B09-5F8D5FFFCCCA}"/>
+                </a:ext>
+              </a:extLst>
+            </p:cNvPr>
+            <p:cNvPicPr>
+              <a:picLocks noChangeAspect="1"/>
+            </p:cNvPicPr>
+            <p:nvPr/>
+          </p:nvPicPr>
+          <p:blipFill rotWithShape="1">
+            <a:blip r:embed="rId3"/>
+            <a:srcRect t="7072"/>
+            <a:stretch/>
+          </p:blipFill>
+          <p:spPr>
+            <a:xfrm>
+              <a:off x="5857874" y="1405618"/>
+              <a:ext cx="6245491" cy="2321524"/>
+            </a:xfrm>
+            <a:prstGeom prst="rect">
+              <a:avLst/>
+            </a:prstGeom>
+          </p:spPr>
+        </p:pic>
+        <p:sp>
+          <p:nvSpPr>
+            <p:cNvPr id="9" name="TextBox 8">
+              <a:extLst>
+                <a:ext uri="{FF2B5EF4-FFF2-40B4-BE49-F238E27FC236}">
+                  <a16:creationId xmlns:a16="http://schemas.microsoft.com/office/drawing/2014/main" id="{4D576566-3386-42E2-8FFB-211302025424}"/>
+                </a:ext>
+              </a:extLst>
+            </p:cNvPr>
+            <p:cNvSpPr txBox="1"/>
+            <p:nvPr/>
+          </p:nvSpPr>
+          <p:spPr>
+            <a:xfrm>
+              <a:off x="6096000" y="1134940"/>
+              <a:ext cx="4797908" cy="307777"/>
+            </a:xfrm>
+            <a:prstGeom prst="rect">
+              <a:avLst/>
+            </a:prstGeom>
+            <a:noFill/>
+          </p:spPr>
+          <p:txBody>
+            <a:bodyPr wrap="square" rtlCol="0">
+              <a:spAutoFit/>
+            </a:bodyPr>
+            <a:lstStyle/>
+            <a:p>
+              <a:r>
+                <a:rPr lang="en-US" sz="1400" b="1" dirty="0">
+                  <a:solidFill>
+                    <a:srgbClr val="545454"/>
+                  </a:solidFill>
+                  <a:latin typeface="Calibri" panose="020F0502020204030204" pitchFamily="34" charset="0"/>
+                  <a:cs typeface="Calibri" panose="020F0502020204030204" pitchFamily="34" charset="0"/>
+                </a:rPr>
+                <a:t>Social Progress Index</a:t>
+              </a:r>
+            </a:p>
+          </p:txBody>
+        </p:sp>
+      </p:grpSp>
+      <p:grpSp>
+        <p:nvGrpSpPr>
+          <p:cNvPr id="13" name="Group 12">
+            <a:extLst>
+              <a:ext uri="{FF2B5EF4-FFF2-40B4-BE49-F238E27FC236}">
+                <a16:creationId xmlns:a16="http://schemas.microsoft.com/office/drawing/2014/main" id="{E5FDFCF9-9AE7-497C-B6F3-7E6D22BD7C4A}"/>
+              </a:ext>
+            </a:extLst>
+          </p:cNvPr>
+          <p:cNvGrpSpPr/>
+          <p:nvPr/>
+        </p:nvGrpSpPr>
+        <p:grpSpPr>
+          <a:xfrm>
+            <a:off x="5549090" y="3843931"/>
+            <a:ext cx="6245352" cy="2605934"/>
+            <a:chOff x="5858013" y="3843931"/>
+            <a:chExt cx="6245352" cy="2605934"/>
+          </a:xfrm>
+        </p:grpSpPr>
+        <p:pic>
+          <p:nvPicPr>
+            <p:cNvPr id="11" name="Picture 10">
+              <a:extLst>
+                <a:ext uri="{FF2B5EF4-FFF2-40B4-BE49-F238E27FC236}">
+                  <a16:creationId xmlns:a16="http://schemas.microsoft.com/office/drawing/2014/main" id="{7BA90928-B9CD-4BD8-87C5-B5E70165B6A6}"/>
+                </a:ext>
+              </a:extLst>
+            </p:cNvPr>
+            <p:cNvPicPr>
+              <a:picLocks noChangeAspect="1"/>
+            </p:cNvPicPr>
+            <p:nvPr/>
+          </p:nvPicPr>
+          <p:blipFill rotWithShape="1">
+            <a:blip r:embed="rId4"/>
+            <a:srcRect t="7812"/>
+            <a:stretch/>
+          </p:blipFill>
+          <p:spPr>
+            <a:xfrm>
+              <a:off x="5858013" y="4146884"/>
+              <a:ext cx="6245352" cy="2302981"/>
+            </a:xfrm>
+            <a:prstGeom prst="rect">
+              <a:avLst/>
+            </a:prstGeom>
+          </p:spPr>
+        </p:pic>
+        <p:sp>
+          <p:nvSpPr>
+            <p:cNvPr id="12" name="TextBox 11">
+              <a:extLst>
+                <a:ext uri="{FF2B5EF4-FFF2-40B4-BE49-F238E27FC236}">
+                  <a16:creationId xmlns:a16="http://schemas.microsoft.com/office/drawing/2014/main" id="{D9BACB22-97C7-4CF7-89B2-3324845ED807}"/>
+                </a:ext>
+              </a:extLst>
+            </p:cNvPr>
+            <p:cNvSpPr txBox="1"/>
+            <p:nvPr/>
+          </p:nvSpPr>
+          <p:spPr>
+            <a:xfrm>
+              <a:off x="6096000" y="3843931"/>
+              <a:ext cx="4797908" cy="307777"/>
+            </a:xfrm>
+            <a:prstGeom prst="rect">
+              <a:avLst/>
+            </a:prstGeom>
+            <a:noFill/>
+          </p:spPr>
+          <p:txBody>
+            <a:bodyPr wrap="square" rtlCol="0">
+              <a:spAutoFit/>
+            </a:bodyPr>
+            <a:lstStyle/>
+            <a:p>
+              <a:r>
+                <a:rPr lang="en-US" sz="1400" b="1" dirty="0">
+                  <a:solidFill>
+                    <a:srgbClr val="545454"/>
+                  </a:solidFill>
+                  <a:latin typeface="Calibri" panose="020F0502020204030204" pitchFamily="34" charset="0"/>
+                  <a:cs typeface="Calibri" panose="020F0502020204030204" pitchFamily="34" charset="0"/>
+                </a:rPr>
+                <a:t>GDP, Log Transform</a:t>
+              </a:r>
+            </a:p>
+          </p:txBody>
+        </p:sp>
+      </p:grpSp>
     </p:spTree>
     <p:extLst>
       <p:ext uri="{BB962C8B-B14F-4D97-AF65-F5344CB8AC3E}">
@@ -6625,6 +8246,486 @@
 </file>
 
 <file path=ppt/slides/slide7.xml><?xml version="1.0" encoding="utf-8"?>
+<p:sld xmlns:a="http://schemas.openxmlformats.org/drawingml/2006/main" xmlns:r="http://schemas.openxmlformats.org/officeDocument/2006/relationships" xmlns:p="http://schemas.openxmlformats.org/presentationml/2006/main">
+  <p:cSld>
+    <p:spTree>
+      <p:nvGrpSpPr>
+        <p:cNvPr id="1" name=""/>
+        <p:cNvGrpSpPr/>
+        <p:nvPr/>
+      </p:nvGrpSpPr>
+      <p:grpSpPr>
+        <a:xfrm>
+          <a:off x="0" y="0"/>
+          <a:ext cx="0" cy="0"/>
+          <a:chOff x="0" y="0"/>
+          <a:chExt cx="0" cy="0"/>
+        </a:xfrm>
+      </p:grpSpPr>
+      <p:sp>
+        <p:nvSpPr>
+          <p:cNvPr id="2" name="Title 1">
+            <a:extLst>
+              <a:ext uri="{FF2B5EF4-FFF2-40B4-BE49-F238E27FC236}">
+                <a16:creationId xmlns:a16="http://schemas.microsoft.com/office/drawing/2014/main" id="{B9F118EA-9581-481E-9737-5FBEC7E88C69}"/>
+              </a:ext>
+            </a:extLst>
+          </p:cNvPr>
+          <p:cNvSpPr>
+            <a:spLocks noGrp="1"/>
+          </p:cNvSpPr>
+          <p:nvPr>
+            <p:ph type="title"/>
+          </p:nvPr>
+        </p:nvSpPr>
+        <p:spPr/>
+        <p:txBody>
+          <a:bodyPr/>
+          <a:lstStyle/>
+          <a:p>
+            <a:r>
+              <a:rPr lang="en-US" dirty="0"/>
+              <a:t>UNIVARIATE ANALYSES</a:t>
+            </a:r>
+          </a:p>
+        </p:txBody>
+      </p:sp>
+      <p:grpSp>
+        <p:nvGrpSpPr>
+          <p:cNvPr id="17" name="Group 16">
+            <a:extLst>
+              <a:ext uri="{FF2B5EF4-FFF2-40B4-BE49-F238E27FC236}">
+                <a16:creationId xmlns:a16="http://schemas.microsoft.com/office/drawing/2014/main" id="{363231BC-211E-4453-8033-202DED94FEF9}"/>
+              </a:ext>
+            </a:extLst>
+          </p:cNvPr>
+          <p:cNvGrpSpPr/>
+          <p:nvPr/>
+        </p:nvGrpSpPr>
+        <p:grpSpPr>
+          <a:xfrm>
+            <a:off x="3276162" y="1134940"/>
+            <a:ext cx="6245352" cy="2605209"/>
+            <a:chOff x="243130" y="1134940"/>
+            <a:chExt cx="6245352" cy="2605209"/>
+          </a:xfrm>
+        </p:grpSpPr>
+        <p:pic>
+          <p:nvPicPr>
+            <p:cNvPr id="5" name="Picture 4">
+              <a:extLst>
+                <a:ext uri="{FF2B5EF4-FFF2-40B4-BE49-F238E27FC236}">
+                  <a16:creationId xmlns:a16="http://schemas.microsoft.com/office/drawing/2014/main" id="{4EDF08D0-AA50-479A-984A-FC78597D5193}"/>
+                </a:ext>
+              </a:extLst>
+            </p:cNvPr>
+            <p:cNvPicPr>
+              <a:picLocks noChangeAspect="1"/>
+            </p:cNvPicPr>
+            <p:nvPr/>
+          </p:nvPicPr>
+          <p:blipFill rotWithShape="1">
+            <a:blip r:embed="rId2"/>
+            <a:srcRect t="8063"/>
+            <a:stretch/>
+          </p:blipFill>
+          <p:spPr>
+            <a:xfrm>
+              <a:off x="243130" y="1443441"/>
+              <a:ext cx="6245352" cy="2296708"/>
+            </a:xfrm>
+            <a:prstGeom prst="rect">
+              <a:avLst/>
+            </a:prstGeom>
+          </p:spPr>
+        </p:pic>
+        <p:sp>
+          <p:nvSpPr>
+            <p:cNvPr id="14" name="TextBox 13">
+              <a:extLst>
+                <a:ext uri="{FF2B5EF4-FFF2-40B4-BE49-F238E27FC236}">
+                  <a16:creationId xmlns:a16="http://schemas.microsoft.com/office/drawing/2014/main" id="{A063AEE3-55CD-4B2B-BBB0-C8B22D1A542F}"/>
+                </a:ext>
+              </a:extLst>
+            </p:cNvPr>
+            <p:cNvSpPr txBox="1"/>
+            <p:nvPr/>
+          </p:nvSpPr>
+          <p:spPr>
+            <a:xfrm>
+              <a:off x="462388" y="1134940"/>
+              <a:ext cx="4797908" cy="307777"/>
+            </a:xfrm>
+            <a:prstGeom prst="rect">
+              <a:avLst/>
+            </a:prstGeom>
+            <a:noFill/>
+          </p:spPr>
+          <p:txBody>
+            <a:bodyPr wrap="square" rtlCol="0">
+              <a:spAutoFit/>
+            </a:bodyPr>
+            <a:lstStyle/>
+            <a:p>
+              <a:r>
+                <a:rPr lang="en-US" sz="1400" b="1" dirty="0">
+                  <a:solidFill>
+                    <a:srgbClr val="545454"/>
+                  </a:solidFill>
+                  <a:latin typeface="Calibri" panose="020F0502020204030204" pitchFamily="34" charset="0"/>
+                  <a:cs typeface="Calibri" panose="020F0502020204030204" pitchFamily="34" charset="0"/>
+                </a:rPr>
+                <a:t>Happiness Score</a:t>
+              </a:r>
+            </a:p>
+          </p:txBody>
+        </p:sp>
+      </p:grpSp>
+      <p:grpSp>
+        <p:nvGrpSpPr>
+          <p:cNvPr id="18" name="Group 17">
+            <a:extLst>
+              <a:ext uri="{FF2B5EF4-FFF2-40B4-BE49-F238E27FC236}">
+                <a16:creationId xmlns:a16="http://schemas.microsoft.com/office/drawing/2014/main" id="{6C027BE2-D793-4077-8A63-497D43167DBB}"/>
+              </a:ext>
+            </a:extLst>
+          </p:cNvPr>
+          <p:cNvGrpSpPr/>
+          <p:nvPr/>
+        </p:nvGrpSpPr>
+        <p:grpSpPr>
+          <a:xfrm>
+            <a:off x="3257708" y="4149923"/>
+            <a:ext cx="6245352" cy="2572428"/>
+            <a:chOff x="224676" y="4149923"/>
+            <a:chExt cx="6245352" cy="2572428"/>
+          </a:xfrm>
+        </p:grpSpPr>
+        <p:pic>
+          <p:nvPicPr>
+            <p:cNvPr id="15" name="Picture 14">
+              <a:extLst>
+                <a:ext uri="{FF2B5EF4-FFF2-40B4-BE49-F238E27FC236}">
+                  <a16:creationId xmlns:a16="http://schemas.microsoft.com/office/drawing/2014/main" id="{53ECC833-6B35-4BC9-AA4A-B40886C96F78}"/>
+                </a:ext>
+              </a:extLst>
+            </p:cNvPr>
+            <p:cNvPicPr>
+              <a:picLocks noChangeAspect="1"/>
+            </p:cNvPicPr>
+            <p:nvPr/>
+          </p:nvPicPr>
+          <p:blipFill rotWithShape="1">
+            <a:blip r:embed="rId3"/>
+            <a:srcRect t="7058"/>
+            <a:stretch/>
+          </p:blipFill>
+          <p:spPr>
+            <a:xfrm>
+              <a:off x="224676" y="4400550"/>
+              <a:ext cx="6245352" cy="2321801"/>
+            </a:xfrm>
+            <a:prstGeom prst="rect">
+              <a:avLst/>
+            </a:prstGeom>
+          </p:spPr>
+        </p:pic>
+        <p:sp>
+          <p:nvSpPr>
+            <p:cNvPr id="16" name="TextBox 15">
+              <a:extLst>
+                <a:ext uri="{FF2B5EF4-FFF2-40B4-BE49-F238E27FC236}">
+                  <a16:creationId xmlns:a16="http://schemas.microsoft.com/office/drawing/2014/main" id="{3E551C0F-B510-4A6F-95D6-550BEC994CBE}"/>
+                </a:ext>
+              </a:extLst>
+            </p:cNvPr>
+            <p:cNvSpPr txBox="1"/>
+            <p:nvPr/>
+          </p:nvSpPr>
+          <p:spPr>
+            <a:xfrm>
+              <a:off x="462388" y="4149923"/>
+              <a:ext cx="4797908" cy="307777"/>
+            </a:xfrm>
+            <a:prstGeom prst="rect">
+              <a:avLst/>
+            </a:prstGeom>
+            <a:noFill/>
+          </p:spPr>
+          <p:txBody>
+            <a:bodyPr wrap="square" rtlCol="0">
+              <a:spAutoFit/>
+            </a:bodyPr>
+            <a:lstStyle/>
+            <a:p>
+              <a:r>
+                <a:rPr lang="en-US" sz="1400" b="1" dirty="0">
+                  <a:solidFill>
+                    <a:srgbClr val="545454"/>
+                  </a:solidFill>
+                  <a:latin typeface="Calibri" panose="020F0502020204030204" pitchFamily="34" charset="0"/>
+                  <a:cs typeface="Calibri" panose="020F0502020204030204" pitchFamily="34" charset="0"/>
+                </a:rPr>
+                <a:t>Gender Equality Index</a:t>
+              </a:r>
+            </a:p>
+          </p:txBody>
+        </p:sp>
+      </p:grpSp>
+    </p:spTree>
+    <p:extLst>
+      <p:ext uri="{BB962C8B-B14F-4D97-AF65-F5344CB8AC3E}">
+        <p14:creationId xmlns:p14="http://schemas.microsoft.com/office/powerpoint/2010/main" val="3434806106"/>
+      </p:ext>
+    </p:extLst>
+  </p:cSld>
+  <p:clrMapOvr>
+    <a:masterClrMapping/>
+  </p:clrMapOvr>
+</p:sld>
+</file>
+
+<file path=ppt/slides/slide8.xml><?xml version="1.0" encoding="utf-8"?>
+<p:sld xmlns:a="http://schemas.openxmlformats.org/drawingml/2006/main" xmlns:r="http://schemas.openxmlformats.org/officeDocument/2006/relationships" xmlns:p="http://schemas.openxmlformats.org/presentationml/2006/main">
+  <p:cSld>
+    <p:spTree>
+      <p:nvGrpSpPr>
+        <p:cNvPr id="1" name=""/>
+        <p:cNvGrpSpPr/>
+        <p:nvPr/>
+      </p:nvGrpSpPr>
+      <p:grpSpPr>
+        <a:xfrm>
+          <a:off x="0" y="0"/>
+          <a:ext cx="0" cy="0"/>
+          <a:chOff x="0" y="0"/>
+          <a:chExt cx="0" cy="0"/>
+        </a:xfrm>
+      </p:grpSpPr>
+      <p:sp>
+        <p:nvSpPr>
+          <p:cNvPr id="2" name="Title 1">
+            <a:extLst>
+              <a:ext uri="{FF2B5EF4-FFF2-40B4-BE49-F238E27FC236}">
+                <a16:creationId xmlns:a16="http://schemas.microsoft.com/office/drawing/2014/main" id="{B9F118EA-9581-481E-9737-5FBEC7E88C69}"/>
+              </a:ext>
+            </a:extLst>
+          </p:cNvPr>
+          <p:cNvSpPr>
+            <a:spLocks noGrp="1"/>
+          </p:cNvSpPr>
+          <p:nvPr>
+            <p:ph type="title"/>
+          </p:nvPr>
+        </p:nvSpPr>
+        <p:spPr/>
+        <p:txBody>
+          <a:bodyPr/>
+          <a:lstStyle/>
+          <a:p>
+            <a:r>
+              <a:rPr lang="en-US" dirty="0"/>
+              <a:t>UNIVARIATE ANALYSES</a:t>
+            </a:r>
+          </a:p>
+        </p:txBody>
+      </p:sp>
+      <p:grpSp>
+        <p:nvGrpSpPr>
+          <p:cNvPr id="4" name="Group 3">
+            <a:extLst>
+              <a:ext uri="{FF2B5EF4-FFF2-40B4-BE49-F238E27FC236}">
+                <a16:creationId xmlns:a16="http://schemas.microsoft.com/office/drawing/2014/main" id="{7153D850-3280-49DD-A061-8339F35AC698}"/>
+              </a:ext>
+            </a:extLst>
+          </p:cNvPr>
+          <p:cNvGrpSpPr/>
+          <p:nvPr/>
+        </p:nvGrpSpPr>
+        <p:grpSpPr>
+          <a:xfrm>
+            <a:off x="2876112" y="1167598"/>
+            <a:ext cx="6245352" cy="2623304"/>
+            <a:chOff x="3255750" y="1134940"/>
+            <a:chExt cx="6245352" cy="2623304"/>
+          </a:xfrm>
+        </p:grpSpPr>
+        <p:pic>
+          <p:nvPicPr>
+            <p:cNvPr id="3" name="Picture 2">
+              <a:extLst>
+                <a:ext uri="{FF2B5EF4-FFF2-40B4-BE49-F238E27FC236}">
+                  <a16:creationId xmlns:a16="http://schemas.microsoft.com/office/drawing/2014/main" id="{22BE05A1-CABF-4956-8852-BFADEE14FC54}"/>
+                </a:ext>
+              </a:extLst>
+            </p:cNvPr>
+            <p:cNvPicPr>
+              <a:picLocks noChangeAspect="1"/>
+            </p:cNvPicPr>
+            <p:nvPr/>
+          </p:nvPicPr>
+          <p:blipFill rotWithShape="1">
+            <a:blip r:embed="rId2"/>
+            <a:srcRect t="7310"/>
+            <a:stretch/>
+          </p:blipFill>
+          <p:spPr>
+            <a:xfrm>
+              <a:off x="3255750" y="1442717"/>
+              <a:ext cx="6245352" cy="2315527"/>
+            </a:xfrm>
+            <a:prstGeom prst="rect">
+              <a:avLst/>
+            </a:prstGeom>
+          </p:spPr>
+        </p:pic>
+        <p:sp>
+          <p:nvSpPr>
+            <p:cNvPr id="10" name="TextBox 9">
+              <a:extLst>
+                <a:ext uri="{FF2B5EF4-FFF2-40B4-BE49-F238E27FC236}">
+                  <a16:creationId xmlns:a16="http://schemas.microsoft.com/office/drawing/2014/main" id="{689B02C0-F774-44F9-8522-0F2E03EE8F09}"/>
+                </a:ext>
+              </a:extLst>
+            </p:cNvPr>
+            <p:cNvSpPr txBox="1"/>
+            <p:nvPr/>
+          </p:nvSpPr>
+          <p:spPr>
+            <a:xfrm>
+              <a:off x="3495420" y="1134940"/>
+              <a:ext cx="4797908" cy="307777"/>
+            </a:xfrm>
+            <a:prstGeom prst="rect">
+              <a:avLst/>
+            </a:prstGeom>
+            <a:noFill/>
+          </p:spPr>
+          <p:txBody>
+            <a:bodyPr wrap="square" rtlCol="0">
+              <a:spAutoFit/>
+            </a:bodyPr>
+            <a:lstStyle/>
+            <a:p>
+              <a:r>
+                <a:rPr lang="en-US" sz="1400" b="1" dirty="0">
+                  <a:solidFill>
+                    <a:srgbClr val="545454"/>
+                  </a:solidFill>
+                  <a:latin typeface="Calibri" panose="020F0502020204030204" pitchFamily="34" charset="0"/>
+                  <a:cs typeface="Calibri" panose="020F0502020204030204" pitchFamily="34" charset="0"/>
+                </a:rPr>
+                <a:t>Infant Mortality Rate</a:t>
+              </a:r>
+            </a:p>
+          </p:txBody>
+        </p:sp>
+      </p:grpSp>
+      <p:grpSp>
+        <p:nvGrpSpPr>
+          <p:cNvPr id="7" name="Group 6">
+            <a:extLst>
+              <a:ext uri="{FF2B5EF4-FFF2-40B4-BE49-F238E27FC236}">
+                <a16:creationId xmlns:a16="http://schemas.microsoft.com/office/drawing/2014/main" id="{9DE8C64D-5F2C-4005-AE53-EF656E7360DC}"/>
+              </a:ext>
+            </a:extLst>
+          </p:cNvPr>
+          <p:cNvGrpSpPr/>
+          <p:nvPr/>
+        </p:nvGrpSpPr>
+        <p:grpSpPr>
+          <a:xfrm>
+            <a:off x="2876112" y="4007047"/>
+            <a:ext cx="6245352" cy="2635852"/>
+            <a:chOff x="2876112" y="4007047"/>
+            <a:chExt cx="6245352" cy="2635852"/>
+          </a:xfrm>
+        </p:grpSpPr>
+        <p:pic>
+          <p:nvPicPr>
+            <p:cNvPr id="6" name="Picture 5">
+              <a:extLst>
+                <a:ext uri="{FF2B5EF4-FFF2-40B4-BE49-F238E27FC236}">
+                  <a16:creationId xmlns:a16="http://schemas.microsoft.com/office/drawing/2014/main" id="{D9DD61CA-423E-4BEC-9C84-8FD420A1433E}"/>
+                </a:ext>
+              </a:extLst>
+            </p:cNvPr>
+            <p:cNvPicPr>
+              <a:picLocks noChangeAspect="1"/>
+            </p:cNvPicPr>
+            <p:nvPr/>
+          </p:nvPicPr>
+          <p:blipFill rotWithShape="1">
+            <a:blip r:embed="rId3"/>
+            <a:srcRect t="6807"/>
+            <a:stretch/>
+          </p:blipFill>
+          <p:spPr>
+            <a:xfrm>
+              <a:off x="2876112" y="4314824"/>
+              <a:ext cx="6245352" cy="2328075"/>
+            </a:xfrm>
+            <a:prstGeom prst="rect">
+              <a:avLst/>
+            </a:prstGeom>
+          </p:spPr>
+        </p:pic>
+        <p:sp>
+          <p:nvSpPr>
+            <p:cNvPr id="13" name="TextBox 12">
+              <a:extLst>
+                <a:ext uri="{FF2B5EF4-FFF2-40B4-BE49-F238E27FC236}">
+                  <a16:creationId xmlns:a16="http://schemas.microsoft.com/office/drawing/2014/main" id="{5B918B80-EA48-499B-9FB3-7D964F132DBA}"/>
+                </a:ext>
+              </a:extLst>
+            </p:cNvPr>
+            <p:cNvSpPr txBox="1"/>
+            <p:nvPr/>
+          </p:nvSpPr>
+          <p:spPr>
+            <a:xfrm>
+              <a:off x="3047746" y="4007047"/>
+              <a:ext cx="4797908" cy="307777"/>
+            </a:xfrm>
+            <a:prstGeom prst="rect">
+              <a:avLst/>
+            </a:prstGeom>
+            <a:noFill/>
+          </p:spPr>
+          <p:txBody>
+            <a:bodyPr wrap="square" rtlCol="0">
+              <a:spAutoFit/>
+            </a:bodyPr>
+            <a:lstStyle/>
+            <a:p>
+              <a:r>
+                <a:rPr lang="en-US" sz="1400" b="1" dirty="0">
+                  <a:solidFill>
+                    <a:srgbClr val="545454"/>
+                  </a:solidFill>
+                  <a:latin typeface="Calibri" panose="020F0502020204030204" pitchFamily="34" charset="0"/>
+                  <a:cs typeface="Calibri" panose="020F0502020204030204" pitchFamily="34" charset="0"/>
+                </a:rPr>
+                <a:t>Total Life Expectancy…</a:t>
+              </a:r>
+            </a:p>
+          </p:txBody>
+        </p:sp>
+      </p:grpSp>
+    </p:spTree>
+    <p:extLst>
+      <p:ext uri="{BB962C8B-B14F-4D97-AF65-F5344CB8AC3E}">
+        <p14:creationId xmlns:p14="http://schemas.microsoft.com/office/powerpoint/2010/main" val="3607376674"/>
+      </p:ext>
+    </p:extLst>
+  </p:cSld>
+  <p:clrMapOvr>
+    <a:masterClrMapping/>
+  </p:clrMapOvr>
+</p:sld>
+</file>
+
+<file path=ppt/slides/slide9.xml><?xml version="1.0" encoding="utf-8"?>
 <p:sld xmlns:a="http://schemas.openxmlformats.org/drawingml/2006/main" xmlns:r="http://schemas.openxmlformats.org/officeDocument/2006/relationships" xmlns:p="http://schemas.openxmlformats.org/presentationml/2006/main">
   <p:cSld>
     <p:spTree>
@@ -7027,1056 +9128,12 @@
           </a:p>
         </p:txBody>
       </p:sp>
-    </p:spTree>
-    <p:extLst>
-      <p:ext uri="{BB962C8B-B14F-4D97-AF65-F5344CB8AC3E}">
-        <p14:creationId xmlns:p14="http://schemas.microsoft.com/office/powerpoint/2010/main" val="42750524"/>
-      </p:ext>
-    </p:extLst>
-  </p:cSld>
-  <p:clrMapOvr>
-    <a:masterClrMapping/>
-  </p:clrMapOvr>
-</p:sld>
-</file>
-
-<file path=ppt/slides/slide8.xml><?xml version="1.0" encoding="utf-8"?>
-<p:sld xmlns:a="http://schemas.openxmlformats.org/drawingml/2006/main" xmlns:r="http://schemas.openxmlformats.org/officeDocument/2006/relationships" xmlns:p="http://schemas.openxmlformats.org/presentationml/2006/main">
-  <p:cSld>
-    <p:spTree>
-      <p:nvGrpSpPr>
-        <p:cNvPr id="1" name=""/>
-        <p:cNvGrpSpPr/>
-        <p:nvPr/>
-      </p:nvGrpSpPr>
-      <p:grpSpPr>
-        <a:xfrm>
-          <a:off x="0" y="0"/>
-          <a:ext cx="0" cy="0"/>
-          <a:chOff x="0" y="0"/>
-          <a:chExt cx="0" cy="0"/>
-        </a:xfrm>
-      </p:grpSpPr>
-      <p:sp>
-        <p:nvSpPr>
-          <p:cNvPr id="2" name="Title 1">
+      <p:sp>
+        <p:nvSpPr>
+          <p:cNvPr id="8" name="TextBox 7">
             <a:extLst>
               <a:ext uri="{FF2B5EF4-FFF2-40B4-BE49-F238E27FC236}">
-                <a16:creationId xmlns:a16="http://schemas.microsoft.com/office/drawing/2014/main" id="{B7383051-138B-4DB9-9ABB-C3BBE79305E8}"/>
-              </a:ext>
-            </a:extLst>
-          </p:cNvPr>
-          <p:cNvSpPr>
-            <a:spLocks noGrp="1"/>
-          </p:cNvSpPr>
-          <p:nvPr>
-            <p:ph type="title"/>
-          </p:nvPr>
-        </p:nvSpPr>
-        <p:spPr/>
-        <p:txBody>
-          <a:bodyPr/>
-          <a:lstStyle/>
-          <a:p>
-            <a:r>
-              <a:rPr lang="en-US" dirty="0"/>
-              <a:t>ANALYSES PERFORMED</a:t>
-            </a:r>
-          </a:p>
-        </p:txBody>
-      </p:sp>
-      <p:graphicFrame>
-        <p:nvGraphicFramePr>
-          <p:cNvPr id="4" name="Content Placeholder 3">
-            <a:extLst>
-              <a:ext uri="{FF2B5EF4-FFF2-40B4-BE49-F238E27FC236}">
-                <a16:creationId xmlns:a16="http://schemas.microsoft.com/office/drawing/2014/main" id="{B075988C-CA5D-4C1C-A400-095EA418AAF6}"/>
-              </a:ext>
-            </a:extLst>
-          </p:cNvPr>
-          <p:cNvGraphicFramePr>
-            <a:graphicFrameLocks noGrp="1"/>
-          </p:cNvGraphicFramePr>
-          <p:nvPr>
-            <p:ph idx="1"/>
-            <p:extLst>
-              <p:ext uri="{D42A27DB-BD31-4B8C-83A1-F6EECF244321}">
-                <p14:modId xmlns:p14="http://schemas.microsoft.com/office/powerpoint/2010/main" val="2290571783"/>
-              </p:ext>
-            </p:extLst>
-          </p:nvPr>
-        </p:nvGraphicFramePr>
-        <p:xfrm>
-          <a:off x="476250" y="1358900"/>
-          <a:ext cx="11214102" cy="4937760"/>
-        </p:xfrm>
-        <a:graphic>
-          <a:graphicData uri="http://schemas.openxmlformats.org/drawingml/2006/table">
-            <a:tbl>
-              <a:tblPr firstRow="1" bandRow="1">
-                <a:tableStyleId>{5C22544A-7EE6-4342-B048-85BDC9FD1C3A}</a:tableStyleId>
-              </a:tblPr>
-              <a:tblGrid>
-                <a:gridCol w="1104072">
-                  <a:extLst>
-                    <a:ext uri="{9D8B030D-6E8A-4147-A177-3AD203B41FA5}">
-                      <a16:colId xmlns:a16="http://schemas.microsoft.com/office/drawing/2014/main" val="1459026659"/>
-                    </a:ext>
-                  </a:extLst>
-                </a:gridCol>
-                <a:gridCol w="1500808">
-                  <a:extLst>
-                    <a:ext uri="{9D8B030D-6E8A-4147-A177-3AD203B41FA5}">
-                      <a16:colId xmlns:a16="http://schemas.microsoft.com/office/drawing/2014/main" val="2510600754"/>
-                    </a:ext>
-                  </a:extLst>
-                </a:gridCol>
-                <a:gridCol w="2435594">
-                  <a:extLst>
-                    <a:ext uri="{9D8B030D-6E8A-4147-A177-3AD203B41FA5}">
-                      <a16:colId xmlns:a16="http://schemas.microsoft.com/office/drawing/2014/main" val="85376525"/>
-                    </a:ext>
-                  </a:extLst>
-                </a:gridCol>
-                <a:gridCol w="2435594">
-                  <a:extLst>
-                    <a:ext uri="{9D8B030D-6E8A-4147-A177-3AD203B41FA5}">
-                      <a16:colId xmlns:a16="http://schemas.microsoft.com/office/drawing/2014/main" val="3039715562"/>
-                    </a:ext>
-                  </a:extLst>
-                </a:gridCol>
-                <a:gridCol w="1869017">
-                  <a:extLst>
-                    <a:ext uri="{9D8B030D-6E8A-4147-A177-3AD203B41FA5}">
-                      <a16:colId xmlns:a16="http://schemas.microsoft.com/office/drawing/2014/main" val="3694282208"/>
-                    </a:ext>
-                  </a:extLst>
-                </a:gridCol>
-                <a:gridCol w="1869017">
-                  <a:extLst>
-                    <a:ext uri="{9D8B030D-6E8A-4147-A177-3AD203B41FA5}">
-                      <a16:colId xmlns:a16="http://schemas.microsoft.com/office/drawing/2014/main" val="3977966083"/>
-                    </a:ext>
-                  </a:extLst>
-                </a:gridCol>
-              </a:tblGrid>
-              <a:tr h="370840">
-                <a:tc>
-                  <a:txBody>
-                    <a:bodyPr/>
-                    <a:lstStyle/>
-                    <a:p>
-                      <a:r>
-                        <a:rPr lang="en-US" dirty="0"/>
-                        <a:t>ANALYSIS</a:t>
-                      </a:r>
-                    </a:p>
-                  </a:txBody>
-                  <a:tcPr/>
-                </a:tc>
-                <a:tc>
-                  <a:txBody>
-                    <a:bodyPr/>
-                    <a:lstStyle/>
-                    <a:p>
-                      <a:r>
-                        <a:rPr lang="en-US" dirty="0"/>
-                        <a:t>VARIABLE(S)</a:t>
-                      </a:r>
-                    </a:p>
-                  </a:txBody>
-                  <a:tcPr/>
-                </a:tc>
-                <a:tc>
-                  <a:txBody>
-                    <a:bodyPr/>
-                    <a:lstStyle/>
-                    <a:p>
-                      <a:r>
-                        <a:rPr lang="en-US" b="1" i="1" dirty="0">
-                          <a:latin typeface="CMU Serif" panose="02000603000000000000" pitchFamily="2" charset="0"/>
-                          <a:ea typeface="CMU Serif" panose="02000603000000000000" pitchFamily="2" charset="0"/>
-                          <a:cs typeface="CMU Serif" panose="02000603000000000000" pitchFamily="2" charset="0"/>
-                        </a:rPr>
-                        <a:t>H</a:t>
-                      </a:r>
-                      <a:r>
-                        <a:rPr lang="en-US" b="1" i="1" baseline="-25000" dirty="0">
-                          <a:latin typeface="CMU Serif" panose="02000603000000000000" pitchFamily="2" charset="0"/>
-                          <a:ea typeface="CMU Serif" panose="02000603000000000000" pitchFamily="2" charset="0"/>
-                          <a:cs typeface="CMU Serif" panose="02000603000000000000" pitchFamily="2" charset="0"/>
-                        </a:rPr>
-                        <a:t>0</a:t>
-                      </a:r>
-                    </a:p>
-                  </a:txBody>
-                  <a:tcPr/>
-                </a:tc>
-                <a:tc>
-                  <a:txBody>
-                    <a:bodyPr/>
-                    <a:lstStyle/>
-                    <a:p>
-                      <a:r>
-                        <a:rPr lang="en-US" b="1" i="1" dirty="0">
-                          <a:latin typeface="CMU Serif" panose="02000603000000000000" pitchFamily="2" charset="0"/>
-                          <a:ea typeface="CMU Serif" panose="02000603000000000000" pitchFamily="2" charset="0"/>
-                          <a:cs typeface="CMU Serif" panose="02000603000000000000" pitchFamily="2" charset="0"/>
-                        </a:rPr>
-                        <a:t>H</a:t>
-                      </a:r>
-                      <a:r>
-                        <a:rPr lang="en-US" b="1" i="1" baseline="-25000" dirty="0">
-                          <a:latin typeface="CMU Serif" panose="02000603000000000000" pitchFamily="2" charset="0"/>
-                          <a:ea typeface="CMU Serif" panose="02000603000000000000" pitchFamily="2" charset="0"/>
-                          <a:cs typeface="CMU Serif" panose="02000603000000000000" pitchFamily="2" charset="0"/>
-                        </a:rPr>
-                        <a:t>A</a:t>
-                      </a:r>
-                    </a:p>
-                  </a:txBody>
-                  <a:tcPr/>
-                </a:tc>
-                <a:tc>
-                  <a:txBody>
-                    <a:bodyPr/>
-                    <a:lstStyle/>
-                    <a:p>
-                      <a:r>
-                        <a:rPr lang="en-US" dirty="0"/>
-                        <a:t>NONPARAMETRIC TEST</a:t>
-                      </a:r>
-                    </a:p>
-                  </a:txBody>
-                  <a:tcPr/>
-                </a:tc>
-                <a:tc>
-                  <a:txBody>
-                    <a:bodyPr/>
-                    <a:lstStyle/>
-                    <a:p>
-                      <a:r>
-                        <a:rPr lang="en-US" dirty="0"/>
-                        <a:t>PARAMETRIC TEST</a:t>
-                      </a:r>
-                    </a:p>
-                  </a:txBody>
-                  <a:tcPr/>
-                </a:tc>
-                <a:extLst>
-                  <a:ext uri="{0D108BD9-81ED-4DB2-BD59-A6C34878D82A}">
-                    <a16:rowId xmlns:a16="http://schemas.microsoft.com/office/drawing/2014/main" val="2795953357"/>
-                  </a:ext>
-                </a:extLst>
-              </a:tr>
-              <a:tr h="370840">
-                <a:tc>
-                  <a:txBody>
-                    <a:bodyPr/>
-                    <a:lstStyle/>
-                    <a:p>
-                      <a:r>
-                        <a:rPr lang="en-US" dirty="0"/>
-                        <a:t>1</a:t>
-                      </a:r>
-                    </a:p>
-                  </a:txBody>
-                  <a:tcPr/>
-                </a:tc>
-                <a:tc>
-                  <a:txBody>
-                    <a:bodyPr/>
-                    <a:lstStyle/>
-                    <a:p>
-                      <a:r>
-                        <a:rPr lang="en-US" sz="1600" dirty="0" err="1">
-                          <a:solidFill>
-                            <a:srgbClr val="545454"/>
-                          </a:solidFill>
-                          <a:latin typeface="Lucida Console" panose="020B0609040504020204" pitchFamily="49" charset="0"/>
-                        </a:rPr>
-                        <a:t>HDIindex</a:t>
-                      </a:r>
-                      <a:endParaRPr lang="en-US" sz="1600" dirty="0">
-                        <a:solidFill>
-                          <a:srgbClr val="545454"/>
-                        </a:solidFill>
-                        <a:latin typeface="Lucida Console" panose="020B0609040504020204" pitchFamily="49" charset="0"/>
-                      </a:endParaRPr>
-                    </a:p>
-                  </a:txBody>
-                  <a:tcPr/>
-                </a:tc>
-                <a:tc>
-                  <a:txBody>
-                    <a:bodyPr/>
-                    <a:lstStyle/>
-                    <a:p>
-                      <a:r>
-                        <a:rPr lang="en-US" dirty="0"/>
-                        <a:t>The sample median is equal to the mean</a:t>
-                      </a:r>
-                      <a:endParaRPr lang="en-US" dirty="0">
-                        <a:solidFill>
-                          <a:srgbClr val="FF0000"/>
-                        </a:solidFill>
-                      </a:endParaRPr>
-                    </a:p>
-                  </a:txBody>
-                  <a:tcPr/>
-                </a:tc>
-                <a:tc>
-                  <a:txBody>
-                    <a:bodyPr/>
-                    <a:lstStyle/>
-                    <a:p>
-                      <a:r>
-                        <a:rPr lang="en-US" dirty="0"/>
-                        <a:t>The sample median and mean are not equal</a:t>
-                      </a:r>
-                    </a:p>
-                  </a:txBody>
-                  <a:tcPr/>
-                </a:tc>
-                <a:tc>
-                  <a:txBody>
-                    <a:bodyPr/>
-                    <a:lstStyle/>
-                    <a:p>
-                      <a:r>
-                        <a:rPr lang="en-US" dirty="0"/>
-                        <a:t>One-Sample Sign Test</a:t>
-                      </a:r>
-                    </a:p>
-                  </a:txBody>
-                  <a:tcPr/>
-                </a:tc>
-                <a:tc>
-                  <a:txBody>
-                    <a:bodyPr/>
-                    <a:lstStyle/>
-                    <a:p>
-                      <a:r>
-                        <a:rPr lang="en-US" dirty="0"/>
-                        <a:t>One-Sample </a:t>
-                      </a:r>
-                      <a:r>
-                        <a:rPr lang="en-US" i="1" dirty="0"/>
-                        <a:t>t</a:t>
-                      </a:r>
-                      <a:r>
-                        <a:rPr lang="en-US" dirty="0"/>
-                        <a:t>-test</a:t>
-                      </a:r>
-                    </a:p>
-                  </a:txBody>
-                  <a:tcPr/>
-                </a:tc>
-                <a:extLst>
-                  <a:ext uri="{0D108BD9-81ED-4DB2-BD59-A6C34878D82A}">
-                    <a16:rowId xmlns:a16="http://schemas.microsoft.com/office/drawing/2014/main" val="4052663564"/>
-                  </a:ext>
-                </a:extLst>
-              </a:tr>
-              <a:tr h="370840">
-                <a:tc>
-                  <a:txBody>
-                    <a:bodyPr/>
-                    <a:lstStyle/>
-                    <a:p>
-                      <a:r>
-                        <a:rPr lang="en-US" dirty="0"/>
-                        <a:t>2</a:t>
-                      </a:r>
-                    </a:p>
-                  </a:txBody>
-                  <a:tcPr/>
-                </a:tc>
-                <a:tc>
-                  <a:txBody>
-                    <a:bodyPr/>
-                    <a:lstStyle/>
-                    <a:p>
-                      <a:r>
-                        <a:rPr lang="en-US" sz="1600" dirty="0" err="1">
-                          <a:solidFill>
-                            <a:srgbClr val="545454"/>
-                          </a:solidFill>
-                          <a:latin typeface="Lucida Console" panose="020B0609040504020204" pitchFamily="49" charset="0"/>
-                        </a:rPr>
-                        <a:t>HDIindex</a:t>
-                      </a:r>
-                      <a:r>
-                        <a:rPr lang="en-US" sz="1800" dirty="0">
-                          <a:solidFill>
-                            <a:schemeClr val="tx1"/>
-                          </a:solidFill>
-                          <a:latin typeface="+mn-lt"/>
-                        </a:rPr>
-                        <a:t>, </a:t>
-                      </a:r>
-                      <a:r>
-                        <a:rPr lang="en-US" sz="1600" dirty="0">
-                          <a:solidFill>
-                            <a:srgbClr val="545454"/>
-                          </a:solidFill>
-                          <a:latin typeface="Lucida Console" panose="020B0609040504020204" pitchFamily="49" charset="0"/>
-                        </a:rPr>
-                        <a:t>SPI</a:t>
-                      </a:r>
-                    </a:p>
-                  </a:txBody>
-                  <a:tcPr/>
-                </a:tc>
-                <a:tc>
-                  <a:txBody>
-                    <a:bodyPr/>
-                    <a:lstStyle/>
-                    <a:p>
-                      <a:r>
-                        <a:rPr lang="en-US" dirty="0"/>
-                        <a:t>Human development and social progress are not associated</a:t>
-                      </a:r>
-                    </a:p>
-                  </a:txBody>
-                  <a:tcPr/>
-                </a:tc>
-                <a:tc>
-                  <a:txBody>
-                    <a:bodyPr/>
-                    <a:lstStyle/>
-                    <a:p>
-                      <a:r>
-                        <a:rPr lang="en-US" dirty="0"/>
-                        <a:t>Human development and social progress are correlated</a:t>
-                      </a:r>
-                    </a:p>
-                  </a:txBody>
-                  <a:tcPr/>
-                </a:tc>
-                <a:tc>
-                  <a:txBody>
-                    <a:bodyPr/>
-                    <a:lstStyle/>
-                    <a:p>
-                      <a:r>
-                        <a:rPr lang="en-US" dirty="0"/>
-                        <a:t>Kendall’s Tau</a:t>
-                      </a:r>
-                      <a:endParaRPr lang="en-US" dirty="0">
-                        <a:solidFill>
-                          <a:srgbClr val="FF0000"/>
-                        </a:solidFill>
-                      </a:endParaRPr>
-                    </a:p>
-                  </a:txBody>
-                  <a:tcPr/>
-                </a:tc>
-                <a:tc>
-                  <a:txBody>
-                    <a:bodyPr/>
-                    <a:lstStyle/>
-                    <a:p>
-                      <a:r>
-                        <a:rPr lang="en-US" dirty="0"/>
-                        <a:t>Pearson’s Correlation Test</a:t>
-                      </a:r>
-                    </a:p>
-                  </a:txBody>
-                  <a:tcPr/>
-                </a:tc>
-                <a:extLst>
-                  <a:ext uri="{0D108BD9-81ED-4DB2-BD59-A6C34878D82A}">
-                    <a16:rowId xmlns:a16="http://schemas.microsoft.com/office/drawing/2014/main" val="2133545750"/>
-                  </a:ext>
-                </a:extLst>
-              </a:tr>
-              <a:tr h="370840">
-                <a:tc>
-                  <a:txBody>
-                    <a:bodyPr/>
-                    <a:lstStyle/>
-                    <a:p>
-                      <a:r>
-                        <a:rPr lang="en-US" dirty="0"/>
-                        <a:t>3</a:t>
-                      </a:r>
-                    </a:p>
-                  </a:txBody>
-                  <a:tcPr/>
-                </a:tc>
-                <a:tc>
-                  <a:txBody>
-                    <a:bodyPr/>
-                    <a:lstStyle/>
-                    <a:p>
-                      <a:r>
-                        <a:rPr lang="en-US" sz="1600" dirty="0" err="1">
-                          <a:solidFill>
-                            <a:srgbClr val="545454"/>
-                          </a:solidFill>
-                          <a:latin typeface="Lucida Console" panose="020B0609040504020204" pitchFamily="49" charset="0"/>
-                        </a:rPr>
-                        <a:t>logGDP</a:t>
-                      </a:r>
-                      <a:r>
-                        <a:rPr lang="en-US" sz="1600" dirty="0">
-                          <a:solidFill>
-                            <a:schemeClr val="tx1"/>
-                          </a:solidFill>
-                          <a:latin typeface="+mn-lt"/>
-                        </a:rPr>
-                        <a:t>, </a:t>
-                      </a:r>
-                      <a:r>
-                        <a:rPr lang="en-US" sz="1600" dirty="0" err="1">
-                          <a:solidFill>
-                            <a:srgbClr val="545454"/>
-                          </a:solidFill>
-                          <a:latin typeface="Lucida Console" panose="020B0609040504020204" pitchFamily="49" charset="0"/>
-                        </a:rPr>
-                        <a:t>infantmort</a:t>
-                      </a:r>
-                      <a:endParaRPr lang="en-US" sz="1600" dirty="0">
-                        <a:solidFill>
-                          <a:srgbClr val="545454"/>
-                        </a:solidFill>
-                        <a:latin typeface="Lucida Console" panose="020B0609040504020204" pitchFamily="49" charset="0"/>
-                      </a:endParaRPr>
-                    </a:p>
-                  </a:txBody>
-                  <a:tcPr/>
-                </a:tc>
-                <a:tc>
-                  <a:txBody>
-                    <a:bodyPr/>
-                    <a:lstStyle/>
-                    <a:p>
-                      <a:r>
-                        <a:rPr lang="en-US" dirty="0"/>
-                        <a:t>There is no relationship between log(GDP) and infant mortality</a:t>
-                      </a:r>
-                    </a:p>
-                  </a:txBody>
-                  <a:tcPr/>
-                </a:tc>
-                <a:tc>
-                  <a:txBody>
-                    <a:bodyPr/>
-                    <a:lstStyle/>
-                    <a:p>
-                      <a:r>
-                        <a:rPr lang="en-US" dirty="0"/>
-                        <a:t>There is a relationship between log(GDP) and infant mortality</a:t>
-                      </a:r>
-                      <a:endParaRPr lang="en-US" dirty="0">
-                        <a:solidFill>
-                          <a:srgbClr val="FF0000"/>
-                        </a:solidFill>
-                      </a:endParaRPr>
-                    </a:p>
-                  </a:txBody>
-                  <a:tcPr/>
-                </a:tc>
-                <a:tc>
-                  <a:txBody>
-                    <a:bodyPr/>
-                    <a:lstStyle/>
-                    <a:p>
-                      <a:r>
-                        <a:rPr lang="en-US" dirty="0" err="1"/>
-                        <a:t>Hoeffding’s</a:t>
-                      </a:r>
-                      <a:r>
-                        <a:rPr lang="en-US" dirty="0"/>
-                        <a:t> Test</a:t>
-                      </a:r>
-                    </a:p>
-                  </a:txBody>
-                  <a:tcPr/>
-                </a:tc>
-                <a:tc>
-                  <a:txBody>
-                    <a:bodyPr/>
-                    <a:lstStyle/>
-                    <a:p>
-                      <a:r>
-                        <a:rPr lang="en-US" dirty="0"/>
-                        <a:t>Pearson’s Correlation Test</a:t>
-                      </a:r>
-                    </a:p>
-                  </a:txBody>
-                  <a:tcPr/>
-                </a:tc>
-                <a:extLst>
-                  <a:ext uri="{0D108BD9-81ED-4DB2-BD59-A6C34878D82A}">
-                    <a16:rowId xmlns:a16="http://schemas.microsoft.com/office/drawing/2014/main" val="2550345065"/>
-                  </a:ext>
-                </a:extLst>
-              </a:tr>
-              <a:tr h="370840">
-                <a:tc>
-                  <a:txBody>
-                    <a:bodyPr/>
-                    <a:lstStyle/>
-                    <a:p>
-                      <a:r>
-                        <a:rPr lang="en-US" dirty="0"/>
-                        <a:t>4</a:t>
-                      </a:r>
-                    </a:p>
-                  </a:txBody>
-                  <a:tcPr/>
-                </a:tc>
-                <a:tc>
-                  <a:txBody>
-                    <a:bodyPr/>
-                    <a:lstStyle/>
-                    <a:p>
-                      <a:r>
-                        <a:rPr lang="en-US" sz="1600" dirty="0">
-                          <a:solidFill>
-                            <a:srgbClr val="545454"/>
-                          </a:solidFill>
-                          <a:latin typeface="Lucida Console" panose="020B0609040504020204" pitchFamily="49" charset="0"/>
-                        </a:rPr>
-                        <a:t>happiness</a:t>
-                      </a:r>
-                    </a:p>
-                  </a:txBody>
-                  <a:tcPr/>
-                </a:tc>
-                <a:tc>
-                  <a:txBody>
-                    <a:bodyPr/>
-                    <a:lstStyle/>
-                    <a:p>
-                      <a:r>
-                        <a:rPr lang="en-US" dirty="0"/>
-                        <a:t>Happiness is normally distributed</a:t>
-                      </a:r>
-                    </a:p>
-                  </a:txBody>
-                  <a:tcPr/>
-                </a:tc>
-                <a:tc>
-                  <a:txBody>
-                    <a:bodyPr/>
-                    <a:lstStyle/>
-                    <a:p>
-                      <a:r>
-                        <a:rPr lang="en-US" dirty="0"/>
-                        <a:t>Happiness is not normally distributed</a:t>
-                      </a:r>
-                    </a:p>
-                  </a:txBody>
-                  <a:tcPr/>
-                </a:tc>
-                <a:tc>
-                  <a:txBody>
-                    <a:bodyPr/>
-                    <a:lstStyle/>
-                    <a:p>
-                      <a:r>
-                        <a:rPr lang="en-US" dirty="0"/>
-                        <a:t>One-Sample Kolmogorov-Smirnov Test</a:t>
-                      </a:r>
-                      <a:endParaRPr lang="en-US" dirty="0">
-                        <a:solidFill>
-                          <a:srgbClr val="FF0000"/>
-                        </a:solidFill>
-                      </a:endParaRPr>
-                    </a:p>
-                  </a:txBody>
-                  <a:tcPr/>
-                </a:tc>
-                <a:tc>
-                  <a:txBody>
-                    <a:bodyPr/>
-                    <a:lstStyle/>
-                    <a:p>
-                      <a:r>
-                        <a:rPr lang="en-US" dirty="0"/>
-                        <a:t>Shapiro-Wilk Test</a:t>
-                      </a:r>
-                    </a:p>
-                  </a:txBody>
-                  <a:tcPr/>
-                </a:tc>
-                <a:extLst>
-                  <a:ext uri="{0D108BD9-81ED-4DB2-BD59-A6C34878D82A}">
-                    <a16:rowId xmlns:a16="http://schemas.microsoft.com/office/drawing/2014/main" val="1591929313"/>
-                  </a:ext>
-                </a:extLst>
-              </a:tr>
-              <a:tr h="370840">
-                <a:tc>
-                  <a:txBody>
-                    <a:bodyPr/>
-                    <a:lstStyle/>
-                    <a:p>
-                      <a:r>
-                        <a:rPr lang="en-US" dirty="0"/>
-                        <a:t>5</a:t>
-                      </a:r>
-                    </a:p>
-                  </a:txBody>
-                  <a:tcPr/>
-                </a:tc>
-                <a:tc>
-                  <a:txBody>
-                    <a:bodyPr/>
-                    <a:lstStyle/>
-                    <a:p>
-                      <a:r>
-                        <a:rPr lang="en-US" sz="1600" dirty="0" err="1">
-                          <a:solidFill>
-                            <a:srgbClr val="545454"/>
-                          </a:solidFill>
-                          <a:latin typeface="Lucida Console" panose="020B0609040504020204" pitchFamily="49" charset="0"/>
-                        </a:rPr>
-                        <a:t>HDI_cat</a:t>
-                      </a:r>
-                      <a:r>
-                        <a:rPr lang="en-US" sz="1600" dirty="0">
-                          <a:solidFill>
-                            <a:schemeClr val="tx1"/>
-                          </a:solidFill>
-                          <a:latin typeface="+mn-lt"/>
-                        </a:rPr>
-                        <a:t>, </a:t>
-                      </a:r>
-                      <a:r>
-                        <a:rPr lang="en-US" sz="1600" dirty="0" err="1">
-                          <a:solidFill>
-                            <a:srgbClr val="545454"/>
-                          </a:solidFill>
-                          <a:latin typeface="Lucida Console" panose="020B0609040504020204" pitchFamily="49" charset="0"/>
-                        </a:rPr>
-                        <a:t>infantmort</a:t>
-                      </a:r>
-                      <a:endParaRPr lang="en-US" sz="1600" dirty="0">
-                        <a:solidFill>
-                          <a:srgbClr val="545454"/>
-                        </a:solidFill>
-                        <a:latin typeface="Lucida Console" panose="020B0609040504020204" pitchFamily="49" charset="0"/>
-                      </a:endParaRPr>
-                    </a:p>
-                  </a:txBody>
-                  <a:tcPr/>
-                </a:tc>
-                <a:tc>
-                  <a:txBody>
-                    <a:bodyPr/>
-                    <a:lstStyle/>
-                    <a:p>
-                      <a:r>
-                        <a:rPr lang="en-US" dirty="0"/>
-                        <a:t>Infant mortality rate is the same across human development categories</a:t>
-                      </a:r>
-                    </a:p>
-                  </a:txBody>
-                  <a:tcPr/>
-                </a:tc>
-                <a:tc>
-                  <a:txBody>
-                    <a:bodyPr/>
-                    <a:lstStyle/>
-                    <a:p>
-                      <a:r>
-                        <a:rPr lang="en-US" dirty="0"/>
-                        <a:t>Infant mortality rate differs by human development category</a:t>
-                      </a:r>
-                      <a:endParaRPr lang="en-US" dirty="0">
-                        <a:solidFill>
-                          <a:srgbClr val="FF0000"/>
-                        </a:solidFill>
-                      </a:endParaRPr>
-                    </a:p>
-                  </a:txBody>
-                  <a:tcPr/>
-                </a:tc>
-                <a:tc>
-                  <a:txBody>
-                    <a:bodyPr/>
-                    <a:lstStyle/>
-                    <a:p>
-                      <a:r>
-                        <a:rPr lang="en-US" dirty="0"/>
-                        <a:t>Permutation F-Test</a:t>
-                      </a:r>
-                    </a:p>
-                  </a:txBody>
-                  <a:tcPr/>
-                </a:tc>
-                <a:tc>
-                  <a:txBody>
-                    <a:bodyPr/>
-                    <a:lstStyle/>
-                    <a:p>
-                      <a:r>
-                        <a:rPr lang="en-US" dirty="0"/>
-                        <a:t>ANOVA</a:t>
-                      </a:r>
-                    </a:p>
-                  </a:txBody>
-                  <a:tcPr/>
-                </a:tc>
-                <a:extLst>
-                  <a:ext uri="{0D108BD9-81ED-4DB2-BD59-A6C34878D82A}">
-                    <a16:rowId xmlns:a16="http://schemas.microsoft.com/office/drawing/2014/main" val="3210183669"/>
-                  </a:ext>
-                </a:extLst>
-              </a:tr>
-            </a:tbl>
-          </a:graphicData>
-        </a:graphic>
-      </p:graphicFrame>
-    </p:spTree>
-    <p:extLst>
-      <p:ext uri="{BB962C8B-B14F-4D97-AF65-F5344CB8AC3E}">
-        <p14:creationId xmlns:p14="http://schemas.microsoft.com/office/powerpoint/2010/main" val="2107817399"/>
-      </p:ext>
-    </p:extLst>
-  </p:cSld>
-  <p:clrMapOvr>
-    <a:masterClrMapping/>
-  </p:clrMapOvr>
-</p:sld>
-</file>
-
-<file path=ppt/slides/slide9.xml><?xml version="1.0" encoding="utf-8"?>
-<p:sld xmlns:a="http://schemas.openxmlformats.org/drawingml/2006/main" xmlns:r="http://schemas.openxmlformats.org/officeDocument/2006/relationships" xmlns:p="http://schemas.openxmlformats.org/presentationml/2006/main">
-  <p:cSld>
-    <p:spTree>
-      <p:nvGrpSpPr>
-        <p:cNvPr id="1" name=""/>
-        <p:cNvGrpSpPr/>
-        <p:nvPr/>
-      </p:nvGrpSpPr>
-      <p:grpSpPr>
-        <a:xfrm>
-          <a:off x="0" y="0"/>
-          <a:ext cx="0" cy="0"/>
-          <a:chOff x="0" y="0"/>
-          <a:chExt cx="0" cy="0"/>
-        </a:xfrm>
-      </p:grpSpPr>
-      <p:sp>
-        <p:nvSpPr>
-          <p:cNvPr id="2" name="Title 1">
-            <a:extLst>
-              <a:ext uri="{FF2B5EF4-FFF2-40B4-BE49-F238E27FC236}">
-                <a16:creationId xmlns:a16="http://schemas.microsoft.com/office/drawing/2014/main" id="{9C375C1D-A60F-47D9-82DB-79EDD0A16512}"/>
-              </a:ext>
-            </a:extLst>
-          </p:cNvPr>
-          <p:cNvSpPr>
-            <a:spLocks noGrp="1"/>
-          </p:cNvSpPr>
-          <p:nvPr>
-            <p:ph type="title"/>
-          </p:nvPr>
-        </p:nvSpPr>
-        <p:spPr/>
-        <p:txBody>
-          <a:bodyPr/>
-          <a:lstStyle/>
-          <a:p>
-            <a:r>
-              <a:rPr lang="en-US" dirty="0"/>
-              <a:t>SELECTED RESULTS: ANALYSIS 4</a:t>
-            </a:r>
-          </a:p>
-        </p:txBody>
-      </p:sp>
-      <p:sp>
-        <p:nvSpPr>
-          <p:cNvPr id="3" name="Content Placeholder 2">
-            <a:extLst>
-              <a:ext uri="{FF2B5EF4-FFF2-40B4-BE49-F238E27FC236}">
-                <a16:creationId xmlns:a16="http://schemas.microsoft.com/office/drawing/2014/main" id="{7A2BAD76-95DD-43BA-8566-7768201FE42A}"/>
-              </a:ext>
-            </a:extLst>
-          </p:cNvPr>
-          <p:cNvSpPr>
-            <a:spLocks noGrp="1"/>
-          </p:cNvSpPr>
-          <p:nvPr>
-            <p:ph idx="1"/>
-          </p:nvPr>
-        </p:nvSpPr>
-        <p:spPr/>
-        <p:txBody>
-          <a:bodyPr>
-            <a:normAutofit fontScale="92500" lnSpcReduction="20000"/>
-          </a:bodyPr>
-          <a:lstStyle/>
-          <a:p>
-            <a:r>
-              <a:rPr lang="en-US" dirty="0"/>
-              <a:t>Testing for normality of </a:t>
-            </a:r>
-            <a:r>
-              <a:rPr lang="en-US" sz="2400" dirty="0">
-                <a:solidFill>
-                  <a:srgbClr val="545454"/>
-                </a:solidFill>
-                <a:latin typeface="Lucida Console" panose="020B0609040504020204" pitchFamily="49" charset="0"/>
-              </a:rPr>
-              <a:t>happiness</a:t>
-            </a:r>
-            <a:r>
-              <a:rPr lang="en-US" dirty="0"/>
-              <a:t> via one-sample Kolmogorov-Smirnov (nonparametric) vs Shapiro-Wilk (parametric)</a:t>
-            </a:r>
-          </a:p>
-          <a:p>
-            <a:pPr lvl="1"/>
-            <a:r>
-              <a:rPr lang="en-US" dirty="0"/>
-              <a:t>Code:</a:t>
-            </a:r>
-          </a:p>
-          <a:p>
-            <a:endParaRPr lang="en-US" dirty="0"/>
-          </a:p>
-          <a:p>
-            <a:pPr marL="0" indent="0">
-              <a:buNone/>
-            </a:pPr>
-            <a:endParaRPr lang="en-US" dirty="0"/>
-          </a:p>
-          <a:p>
-            <a:r>
-              <a:rPr lang="en-US" i="1" dirty="0" err="1"/>
-              <a:t>p</a:t>
-            </a:r>
-            <a:r>
-              <a:rPr lang="en-US" i="1" baseline="-25000" dirty="0" err="1"/>
-              <a:t>KS</a:t>
-            </a:r>
-            <a:r>
-              <a:rPr lang="en-US" dirty="0"/>
-              <a:t> = 0.915 and </a:t>
-            </a:r>
-            <a:r>
-              <a:rPr lang="en-US" i="1" dirty="0" err="1"/>
-              <a:t>p</a:t>
-            </a:r>
-            <a:r>
-              <a:rPr lang="en-US" i="1" baseline="-25000" dirty="0" err="1"/>
-              <a:t>SW</a:t>
-            </a:r>
-            <a:r>
-              <a:rPr lang="en-US" dirty="0"/>
-              <a:t> = 0.129</a:t>
-            </a:r>
-          </a:p>
-          <a:p>
-            <a:r>
-              <a:rPr lang="en-US" dirty="0"/>
-              <a:t>Both exceed </a:t>
-            </a:r>
-            <a:r>
-              <a:rPr lang="el-GR" i="1" dirty="0"/>
-              <a:t>α</a:t>
-            </a:r>
-            <a:r>
-              <a:rPr lang="en-US" dirty="0"/>
-              <a:t> so </a:t>
-            </a:r>
-            <a:r>
-              <a:rPr lang="en-US" dirty="0">
-                <a:latin typeface="CMU Classical Serif" panose="02000603000000000000" pitchFamily="2" charset="0"/>
-                <a:ea typeface="CMU Classical Serif" panose="02000603000000000000" pitchFamily="2" charset="0"/>
-                <a:cs typeface="CMU Classical Serif" panose="02000603000000000000" pitchFamily="2" charset="0"/>
-              </a:rPr>
-              <a:t>H</a:t>
-            </a:r>
-            <a:r>
-              <a:rPr lang="en-US" baseline="-25000" dirty="0">
-                <a:latin typeface="CMU Classical Serif" panose="02000603000000000000" pitchFamily="2" charset="0"/>
-                <a:ea typeface="CMU Classical Serif" panose="02000603000000000000" pitchFamily="2" charset="0"/>
-                <a:cs typeface="CMU Classical Serif" panose="02000603000000000000" pitchFamily="2" charset="0"/>
-              </a:rPr>
-              <a:t>0</a:t>
-            </a:r>
-            <a:r>
-              <a:rPr lang="en-US" dirty="0"/>
-              <a:t> is retained for both tests</a:t>
-            </a:r>
-          </a:p>
-          <a:p>
-            <a:pPr lvl="1"/>
-            <a:r>
-              <a:rPr lang="en-US" dirty="0"/>
-              <a:t>Conclusion:  there is insufficient evidence to assert that the happiness score is not normally distributed</a:t>
-            </a:r>
-          </a:p>
-          <a:p>
-            <a:r>
-              <a:rPr lang="en-US" dirty="0"/>
-              <a:t>Both tests assume a continuous distribution</a:t>
-            </a:r>
-          </a:p>
-          <a:p>
-            <a:pPr lvl="1"/>
-            <a:r>
-              <a:rPr lang="en-US" dirty="0"/>
-              <a:t>Satisfied by the data ∴ both approaches are acceptable</a:t>
-            </a:r>
-          </a:p>
-          <a:p>
-            <a:r>
-              <a:rPr lang="en-US" dirty="0"/>
-              <a:t>Although neither </a:t>
-            </a:r>
-            <a:r>
-              <a:rPr lang="en-US" i="1" dirty="0"/>
-              <a:t>p</a:t>
-            </a:r>
-            <a:r>
-              <a:rPr lang="en-US" dirty="0"/>
-              <a:t>-value is significant, </a:t>
-            </a:r>
-            <a:r>
-              <a:rPr lang="en-US" i="1" dirty="0" err="1"/>
-              <a:t>p</a:t>
-            </a:r>
-            <a:r>
-              <a:rPr lang="en-US" i="1" baseline="-25000" dirty="0" err="1"/>
-              <a:t>SW</a:t>
-            </a:r>
-            <a:r>
-              <a:rPr lang="en-US" dirty="0"/>
-              <a:t> is much smaller than </a:t>
-            </a:r>
-            <a:r>
-              <a:rPr lang="en-US" i="1" dirty="0" err="1"/>
-              <a:t>p</a:t>
-            </a:r>
-            <a:r>
-              <a:rPr lang="en-US" i="1" baseline="-25000" dirty="0" err="1"/>
-              <a:t>KS</a:t>
-            </a:r>
-            <a:endParaRPr lang="en-US" dirty="0"/>
-          </a:p>
-          <a:p>
-            <a:pPr lvl="1"/>
-            <a:r>
-              <a:rPr lang="en-US" dirty="0"/>
-              <a:t>KS test may be less sensitive to deviations from normality</a:t>
-            </a:r>
-          </a:p>
-        </p:txBody>
-      </p:sp>
-      <p:sp>
-        <p:nvSpPr>
-          <p:cNvPr id="5" name="TextBox 4">
-            <a:extLst>
-              <a:ext uri="{FF2B5EF4-FFF2-40B4-BE49-F238E27FC236}">
-                <a16:creationId xmlns:a16="http://schemas.microsoft.com/office/drawing/2014/main" id="{25C33BF1-66AB-468F-B174-C14F6571B331}"/>
+                <a16:creationId xmlns:a16="http://schemas.microsoft.com/office/drawing/2014/main" id="{F6577355-8243-447D-90BC-C8B69CF14A70}"/>
               </a:ext>
             </a:extLst>
           </p:cNvPr>
@@ -8085,20 +9142,13 @@
         </p:nvSpPr>
         <p:spPr>
           <a:xfrm>
-            <a:off x="1479315" y="2341260"/>
-            <a:ext cx="9809074" cy="646331"/>
+            <a:off x="4957944" y="783039"/>
+            <a:ext cx="4797908" cy="338554"/>
           </a:xfrm>
           <a:prstGeom prst="rect">
             <a:avLst/>
           </a:prstGeom>
-          <a:solidFill>
-            <a:srgbClr val="404040"/>
-          </a:solidFill>
-          <a:ln>
-            <a:solidFill>
-              <a:schemeClr val="tx1"/>
-            </a:solidFill>
-          </a:ln>
+          <a:noFill/>
         </p:spPr>
         <p:txBody>
           <a:bodyPr wrap="square" rtlCol="0">
@@ -8107,311 +9157,14 @@
           <a:lstStyle/>
           <a:p>
             <a:r>
-              <a:rPr lang="en-US" sz="1200" dirty="0">
-                <a:solidFill>
-                  <a:schemeClr val="bg1"/>
-                </a:solidFill>
-                <a:latin typeface="Lucida Console" panose="020B0609040504020204" pitchFamily="49" charset="0"/>
+              <a:rPr lang="en-US" sz="1600" b="1" dirty="0">
+                <a:solidFill>
+                  <a:srgbClr val="545454"/>
+                </a:solidFill>
+                <a:latin typeface="Calibri" panose="020F0502020204030204" pitchFamily="34" charset="0"/>
+                <a:cs typeface="Calibri" panose="020F0502020204030204" pitchFamily="34" charset="0"/>
               </a:rPr>
-              <a:t>analysis4_nonpara </a:t>
-            </a:r>
-            <a:r>
-              <a:rPr lang="en-US" sz="1200" dirty="0">
-                <a:solidFill>
-                  <a:schemeClr val="accent1"/>
-                </a:solidFill>
-                <a:latin typeface="Lucida Console" panose="020B0609040504020204" pitchFamily="49" charset="0"/>
-              </a:rPr>
-              <a:t>&lt;-</a:t>
-            </a:r>
-            <a:r>
-              <a:rPr lang="en-US" sz="1200" dirty="0">
-                <a:solidFill>
-                  <a:schemeClr val="bg1"/>
-                </a:solidFill>
-                <a:latin typeface="Lucida Console" panose="020B0609040504020204" pitchFamily="49" charset="0"/>
-              </a:rPr>
-              <a:t> </a:t>
-            </a:r>
-            <a:r>
-              <a:rPr lang="en-US" sz="1200" dirty="0" err="1">
-                <a:solidFill>
-                  <a:schemeClr val="bg1"/>
-                </a:solidFill>
-                <a:latin typeface="Lucida Console" panose="020B0609040504020204" pitchFamily="49" charset="0"/>
-              </a:rPr>
-              <a:t>ks.test</a:t>
-            </a:r>
-            <a:r>
-              <a:rPr lang="en-US" sz="1200" dirty="0">
-                <a:solidFill>
-                  <a:schemeClr val="accent1"/>
-                </a:solidFill>
-                <a:latin typeface="Lucida Console" panose="020B0609040504020204" pitchFamily="49" charset="0"/>
-              </a:rPr>
-              <a:t>(</a:t>
-            </a:r>
-            <a:r>
-              <a:rPr lang="en-US" sz="1200" dirty="0" err="1">
-                <a:solidFill>
-                  <a:schemeClr val="bg1"/>
-                </a:solidFill>
-                <a:latin typeface="Lucida Console" panose="020B0609040504020204" pitchFamily="49" charset="0"/>
-              </a:rPr>
-              <a:t>alldata</a:t>
-            </a:r>
-            <a:r>
-              <a:rPr lang="en-US" sz="1200" dirty="0" err="1">
-                <a:solidFill>
-                  <a:schemeClr val="accent1"/>
-                </a:solidFill>
-                <a:latin typeface="Lucida Console" panose="020B0609040504020204" pitchFamily="49" charset="0"/>
-              </a:rPr>
-              <a:t>$</a:t>
-            </a:r>
-            <a:r>
-              <a:rPr lang="en-US" sz="1200" dirty="0" err="1">
-                <a:solidFill>
-                  <a:schemeClr val="bg1"/>
-                </a:solidFill>
-                <a:latin typeface="Lucida Console" panose="020B0609040504020204" pitchFamily="49" charset="0"/>
-              </a:rPr>
-              <a:t>happiness</a:t>
-            </a:r>
-            <a:r>
-              <a:rPr lang="en-US" sz="1200" dirty="0">
-                <a:solidFill>
-                  <a:schemeClr val="bg1"/>
-                </a:solidFill>
-                <a:latin typeface="Lucida Console" panose="020B0609040504020204" pitchFamily="49" charset="0"/>
-              </a:rPr>
-              <a:t>, </a:t>
-            </a:r>
-            <a:r>
-              <a:rPr lang="en-US" sz="1200" dirty="0">
-                <a:solidFill>
-                  <a:schemeClr val="accent6">
-                    <a:lumMod val="40000"/>
-                    <a:lumOff val="60000"/>
-                  </a:schemeClr>
-                </a:solidFill>
-                <a:latin typeface="Lucida Console" panose="020B0609040504020204" pitchFamily="49" charset="0"/>
-              </a:rPr>
-              <a:t>"</a:t>
-            </a:r>
-            <a:r>
-              <a:rPr lang="en-US" sz="1200" dirty="0" err="1">
-                <a:solidFill>
-                  <a:schemeClr val="accent6">
-                    <a:lumMod val="40000"/>
-                    <a:lumOff val="60000"/>
-                  </a:schemeClr>
-                </a:solidFill>
-                <a:latin typeface="Lucida Console" panose="020B0609040504020204" pitchFamily="49" charset="0"/>
-              </a:rPr>
-              <a:t>pnorm</a:t>
-            </a:r>
-            <a:r>
-              <a:rPr lang="en-US" sz="1200" dirty="0">
-                <a:solidFill>
-                  <a:schemeClr val="accent6">
-                    <a:lumMod val="40000"/>
-                    <a:lumOff val="60000"/>
-                  </a:schemeClr>
-                </a:solidFill>
-                <a:latin typeface="Lucida Console" panose="020B0609040504020204" pitchFamily="49" charset="0"/>
-              </a:rPr>
-              <a:t>"</a:t>
-            </a:r>
-            <a:r>
-              <a:rPr lang="en-US" sz="1200" dirty="0">
-                <a:solidFill>
-                  <a:schemeClr val="bg1"/>
-                </a:solidFill>
-                <a:latin typeface="Lucida Console" panose="020B0609040504020204" pitchFamily="49" charset="0"/>
-              </a:rPr>
-              <a:t>, mean</a:t>
-            </a:r>
-            <a:r>
-              <a:rPr lang="en-US" sz="1200" dirty="0">
-                <a:solidFill>
-                  <a:schemeClr val="accent1"/>
-                </a:solidFill>
-                <a:latin typeface="Lucida Console" panose="020B0609040504020204" pitchFamily="49" charset="0"/>
-              </a:rPr>
-              <a:t>(</a:t>
-            </a:r>
-            <a:r>
-              <a:rPr lang="en-US" sz="1200" dirty="0" err="1">
-                <a:solidFill>
-                  <a:schemeClr val="bg1"/>
-                </a:solidFill>
-                <a:latin typeface="Lucida Console" panose="020B0609040504020204" pitchFamily="49" charset="0"/>
-              </a:rPr>
-              <a:t>alldata$happiness</a:t>
-            </a:r>
-            <a:r>
-              <a:rPr lang="en-US" sz="1200" dirty="0">
-                <a:solidFill>
-                  <a:schemeClr val="accent1"/>
-                </a:solidFill>
-                <a:latin typeface="Lucida Console" panose="020B0609040504020204" pitchFamily="49" charset="0"/>
-              </a:rPr>
-              <a:t>)</a:t>
-            </a:r>
-            <a:r>
-              <a:rPr lang="en-US" sz="1200" dirty="0">
-                <a:solidFill>
-                  <a:schemeClr val="bg1"/>
-                </a:solidFill>
-                <a:latin typeface="Lucida Console" panose="020B0609040504020204" pitchFamily="49" charset="0"/>
-              </a:rPr>
-              <a:t>, </a:t>
-            </a:r>
-            <a:r>
-              <a:rPr lang="en-US" sz="1200" dirty="0" err="1">
-                <a:solidFill>
-                  <a:schemeClr val="bg1"/>
-                </a:solidFill>
-                <a:latin typeface="Lucida Console" panose="020B0609040504020204" pitchFamily="49" charset="0"/>
-              </a:rPr>
-              <a:t>sd</a:t>
-            </a:r>
-            <a:r>
-              <a:rPr lang="en-US" sz="1200" dirty="0">
-                <a:solidFill>
-                  <a:schemeClr val="accent1"/>
-                </a:solidFill>
-                <a:latin typeface="Lucida Console" panose="020B0609040504020204" pitchFamily="49" charset="0"/>
-              </a:rPr>
-              <a:t>(</a:t>
-            </a:r>
-            <a:r>
-              <a:rPr lang="en-US" sz="1200" dirty="0" err="1">
-                <a:solidFill>
-                  <a:schemeClr val="bg1"/>
-                </a:solidFill>
-                <a:latin typeface="Lucida Console" panose="020B0609040504020204" pitchFamily="49" charset="0"/>
-              </a:rPr>
-              <a:t>alldata</a:t>
-            </a:r>
-            <a:r>
-              <a:rPr lang="en-US" sz="1200" dirty="0" err="1">
-                <a:solidFill>
-                  <a:schemeClr val="accent1"/>
-                </a:solidFill>
-                <a:latin typeface="Lucida Console" panose="020B0609040504020204" pitchFamily="49" charset="0"/>
-              </a:rPr>
-              <a:t>$</a:t>
-            </a:r>
-            <a:r>
-              <a:rPr lang="en-US" sz="1200" dirty="0" err="1">
-                <a:solidFill>
-                  <a:schemeClr val="bg1"/>
-                </a:solidFill>
-                <a:latin typeface="Lucida Console" panose="020B0609040504020204" pitchFamily="49" charset="0"/>
-              </a:rPr>
-              <a:t>happiness</a:t>
-            </a:r>
-            <a:r>
-              <a:rPr lang="en-US" sz="1200" dirty="0">
-                <a:solidFill>
-                  <a:schemeClr val="accent1"/>
-                </a:solidFill>
-                <a:latin typeface="Lucida Console" panose="020B0609040504020204" pitchFamily="49" charset="0"/>
-              </a:rPr>
-              <a:t>))</a:t>
-            </a:r>
-          </a:p>
-          <a:p>
-            <a:endParaRPr lang="en-US" sz="1200" dirty="0">
-              <a:solidFill>
-                <a:schemeClr val="bg1"/>
-              </a:solidFill>
-              <a:latin typeface="Lucida Console" panose="020B0609040504020204" pitchFamily="49" charset="0"/>
-            </a:endParaRPr>
-          </a:p>
-          <a:p>
-            <a:r>
-              <a:rPr lang="en-US" sz="1200" dirty="0">
-                <a:solidFill>
-                  <a:schemeClr val="bg1"/>
-                </a:solidFill>
-                <a:latin typeface="Lucida Console" panose="020B0609040504020204" pitchFamily="49" charset="0"/>
-              </a:rPr>
-              <a:t>analysis4_para </a:t>
-            </a:r>
-            <a:r>
-              <a:rPr lang="en-US" sz="1200" dirty="0">
-                <a:solidFill>
-                  <a:schemeClr val="accent1"/>
-                </a:solidFill>
-                <a:latin typeface="Lucida Console" panose="020B0609040504020204" pitchFamily="49" charset="0"/>
-              </a:rPr>
-              <a:t>&lt;-</a:t>
-            </a:r>
-            <a:r>
-              <a:rPr lang="en-US" sz="1200" dirty="0">
-                <a:solidFill>
-                  <a:schemeClr val="bg1"/>
-                </a:solidFill>
-                <a:latin typeface="Lucida Console" panose="020B0609040504020204" pitchFamily="49" charset="0"/>
-              </a:rPr>
-              <a:t> </a:t>
-            </a:r>
-            <a:r>
-              <a:rPr lang="en-US" sz="1200" dirty="0" err="1">
-                <a:solidFill>
-                  <a:schemeClr val="bg1"/>
-                </a:solidFill>
-                <a:latin typeface="Lucida Console" panose="020B0609040504020204" pitchFamily="49" charset="0"/>
-              </a:rPr>
-              <a:t>shapiro.test</a:t>
-            </a:r>
-            <a:r>
-              <a:rPr lang="en-US" sz="1200" dirty="0">
-                <a:solidFill>
-                  <a:schemeClr val="accent1"/>
-                </a:solidFill>
-                <a:latin typeface="Lucida Console" panose="020B0609040504020204" pitchFamily="49" charset="0"/>
-              </a:rPr>
-              <a:t>(</a:t>
-            </a:r>
-            <a:r>
-              <a:rPr lang="en-US" sz="1200" dirty="0" err="1">
-                <a:solidFill>
-                  <a:schemeClr val="bg1"/>
-                </a:solidFill>
-                <a:latin typeface="Lucida Console" panose="020B0609040504020204" pitchFamily="49" charset="0"/>
-              </a:rPr>
-              <a:t>alldata</a:t>
-            </a:r>
-            <a:r>
-              <a:rPr lang="en-US" sz="1200" dirty="0" err="1">
-                <a:solidFill>
-                  <a:schemeClr val="accent1"/>
-                </a:solidFill>
-                <a:latin typeface="Lucida Console" panose="020B0609040504020204" pitchFamily="49" charset="0"/>
-              </a:rPr>
-              <a:t>$</a:t>
-            </a:r>
-            <a:r>
-              <a:rPr lang="en-US" sz="1200" dirty="0" err="1">
-                <a:solidFill>
-                  <a:schemeClr val="bg1"/>
-                </a:solidFill>
-                <a:latin typeface="Lucida Console" panose="020B0609040504020204" pitchFamily="49" charset="0"/>
-              </a:rPr>
-              <a:t>happiness</a:t>
-            </a:r>
-            <a:r>
-              <a:rPr lang="en-US" sz="1200" dirty="0">
-                <a:solidFill>
-                  <a:schemeClr val="accent1"/>
-                </a:solidFill>
-                <a:latin typeface="Lucida Console" panose="020B0609040504020204" pitchFamily="49" charset="0"/>
-              </a:rPr>
-              <a:t>)</a:t>
+              <a:t>Correlation Matrix, Continuous Variables</a:t>
             </a:r>
           </a:p>
         </p:txBody>
@@ -8419,7 +9172,7 @@
     </p:spTree>
     <p:extLst>
       <p:ext uri="{BB962C8B-B14F-4D97-AF65-F5344CB8AC3E}">
-        <p14:creationId xmlns:p14="http://schemas.microsoft.com/office/powerpoint/2010/main" val="870407094"/>
+        <p14:creationId xmlns:p14="http://schemas.microsoft.com/office/powerpoint/2010/main" val="42750524"/>
       </p:ext>
     </p:extLst>
   </p:cSld>

</xml_diff>

<commit_message>
Proofreading edits to Rmd and slides
</commit_message>
<xml_diff>
--- a/Prioli_Final_Proj.pptx
+++ b/Prioli_Final_Proj.pptx
@@ -6761,14 +6761,20 @@
               <a:t> or </a:t>
             </a:r>
             <a:r>
-              <a:rPr lang="en-US" sz="2300" dirty="0">
+              <a:rPr lang="en-US" sz="2300" dirty="0" err="1">
                 <a:solidFill>
                   <a:srgbClr val="545454"/>
                 </a:solidFill>
                 <a:latin typeface="Lucida Console" panose="020B0609040504020204" pitchFamily="49" charset="0"/>
               </a:rPr>
-              <a:t>HDI</a:t>
-            </a:r>
+              <a:t>HDIindex</a:t>
+            </a:r>
+            <a:endParaRPr lang="en-US" sz="2300" dirty="0">
+              <a:solidFill>
+                <a:srgbClr val="545454"/>
+              </a:solidFill>
+              <a:latin typeface="Lucida Console" panose="020B0609040504020204" pitchFamily="49" charset="0"/>
+            </a:endParaRPr>
           </a:p>
           <a:p>
             <a:pPr lvl="2"/>
@@ -6903,13 +6909,13 @@
               <a:t> and </a:t>
             </a:r>
             <a:r>
-              <a:rPr lang="en-US" sz="2100" dirty="0">
+              <a:rPr lang="en-US" sz="2100" dirty="0" err="1">
                 <a:solidFill>
                   <a:srgbClr val="545454"/>
                 </a:solidFill>
                 <a:latin typeface="Lucida Console" panose="020B0609040504020204" pitchFamily="49" charset="0"/>
               </a:rPr>
-              <a:t>HDI</a:t>
+              <a:t>HDIindex</a:t>
             </a:r>
             <a:r>
               <a:rPr lang="en-US" dirty="0"/>
@@ -7065,7 +7071,7 @@
                 </a:solidFill>
                 <a:latin typeface="Lucida Console" panose="020B0609040504020204" pitchFamily="49" charset="0"/>
               </a:rPr>
-              <a:t>HDI</a:t>
+              <a:t>HDIindex</a:t>
             </a:r>
             <a:r>
               <a:rPr lang="en-US" sz="1200" dirty="0">
@@ -7255,7 +7261,7 @@
                 </a:solidFill>
                 <a:latin typeface="Lucida Console" panose="020B0609040504020204" pitchFamily="49" charset="0"/>
               </a:rPr>
-              <a:t>HDI</a:t>
+              <a:t>HDIindex</a:t>
             </a:r>
             <a:r>
               <a:rPr lang="en-US" sz="1200" dirty="0">
@@ -8826,10 +8832,15 @@
         <p:spPr/>
         <p:txBody>
           <a:bodyPr>
-            <a:normAutofit fontScale="85000" lnSpcReduction="20000"/>
+            <a:normAutofit fontScale="70000" lnSpcReduction="20000"/>
           </a:bodyPr>
           <a:lstStyle/>
           <a:p>
+            <a:pPr>
+              <a:lnSpc>
+                <a:spcPct val="105000"/>
+              </a:lnSpc>
+            </a:pPr>
             <a:r>
               <a:rPr lang="en-US" dirty="0"/>
               <a:t>Testing for difference in log(</a:t>
@@ -8862,26 +8873,47 @@
             </a:r>
           </a:p>
           <a:p>
-            <a:pPr lvl="1"/>
+            <a:pPr lvl="1">
+              <a:lnSpc>
+                <a:spcPct val="105000"/>
+              </a:lnSpc>
+            </a:pPr>
             <a:r>
               <a:rPr lang="en-US" dirty="0"/>
               <a:t>Code:</a:t>
             </a:r>
           </a:p>
           <a:p>
-            <a:pPr lvl="1"/>
+            <a:pPr lvl="1">
+              <a:lnSpc>
+                <a:spcPct val="105000"/>
+              </a:lnSpc>
+            </a:pPr>
             <a:endParaRPr lang="en-US" dirty="0"/>
           </a:p>
           <a:p>
             <a:pPr marL="0" indent="0">
+              <a:lnSpc>
+                <a:spcPct val="105000"/>
+              </a:lnSpc>
               <a:buNone/>
             </a:pPr>
             <a:endParaRPr lang="en-US" dirty="0"/>
           </a:p>
           <a:p>
+            <a:pPr>
+              <a:lnSpc>
+                <a:spcPct val="105000"/>
+              </a:lnSpc>
+            </a:pPr>
             <a:endParaRPr lang="en-US" dirty="0"/>
           </a:p>
           <a:p>
+            <a:pPr>
+              <a:lnSpc>
+                <a:spcPct val="105000"/>
+              </a:lnSpc>
+            </a:pPr>
             <a:r>
               <a:rPr lang="en-US" dirty="0"/>
               <a:t>Both tests yielded </a:t>
@@ -8916,7 +8948,11 @@
             </a:r>
           </a:p>
           <a:p>
-            <a:pPr lvl="1"/>
+            <a:pPr lvl="1">
+              <a:lnSpc>
+                <a:spcPct val="105000"/>
+              </a:lnSpc>
+            </a:pPr>
             <a:r>
               <a:rPr lang="en-US" dirty="0"/>
               <a:t>Conclusion:  at the </a:t>
@@ -8931,32 +8967,55 @@
             </a:r>
           </a:p>
           <a:p>
+            <a:pPr>
+              <a:lnSpc>
+                <a:spcPct val="105000"/>
+              </a:lnSpc>
+            </a:pPr>
             <a:r>
               <a:rPr lang="en-US" dirty="0"/>
               <a:t>Both tests assume independence and constant variance</a:t>
             </a:r>
           </a:p>
           <a:p>
-            <a:pPr lvl="1"/>
+            <a:pPr lvl="1">
+              <a:lnSpc>
+                <a:spcPct val="105000"/>
+              </a:lnSpc>
+            </a:pPr>
             <a:r>
               <a:rPr lang="en-US" dirty="0"/>
               <a:t>Satisfied by the data</a:t>
             </a:r>
           </a:p>
           <a:p>
+            <a:pPr>
+              <a:lnSpc>
+                <a:spcPct val="105000"/>
+              </a:lnSpc>
+            </a:pPr>
             <a:r>
               <a:rPr lang="en-US" dirty="0"/>
               <a:t>ANOVA assumes normality</a:t>
             </a:r>
           </a:p>
           <a:p>
-            <a:pPr lvl="1"/>
+            <a:pPr lvl="1">
+              <a:lnSpc>
+                <a:spcPct val="105000"/>
+              </a:lnSpc>
+            </a:pPr>
             <a:r>
               <a:rPr lang="en-US" dirty="0"/>
               <a:t>Violated by Medium category (see next slide)</a:t>
             </a:r>
           </a:p>
           <a:p>
+            <a:pPr>
+              <a:lnSpc>
+                <a:spcPct val="105000"/>
+              </a:lnSpc>
+            </a:pPr>
             <a:r>
               <a:rPr lang="en-US" dirty="0"/>
               <a:t>The parametric method is inappropriate in this case but the nonparametric approach works</a:t>
@@ -8978,7 +9037,7 @@
         </p:nvSpPr>
         <p:spPr>
           <a:xfrm>
-            <a:off x="1497028" y="2219880"/>
+            <a:off x="1497028" y="2333169"/>
             <a:ext cx="7218096" cy="1015663"/>
           </a:xfrm>
           <a:prstGeom prst="rect">
@@ -10298,7 +10357,7 @@
           <a:p>
             <a:r>
               <a:rPr lang="en-US" dirty="0"/>
-              <a:t>Parametric methods were only appropriate in 2/5 analyses</a:t>
+              <a:t>Parametric methods were only appropriate in 2/5 (40%) analyses</a:t>
             </a:r>
           </a:p>
           <a:p>
@@ -10400,7 +10459,7 @@
           <a:p>
             <a:r>
               <a:rPr lang="en-US" dirty="0"/>
-              <a:t>With increasing globalization, it’s important to understand how United States compares to other countries on key Quality of Life (QoL) measures</a:t>
+              <a:t>With increasing globalization, it’s important to understand how the United States compares to other countries on key Quality of Life (QoL) measures</a:t>
             </a:r>
           </a:p>
           <a:p>
@@ -10500,7 +10559,7 @@
           <a:p>
             <a:r>
               <a:rPr lang="en-US" dirty="0"/>
-              <a:t>Missing data was a big limitation</a:t>
+              <a:t>Major limitation was missing data</a:t>
             </a:r>
           </a:p>
           <a:p>
@@ -10910,7 +10969,7 @@
         <p:spPr/>
         <p:txBody>
           <a:bodyPr>
-            <a:normAutofit lnSpcReduction="10000"/>
+            <a:normAutofit fontScale="92500" lnSpcReduction="10000"/>
           </a:bodyPr>
           <a:lstStyle/>
           <a:p>
@@ -11011,6 +11070,13 @@
             <a:r>
               <a:rPr lang="en-US" dirty="0"/>
               <a:t>This is a finding of this analysis, but unfortunately limits the utility of these variables</a:t>
+            </a:r>
+          </a:p>
+          <a:p>
+            <a:pPr lvl="1"/>
+            <a:r>
+              <a:rPr lang="en-US" dirty="0"/>
+              <a:t>Also interrelated were infant mortality and the life expectancy variables</a:t>
             </a:r>
           </a:p>
           <a:p>
@@ -11631,7 +11697,13 @@
           <a:p>
             <a:r>
               <a:rPr lang="en-US" dirty="0"/>
-              <a:t>The objective of this study was to explore the distributions of and relationships between key QoL indicators using both nonparametric and parametric methods, and to compare the methods in terms of results and appropriateness</a:t>
+              <a:t>Explore the distributions of and relationships between key QoL indicators using both nonparametric and parametric methods</a:t>
+            </a:r>
+          </a:p>
+          <a:p>
+            <a:r>
+              <a:rPr lang="en-US" dirty="0"/>
+              <a:t>Compare the methods in terms of results and appropriateness</a:t>
             </a:r>
           </a:p>
         </p:txBody>
@@ -11875,7 +11947,7 @@
             <p:ph idx="1"/>
             <p:extLst>
               <p:ext uri="{D42A27DB-BD31-4B8C-83A1-F6EECF244321}">
-                <p14:modId xmlns:p14="http://schemas.microsoft.com/office/powerpoint/2010/main" val="2142971193"/>
+                <p14:modId xmlns:p14="http://schemas.microsoft.com/office/powerpoint/2010/main" val="1962871006"/>
               </p:ext>
             </p:extLst>
           </p:nvPr>
@@ -12278,7 +12350,7 @@
                             <a:srgbClr val="404040"/>
                           </a:solidFill>
                         </a:rPr>
-                        <a:t>Gross Domestic Product, log transform; valued in $US 2018</a:t>
+                        <a:t>Gross Domestic Product (GDP), log transform; valued in $US 2018</a:t>
                       </a:r>
                     </a:p>
                   </a:txBody>
@@ -13819,7 +13891,7 @@
                 </a:solidFill>
                 <a:latin typeface="Lucida Console" panose="020B0609040504020204" pitchFamily="49" charset="0"/>
               </a:rPr>
-              <a:t>sixty_MF</a:t>
+              <a:t>infantmort</a:t>
             </a:r>
             <a:r>
               <a:rPr lang="en-US" sz="1600" dirty="0"/>
@@ -13949,6 +14021,58 @@
         <p:spPr>
           <a:xfrm>
             <a:off x="7310229" y="4242208"/>
+            <a:ext cx="713631" cy="562231"/>
+          </a:xfrm>
+          <a:prstGeom prst="rect">
+            <a:avLst/>
+          </a:prstGeom>
+          <a:noFill/>
+          <a:ln w="19050">
+            <a:solidFill>
+              <a:schemeClr val="accent2"/>
+            </a:solidFill>
+          </a:ln>
+        </p:spPr>
+        <p:style>
+          <a:lnRef idx="2">
+            <a:schemeClr val="accent1">
+              <a:shade val="50000"/>
+            </a:schemeClr>
+          </a:lnRef>
+          <a:fillRef idx="1">
+            <a:schemeClr val="accent1"/>
+          </a:fillRef>
+          <a:effectRef idx="0">
+            <a:schemeClr val="accent1"/>
+          </a:effectRef>
+          <a:fontRef idx="minor">
+            <a:schemeClr val="lt1"/>
+          </a:fontRef>
+        </p:style>
+        <p:txBody>
+          <a:bodyPr rtlCol="0" anchor="ctr"/>
+          <a:lstStyle/>
+          <a:p>
+            <a:pPr algn="ctr"/>
+            <a:endParaRPr lang="en-US"/>
+          </a:p>
+        </p:txBody>
+      </p:sp>
+      <p:sp>
+        <p:nvSpPr>
+          <p:cNvPr id="9" name="Rectangle 8">
+            <a:extLst>
+              <a:ext uri="{FF2B5EF4-FFF2-40B4-BE49-F238E27FC236}">
+                <a16:creationId xmlns:a16="http://schemas.microsoft.com/office/drawing/2014/main" id="{366374D7-D288-435E-8912-032F909F37E8}"/>
+              </a:ext>
+            </a:extLst>
+          </p:cNvPr>
+          <p:cNvSpPr/>
+          <p:nvPr/>
+        </p:nvSpPr>
+        <p:spPr>
+          <a:xfrm>
+            <a:off x="9527447" y="1983240"/>
             <a:ext cx="713631" cy="562231"/>
           </a:xfrm>
           <a:prstGeom prst="rect">

</xml_diff>

<commit_message>
Adding to Abstract and Discussion; fixing dollar-sign labeling of logGDP in Rmd and slides
</commit_message>
<xml_diff>
--- a/Prioli_Final_Proj.pptx
+++ b/Prioli_Final_Proj.pptx
@@ -231,7 +231,7 @@
           <a:p>
             <a:fld id="{4EE169DE-67F4-4753-9B1C-F1A309C78068}" type="datetimeFigureOut">
               <a:rPr lang="en-US" smtClean="0"/>
-              <a:t>12/13/2018</a:t>
+              <a:t>12/14/2018</a:t>
             </a:fld>
             <a:endParaRPr lang="en-US"/>
           </a:p>
@@ -698,7 +698,7 @@
           <a:p>
             <a:fld id="{CF647BC4-379F-449B-8ACB-1D0356C51E22}" type="datetimeFigureOut">
               <a:rPr lang="en-US" smtClean="0"/>
-              <a:t>12/13/2018</a:t>
+              <a:t>12/14/2018</a:t>
             </a:fld>
             <a:endParaRPr lang="en-US"/>
           </a:p>
@@ -888,7 +888,7 @@
           <a:p>
             <a:fld id="{CF647BC4-379F-449B-8ACB-1D0356C51E22}" type="datetimeFigureOut">
               <a:rPr lang="en-US" smtClean="0"/>
-              <a:t>12/13/2018</a:t>
+              <a:t>12/14/2018</a:t>
             </a:fld>
             <a:endParaRPr lang="en-US"/>
           </a:p>
@@ -1068,7 +1068,7 @@
           <a:p>
             <a:fld id="{CF647BC4-379F-449B-8ACB-1D0356C51E22}" type="datetimeFigureOut">
               <a:rPr lang="en-US" smtClean="0"/>
-              <a:t>12/13/2018</a:t>
+              <a:t>12/14/2018</a:t>
             </a:fld>
             <a:endParaRPr lang="en-US"/>
           </a:p>
@@ -1259,7 +1259,7 @@
           <a:p>
             <a:fld id="{CF647BC4-379F-449B-8ACB-1D0356C51E22}" type="datetimeFigureOut">
               <a:rPr lang="en-US" smtClean="0"/>
-              <a:t>12/13/2018</a:t>
+              <a:t>12/14/2018</a:t>
             </a:fld>
             <a:endParaRPr lang="en-US"/>
           </a:p>
@@ -1515,7 +1515,7 @@
           <a:p>
             <a:fld id="{CF647BC4-379F-449B-8ACB-1D0356C51E22}" type="datetimeFigureOut">
               <a:rPr lang="en-US" smtClean="0"/>
-              <a:t>12/13/2018</a:t>
+              <a:t>12/14/2018</a:t>
             </a:fld>
             <a:endParaRPr lang="en-US"/>
           </a:p>
@@ -1803,7 +1803,7 @@
           <a:p>
             <a:fld id="{CF647BC4-379F-449B-8ACB-1D0356C51E22}" type="datetimeFigureOut">
               <a:rPr lang="en-US" smtClean="0"/>
-              <a:t>12/13/2018</a:t>
+              <a:t>12/14/2018</a:t>
             </a:fld>
             <a:endParaRPr lang="en-US"/>
           </a:p>
@@ -2241,7 +2241,7 @@
           <a:p>
             <a:fld id="{CF647BC4-379F-449B-8ACB-1D0356C51E22}" type="datetimeFigureOut">
               <a:rPr lang="en-US" smtClean="0"/>
-              <a:t>12/13/2018</a:t>
+              <a:t>12/14/2018</a:t>
             </a:fld>
             <a:endParaRPr lang="en-US"/>
           </a:p>
@@ -2359,7 +2359,7 @@
           <a:p>
             <a:fld id="{CF647BC4-379F-449B-8ACB-1D0356C51E22}" type="datetimeFigureOut">
               <a:rPr lang="en-US" smtClean="0"/>
-              <a:t>12/13/2018</a:t>
+              <a:t>12/14/2018</a:t>
             </a:fld>
             <a:endParaRPr lang="en-US"/>
           </a:p>
@@ -2454,7 +2454,7 @@
           <a:p>
             <a:fld id="{CF647BC4-379F-449B-8ACB-1D0356C51E22}" type="datetimeFigureOut">
               <a:rPr lang="en-US" smtClean="0"/>
-              <a:t>12/13/2018</a:t>
+              <a:t>12/14/2018</a:t>
             </a:fld>
             <a:endParaRPr lang="en-US"/>
           </a:p>
@@ -2810,7 +2810,7 @@
           <a:p>
             <a:fld id="{CF647BC4-379F-449B-8ACB-1D0356C51E22}" type="datetimeFigureOut">
               <a:rPr lang="en-US" smtClean="0"/>
-              <a:t>12/13/2018</a:t>
+              <a:t>12/14/2018</a:t>
             </a:fld>
             <a:endParaRPr lang="en-US"/>
           </a:p>
@@ -3126,7 +3126,7 @@
           <a:p>
             <a:fld id="{CF647BC4-379F-449B-8ACB-1D0356C51E22}" type="datetimeFigureOut">
               <a:rPr lang="en-US" smtClean="0"/>
-              <a:t>12/13/2018</a:t>
+              <a:t>12/14/2018</a:t>
             </a:fld>
             <a:endParaRPr lang="en-US"/>
           </a:p>
@@ -3358,7 +3358,7 @@
             <a:fld id="{CF647BC4-379F-449B-8ACB-1D0356C51E22}" type="datetimeFigureOut">
               <a:rPr lang="en-US" smtClean="0"/>
               <a:pPr/>
-              <a:t>12/13/2018</a:t>
+              <a:t>12/14/2018</a:t>
             </a:fld>
             <a:endParaRPr lang="en-US"/>
           </a:p>
@@ -10659,14 +10659,14 @@
           <p:nvPr>
             <p:extLst>
               <p:ext uri="{D42A27DB-BD31-4B8C-83A1-F6EECF244321}">
-                <p14:modId xmlns:p14="http://schemas.microsoft.com/office/powerpoint/2010/main" val="1929602178"/>
+                <p14:modId xmlns:p14="http://schemas.microsoft.com/office/powerpoint/2010/main" val="2927130308"/>
               </p:ext>
             </p:extLst>
           </p:nvPr>
         </p:nvGraphicFramePr>
         <p:xfrm>
-          <a:off x="1602223" y="2766397"/>
-          <a:ext cx="3289862" cy="1828800"/>
+          <a:off x="1602223" y="2746519"/>
+          <a:ext cx="3289862" cy="1920240"/>
         </p:xfrm>
         <a:graphic>
           <a:graphicData uri="http://schemas.openxmlformats.org/drawingml/2006/table">
@@ -10697,7 +10697,7 @@
                     <a:lstStyle/>
                     <a:p>
                       <a:r>
-                        <a:rPr lang="en-US" sz="1400" dirty="0"/>
+                        <a:rPr lang="en-US" sz="1500" dirty="0"/>
                         <a:t>HDI CATEGORY</a:t>
                       </a:r>
                     </a:p>
@@ -10710,7 +10710,7 @@
                     <a:lstStyle/>
                     <a:p>
                       <a:r>
-                        <a:rPr lang="en-US" sz="1400" dirty="0"/>
+                        <a:rPr lang="en-US" sz="1500" dirty="0"/>
                         <a:t>FREQUENCY</a:t>
                       </a:r>
                     </a:p>
@@ -10730,7 +10730,7 @@
                     <a:lstStyle/>
                     <a:p>
                       <a:r>
-                        <a:rPr lang="en-US" sz="1400" dirty="0"/>
+                        <a:rPr lang="en-US" sz="1500" dirty="0"/>
                         <a:t>Low</a:t>
                       </a:r>
                     </a:p>
@@ -10743,7 +10743,7 @@
                     <a:lstStyle/>
                     <a:p>
                       <a:r>
-                        <a:rPr lang="en-US" sz="1400" dirty="0"/>
+                        <a:rPr lang="en-US" sz="1500" dirty="0"/>
                         <a:t>20</a:t>
                       </a:r>
                     </a:p>
@@ -10763,7 +10763,7 @@
                     <a:lstStyle/>
                     <a:p>
                       <a:r>
-                        <a:rPr lang="en-US" sz="1400" dirty="0"/>
+                        <a:rPr lang="en-US" sz="1500" dirty="0"/>
                         <a:t>Medium</a:t>
                       </a:r>
                     </a:p>
@@ -10776,7 +10776,7 @@
                     <a:lstStyle/>
                     <a:p>
                       <a:r>
-                        <a:rPr lang="en-US" sz="1400" dirty="0"/>
+                        <a:rPr lang="en-US" sz="1500" dirty="0"/>
                         <a:t>18</a:t>
                       </a:r>
                     </a:p>
@@ -10796,7 +10796,7 @@
                     <a:lstStyle/>
                     <a:p>
                       <a:r>
-                        <a:rPr lang="en-US" sz="1400" dirty="0"/>
+                        <a:rPr lang="en-US" sz="1500" dirty="0"/>
                         <a:t>High</a:t>
                       </a:r>
                     </a:p>
@@ -10809,7 +10809,7 @@
                     <a:lstStyle/>
                     <a:p>
                       <a:r>
-                        <a:rPr lang="en-US" sz="1400" dirty="0"/>
+                        <a:rPr lang="en-US" sz="1500" dirty="0"/>
                         <a:t>26</a:t>
                       </a:r>
                     </a:p>
@@ -10829,7 +10829,7 @@
                     <a:lstStyle/>
                     <a:p>
                       <a:r>
-                        <a:rPr lang="en-US" sz="1400" dirty="0"/>
+                        <a:rPr lang="en-US" sz="1500" dirty="0"/>
                         <a:t>Very High</a:t>
                       </a:r>
                     </a:p>
@@ -10842,7 +10842,7 @@
                     <a:lstStyle/>
                     <a:p>
                       <a:r>
-                        <a:rPr lang="en-US" sz="1400" dirty="0"/>
+                        <a:rPr lang="en-US" sz="1500" dirty="0"/>
                         <a:t>12</a:t>
                       </a:r>
                     </a:p>
@@ -10862,7 +10862,7 @@
                     <a:lstStyle/>
                     <a:p>
                       <a:r>
-                        <a:rPr lang="en-US" sz="1400" dirty="0"/>
+                        <a:rPr lang="en-US" sz="1500" dirty="0"/>
                         <a:t>NA</a:t>
                       </a:r>
                     </a:p>
@@ -10875,7 +10875,7 @@
                     <a:lstStyle/>
                     <a:p>
                       <a:r>
-                        <a:rPr lang="en-US" sz="1400" dirty="0"/>
+                        <a:rPr lang="en-US" sz="1500" dirty="0"/>
                         <a:t>18</a:t>
                       </a:r>
                     </a:p>
@@ -11947,7 +11947,7 @@
             <p:ph idx="1"/>
             <p:extLst>
               <p:ext uri="{D42A27DB-BD31-4B8C-83A1-F6EECF244321}">
-                <p14:modId xmlns:p14="http://schemas.microsoft.com/office/powerpoint/2010/main" val="1962871006"/>
+                <p14:modId xmlns:p14="http://schemas.microsoft.com/office/powerpoint/2010/main" val="1062473317"/>
               </p:ext>
             </p:extLst>
           </p:nvPr>
@@ -12350,7 +12350,7 @@
                             <a:srgbClr val="404040"/>
                           </a:solidFill>
                         </a:rPr>
-                        <a:t>Gross Domestic Product (GDP), log transform; valued in $US 2018</a:t>
+                        <a:t>Gross Domestic Product (GDP), log transform</a:t>
                       </a:r>
                     </a:p>
                   </a:txBody>
@@ -13008,10 +13008,10 @@
       </p:grpSp>
       <p:grpSp>
         <p:nvGrpSpPr>
-          <p:cNvPr id="13" name="Group 12">
+          <p:cNvPr id="17" name="Group 16">
             <a:extLst>
               <a:ext uri="{FF2B5EF4-FFF2-40B4-BE49-F238E27FC236}">
-                <a16:creationId xmlns:a16="http://schemas.microsoft.com/office/drawing/2014/main" id="{E5FDFCF9-9AE7-497C-B6F3-7E6D22BD7C4A}"/>
+                <a16:creationId xmlns:a16="http://schemas.microsoft.com/office/drawing/2014/main" id="{A88E1746-E1C9-4A38-B9BF-35FED5ECFFF9}"/>
               </a:ext>
             </a:extLst>
           </p:cNvPr>
@@ -13020,41 +13020,12 @@
         </p:nvGrpSpPr>
         <p:grpSpPr>
           <a:xfrm>
-            <a:off x="5549090" y="3843931"/>
-            <a:ext cx="6245352" cy="2605934"/>
-            <a:chOff x="5858013" y="3843931"/>
-            <a:chExt cx="6245352" cy="2605934"/>
+            <a:off x="5550408" y="3843931"/>
+            <a:ext cx="6245352" cy="2611284"/>
+            <a:chOff x="5550408" y="3843931"/>
+            <a:chExt cx="6245352" cy="2611284"/>
           </a:xfrm>
         </p:grpSpPr>
-        <p:pic>
-          <p:nvPicPr>
-            <p:cNvPr id="11" name="Picture 10">
-              <a:extLst>
-                <a:ext uri="{FF2B5EF4-FFF2-40B4-BE49-F238E27FC236}">
-                  <a16:creationId xmlns:a16="http://schemas.microsoft.com/office/drawing/2014/main" id="{7BA90928-B9CD-4BD8-87C5-B5E70165B6A6}"/>
-                </a:ext>
-              </a:extLst>
-            </p:cNvPr>
-            <p:cNvPicPr>
-              <a:picLocks noChangeAspect="1"/>
-            </p:cNvPicPr>
-            <p:nvPr/>
-          </p:nvPicPr>
-          <p:blipFill rotWithShape="1">
-            <a:blip r:embed="rId4"/>
-            <a:srcRect t="7812"/>
-            <a:stretch/>
-          </p:blipFill>
-          <p:spPr>
-            <a:xfrm>
-              <a:off x="5858013" y="4146884"/>
-              <a:ext cx="6245352" cy="2302981"/>
-            </a:xfrm>
-            <a:prstGeom prst="rect">
-              <a:avLst/>
-            </a:prstGeom>
-          </p:spPr>
-        </p:pic>
         <p:sp>
           <p:nvSpPr>
             <p:cNvPr id="12" name="TextBox 11">
@@ -13069,7 +13040,7 @@
           </p:nvSpPr>
           <p:spPr>
             <a:xfrm>
-              <a:off x="6096000" y="3843931"/>
+              <a:off x="5787077" y="3843931"/>
               <a:ext cx="4797908" cy="307777"/>
             </a:xfrm>
             <a:prstGeom prst="rect">
@@ -13096,6 +13067,35 @@
             </a:p>
           </p:txBody>
         </p:sp>
+        <p:pic>
+          <p:nvPicPr>
+            <p:cNvPr id="16" name="Picture 15">
+              <a:extLst>
+                <a:ext uri="{FF2B5EF4-FFF2-40B4-BE49-F238E27FC236}">
+                  <a16:creationId xmlns:a16="http://schemas.microsoft.com/office/drawing/2014/main" id="{B234B4B9-CBB2-412E-B293-E3764A524EB3}"/>
+                </a:ext>
+              </a:extLst>
+            </p:cNvPr>
+            <p:cNvPicPr>
+              <a:picLocks noChangeAspect="1"/>
+            </p:cNvPicPr>
+            <p:nvPr/>
+          </p:nvPicPr>
+          <p:blipFill rotWithShape="1">
+            <a:blip r:embed="rId4"/>
+            <a:srcRect t="7778"/>
+            <a:stretch/>
+          </p:blipFill>
+          <p:spPr>
+            <a:xfrm>
+              <a:off x="5550408" y="4151376"/>
+              <a:ext cx="6245352" cy="2303839"/>
+            </a:xfrm>
+            <a:prstGeom prst="rect">
+              <a:avLst/>
+            </a:prstGeom>
+          </p:spPr>
+        </p:pic>
       </p:grpSp>
     </p:spTree>
     <p:extLst>

</xml_diff>

<commit_message>
Adding Analysis 6 to slides
</commit_message>
<xml_diff>
--- a/Prioli_Final_Proj.pptx
+++ b/Prioli_Final_Proj.pptx
@@ -5,7 +5,7 @@
     <p:sldMasterId id="2147483726" r:id="rId1"/>
   </p:sldMasterIdLst>
   <p:notesMasterIdLst>
-    <p:notesMasterId r:id="rId26"/>
+    <p:notesMasterId r:id="rId28"/>
   </p:notesMasterIdLst>
   <p:sldIdLst>
     <p:sldId id="256" r:id="rId2"/>
@@ -25,13 +25,15 @@
     <p:sldId id="265" r:id="rId16"/>
     <p:sldId id="270" r:id="rId17"/>
     <p:sldId id="271" r:id="rId18"/>
-    <p:sldId id="278" r:id="rId19"/>
-    <p:sldId id="279" r:id="rId20"/>
-    <p:sldId id="264" r:id="rId21"/>
-    <p:sldId id="280" r:id="rId22"/>
-    <p:sldId id="281" r:id="rId23"/>
-    <p:sldId id="261" r:id="rId24"/>
-    <p:sldId id="262" r:id="rId25"/>
+    <p:sldId id="283" r:id="rId19"/>
+    <p:sldId id="284" r:id="rId20"/>
+    <p:sldId id="278" r:id="rId21"/>
+    <p:sldId id="279" r:id="rId22"/>
+    <p:sldId id="264" r:id="rId23"/>
+    <p:sldId id="280" r:id="rId24"/>
+    <p:sldId id="281" r:id="rId25"/>
+    <p:sldId id="261" r:id="rId26"/>
+    <p:sldId id="262" r:id="rId27"/>
   </p:sldIdLst>
   <p:sldSz cx="12192000" cy="6858000"/>
   <p:notesSz cx="6858000" cy="9144000"/>
@@ -3974,14 +3976,14 @@
             <p:ph idx="1"/>
             <p:extLst>
               <p:ext uri="{D42A27DB-BD31-4B8C-83A1-F6EECF244321}">
-                <p14:modId xmlns:p14="http://schemas.microsoft.com/office/powerpoint/2010/main" val="1526114101"/>
+                <p14:modId xmlns:p14="http://schemas.microsoft.com/office/powerpoint/2010/main" val="385368312"/>
               </p:ext>
             </p:extLst>
           </p:nvPr>
         </p:nvGraphicFramePr>
         <p:xfrm>
           <a:off x="476250" y="1358900"/>
-          <a:ext cx="11214102" cy="4942840"/>
+          <a:ext cx="11214105" cy="5186680"/>
         </p:xfrm>
         <a:graphic>
           <a:graphicData uri="http://schemas.openxmlformats.org/drawingml/2006/table">
@@ -3990,42 +3992,42 @@
                 <a:tableStyleId>{5C22544A-7EE6-4342-B048-85BDC9FD1C3A}</a:tableStyleId>
               </a:tblPr>
               <a:tblGrid>
-                <a:gridCol w="963529">
+                <a:gridCol w="842752">
                   <a:extLst>
                     <a:ext uri="{9D8B030D-6E8A-4147-A177-3AD203B41FA5}">
                       <a16:colId xmlns:a16="http://schemas.microsoft.com/office/drawing/2014/main" val="1459026659"/>
                     </a:ext>
                   </a:extLst>
                 </a:gridCol>
-                <a:gridCol w="1641351">
+                <a:gridCol w="1440382">
                   <a:extLst>
                     <a:ext uri="{9D8B030D-6E8A-4147-A177-3AD203B41FA5}">
                       <a16:colId xmlns:a16="http://schemas.microsoft.com/office/drawing/2014/main" val="2510600754"/>
                     </a:ext>
                   </a:extLst>
                 </a:gridCol>
-                <a:gridCol w="2435594">
+                <a:gridCol w="2581360">
                   <a:extLst>
                     <a:ext uri="{9D8B030D-6E8A-4147-A177-3AD203B41FA5}">
                       <a16:colId xmlns:a16="http://schemas.microsoft.com/office/drawing/2014/main" val="85376525"/>
                     </a:ext>
                   </a:extLst>
                 </a:gridCol>
-                <a:gridCol w="2075202">
+                <a:gridCol w="2233401">
                   <a:extLst>
                     <a:ext uri="{9D8B030D-6E8A-4147-A177-3AD203B41FA5}">
                       <a16:colId xmlns:a16="http://schemas.microsoft.com/office/drawing/2014/main" val="3039715562"/>
                     </a:ext>
                   </a:extLst>
                 </a:gridCol>
-                <a:gridCol w="2049213">
+                <a:gridCol w="2058105">
                   <a:extLst>
                     <a:ext uri="{9D8B030D-6E8A-4147-A177-3AD203B41FA5}">
                       <a16:colId xmlns:a16="http://schemas.microsoft.com/office/drawing/2014/main" val="3694282208"/>
                     </a:ext>
                   </a:extLst>
                 </a:gridCol>
-                <a:gridCol w="2049213">
+                <a:gridCol w="2058105">
                   <a:extLst>
                     <a:ext uri="{9D8B030D-6E8A-4147-A177-3AD203B41FA5}">
                       <a16:colId xmlns:a16="http://schemas.microsoft.com/office/drawing/2014/main" val="3977966083"/>
@@ -4040,7 +4042,7 @@
                     <a:lstStyle/>
                     <a:p>
                       <a:r>
-                        <a:rPr lang="en-US" sz="1500" b="1" dirty="0"/>
+                        <a:rPr lang="en-US" sz="1400" b="1" dirty="0"/>
                         <a:t>ANALYSIS</a:t>
                       </a:r>
                     </a:p>
@@ -4053,7 +4055,7 @@
                     <a:lstStyle/>
                     <a:p>
                       <a:r>
-                        <a:rPr lang="en-US" sz="1500" b="1" dirty="0"/>
+                        <a:rPr lang="en-US" sz="1400" b="1" dirty="0"/>
                         <a:t>VARIABLE(S)</a:t>
                       </a:r>
                     </a:p>
@@ -4066,7 +4068,7 @@
                     <a:lstStyle/>
                     <a:p>
                       <a:r>
-                        <a:rPr lang="en-US" sz="1500" b="1" i="1" dirty="0">
+                        <a:rPr lang="en-US" sz="1400" b="1" i="1" dirty="0">
                           <a:latin typeface="CMU Serif" panose="02000603000000000000" pitchFamily="2" charset="0"/>
                           <a:ea typeface="CMU Serif" panose="02000603000000000000" pitchFamily="2" charset="0"/>
                           <a:cs typeface="CMU Serif" panose="02000603000000000000" pitchFamily="2" charset="0"/>
@@ -4074,7 +4076,7 @@
                         <a:t>H</a:t>
                       </a:r>
                       <a:r>
-                        <a:rPr lang="en-US" sz="1500" b="1" i="1" baseline="-25000" dirty="0">
+                        <a:rPr lang="en-US" sz="1400" b="1" i="1" baseline="-25000" dirty="0">
                           <a:latin typeface="CMU Serif" panose="02000603000000000000" pitchFamily="2" charset="0"/>
                           <a:ea typeface="CMU Serif" panose="02000603000000000000" pitchFamily="2" charset="0"/>
                           <a:cs typeface="CMU Serif" panose="02000603000000000000" pitchFamily="2" charset="0"/>
@@ -4091,7 +4093,7 @@
                     <a:lstStyle/>
                     <a:p>
                       <a:r>
-                        <a:rPr lang="en-US" sz="1500" b="1" i="1" dirty="0">
+                        <a:rPr lang="en-US" sz="1400" b="1" i="1" dirty="0">
                           <a:latin typeface="CMU Serif" panose="02000603000000000000" pitchFamily="2" charset="0"/>
                           <a:ea typeface="CMU Serif" panose="02000603000000000000" pitchFamily="2" charset="0"/>
                           <a:cs typeface="CMU Serif" panose="02000603000000000000" pitchFamily="2" charset="0"/>
@@ -4099,7 +4101,7 @@
                         <a:t>H</a:t>
                       </a:r>
                       <a:r>
-                        <a:rPr lang="en-US" sz="1500" b="1" i="1" baseline="-25000" dirty="0">
+                        <a:rPr lang="en-US" sz="1400" b="1" i="1" baseline="-25000" dirty="0">
                           <a:latin typeface="CMU Serif" panose="02000603000000000000" pitchFamily="2" charset="0"/>
                           <a:ea typeface="CMU Serif" panose="02000603000000000000" pitchFamily="2" charset="0"/>
                           <a:cs typeface="CMU Serif" panose="02000603000000000000" pitchFamily="2" charset="0"/>
@@ -4116,7 +4118,7 @@
                     <a:lstStyle/>
                     <a:p>
                       <a:r>
-                        <a:rPr lang="en-US" sz="1500" b="1" dirty="0"/>
+                        <a:rPr lang="en-US" sz="1400" b="1" dirty="0"/>
                         <a:t>NONPARAMETRIC TEST</a:t>
                       </a:r>
                     </a:p>
@@ -4129,7 +4131,7 @@
                     <a:lstStyle/>
                     <a:p>
                       <a:r>
-                        <a:rPr lang="en-US" sz="1500" b="1" dirty="0"/>
+                        <a:rPr lang="en-US" sz="1400" b="1" dirty="0"/>
                         <a:t>PARAMETRIC TEST</a:t>
                       </a:r>
                     </a:p>
@@ -4149,7 +4151,7 @@
                     <a:lstStyle/>
                     <a:p>
                       <a:r>
-                        <a:rPr lang="en-US" sz="1500" dirty="0"/>
+                        <a:rPr lang="en-US" sz="1400" dirty="0"/>
                         <a:t>1</a:t>
                       </a:r>
                     </a:p>
@@ -4162,7 +4164,7 @@
                     <a:lstStyle/>
                     <a:p>
                       <a:r>
-                        <a:rPr lang="en-US" sz="1300" dirty="0" err="1">
+                        <a:rPr lang="en-US" sz="1200" dirty="0" err="1">
                           <a:solidFill>
                             <a:srgbClr val="545454"/>
                           </a:solidFill>
@@ -4170,7 +4172,7 @@
                         </a:rPr>
                         <a:t>HDIindex</a:t>
                       </a:r>
-                      <a:endParaRPr lang="en-US" sz="1300" dirty="0">
+                      <a:endParaRPr lang="en-US" sz="1200" dirty="0">
                         <a:solidFill>
                           <a:srgbClr val="545454"/>
                         </a:solidFill>
@@ -4186,10 +4188,10 @@
                     <a:lstStyle/>
                     <a:p>
                       <a:r>
-                        <a:rPr lang="en-US" sz="1500" dirty="0"/>
+                        <a:rPr lang="en-US" sz="1400" dirty="0"/>
                         <a:t>Nonparametric 95% confidence interval (CI) for the population mean (no formal hypotheses tested)</a:t>
                       </a:r>
-                      <a:endParaRPr lang="en-US" sz="1500" dirty="0">
+                      <a:endParaRPr lang="en-US" sz="1400" dirty="0">
                         <a:solidFill>
                           <a:srgbClr val="FF0000"/>
                         </a:solidFill>
@@ -4204,7 +4206,7 @@
                     <a:lstStyle/>
                     <a:p>
                       <a:r>
-                        <a:rPr lang="en-US" sz="1500" dirty="0"/>
+                        <a:rPr lang="en-US" sz="1400" dirty="0"/>
                         <a:t>Parametric 95% CI for the population mean</a:t>
                       </a:r>
                     </a:p>
@@ -4217,7 +4219,7 @@
                     <a:lstStyle/>
                     <a:p>
                       <a:r>
-                        <a:rPr lang="en-US" sz="1500" dirty="0"/>
+                        <a:rPr lang="en-US" sz="1400" dirty="0"/>
                         <a:t>Bootstrapping</a:t>
                       </a:r>
                     </a:p>
@@ -4230,15 +4232,15 @@
                     <a:lstStyle/>
                     <a:p>
                       <a:r>
-                        <a:rPr lang="en-US" sz="1500" dirty="0"/>
+                        <a:rPr lang="en-US" sz="1400" dirty="0"/>
                         <a:t>One-Sample </a:t>
                       </a:r>
                       <a:r>
-                        <a:rPr lang="en-US" sz="1500" i="1" dirty="0"/>
+                        <a:rPr lang="en-US" sz="1400" i="1" dirty="0"/>
                         <a:t>t</a:t>
                       </a:r>
                       <a:r>
-                        <a:rPr lang="en-US" sz="1500" dirty="0"/>
+                        <a:rPr lang="en-US" sz="1400" dirty="0"/>
                         <a:t>-test</a:t>
                       </a:r>
                     </a:p>
@@ -4258,7 +4260,7 @@
                     <a:lstStyle/>
                     <a:p>
                       <a:r>
-                        <a:rPr lang="en-US" sz="1500" dirty="0"/>
+                        <a:rPr lang="en-US" sz="1400" dirty="0"/>
                         <a:t>2</a:t>
                       </a:r>
                     </a:p>
@@ -4271,7 +4273,7 @@
                     <a:lstStyle/>
                     <a:p>
                       <a:r>
-                        <a:rPr lang="en-US" sz="1300" dirty="0" err="1">
+                        <a:rPr lang="en-US" sz="1200" dirty="0" err="1">
                           <a:solidFill>
                             <a:srgbClr val="545454"/>
                           </a:solidFill>
@@ -4280,7 +4282,7 @@
                         <a:t>HDIindex</a:t>
                       </a:r>
                       <a:r>
-                        <a:rPr lang="en-US" sz="1300" dirty="0">
+                        <a:rPr lang="en-US" sz="1200" dirty="0">
                           <a:solidFill>
                             <a:schemeClr val="tx1"/>
                           </a:solidFill>
@@ -4289,7 +4291,7 @@
                         <a:t>, </a:t>
                       </a:r>
                       <a:r>
-                        <a:rPr lang="en-US" sz="1300" dirty="0">
+                        <a:rPr lang="en-US" sz="1200" dirty="0">
                           <a:solidFill>
                             <a:srgbClr val="545454"/>
                           </a:solidFill>
@@ -4307,7 +4309,7 @@
                     <a:lstStyle/>
                     <a:p>
                       <a:r>
-                        <a:rPr lang="en-US" sz="1500" dirty="0"/>
+                        <a:rPr lang="en-US" sz="1400" dirty="0"/>
                         <a:t>Human development and social progress are not associated</a:t>
                       </a:r>
                     </a:p>
@@ -4320,7 +4322,7 @@
                     <a:lstStyle/>
                     <a:p>
                       <a:r>
-                        <a:rPr lang="en-US" sz="1500" dirty="0"/>
+                        <a:rPr lang="en-US" sz="1400" dirty="0"/>
                         <a:t>Human development and social progress are correlated</a:t>
                       </a:r>
                     </a:p>
@@ -4333,10 +4335,10 @@
                     <a:lstStyle/>
                     <a:p>
                       <a:r>
-                        <a:rPr lang="en-US" sz="1500" dirty="0"/>
+                        <a:rPr lang="en-US" sz="1400" dirty="0"/>
                         <a:t>Kendall’s Tau</a:t>
                       </a:r>
-                      <a:endParaRPr lang="en-US" sz="1500" dirty="0">
+                      <a:endParaRPr lang="en-US" sz="1400" dirty="0">
                         <a:solidFill>
                           <a:srgbClr val="FF0000"/>
                         </a:solidFill>
@@ -4351,7 +4353,7 @@
                     <a:lstStyle/>
                     <a:p>
                       <a:r>
-                        <a:rPr lang="en-US" sz="1500" dirty="0"/>
+                        <a:rPr lang="en-US" sz="1400" dirty="0"/>
                         <a:t>Pearson’s Correlation Test</a:t>
                       </a:r>
                     </a:p>
@@ -4371,7 +4373,7 @@
                     <a:lstStyle/>
                     <a:p>
                       <a:r>
-                        <a:rPr lang="en-US" sz="1500" dirty="0"/>
+                        <a:rPr lang="en-US" sz="1400" dirty="0"/>
                         <a:t>3</a:t>
                       </a:r>
                     </a:p>
@@ -4384,7 +4386,7 @@
                     <a:lstStyle/>
                     <a:p>
                       <a:r>
-                        <a:rPr lang="en-US" sz="1300" dirty="0" err="1">
+                        <a:rPr lang="en-US" sz="1200" dirty="0" err="1">
                           <a:solidFill>
                             <a:srgbClr val="545454"/>
                           </a:solidFill>
@@ -4393,7 +4395,7 @@
                         <a:t>logGDP</a:t>
                       </a:r>
                       <a:r>
-                        <a:rPr lang="en-US" sz="1300" dirty="0">
+                        <a:rPr lang="en-US" sz="1200" dirty="0">
                           <a:solidFill>
                             <a:schemeClr val="tx1"/>
                           </a:solidFill>
@@ -4402,7 +4404,7 @@
                         <a:t>, </a:t>
                       </a:r>
                       <a:r>
-                        <a:rPr lang="en-US" sz="1300" dirty="0" err="1">
+                        <a:rPr lang="en-US" sz="1200" dirty="0" err="1">
                           <a:solidFill>
                             <a:srgbClr val="545454"/>
                           </a:solidFill>
@@ -4410,7 +4412,7 @@
                         </a:rPr>
                         <a:t>gendereq</a:t>
                       </a:r>
-                      <a:endParaRPr lang="en-US" sz="1300" dirty="0">
+                      <a:endParaRPr lang="en-US" sz="1200" dirty="0">
                         <a:solidFill>
                           <a:srgbClr val="545454"/>
                         </a:solidFill>
@@ -4426,7 +4428,7 @@
                     <a:lstStyle/>
                     <a:p>
                       <a:r>
-                        <a:rPr lang="en-US" sz="1500" dirty="0"/>
+                        <a:rPr lang="en-US" sz="1400" dirty="0"/>
                         <a:t>There is no relationship between log(GDP) and gender equality index</a:t>
                       </a:r>
                     </a:p>
@@ -4439,10 +4441,10 @@
                     <a:lstStyle/>
                     <a:p>
                       <a:r>
-                        <a:rPr lang="en-US" sz="1500" dirty="0"/>
+                        <a:rPr lang="en-US" sz="1400" dirty="0"/>
                         <a:t>There is a relationship between log(GDP) and gender equality index</a:t>
                       </a:r>
-                      <a:endParaRPr lang="en-US" sz="1500" dirty="0">
+                      <a:endParaRPr lang="en-US" sz="1400" dirty="0">
                         <a:solidFill>
                           <a:srgbClr val="FF0000"/>
                         </a:solidFill>
@@ -4457,11 +4459,11 @@
                     <a:lstStyle/>
                     <a:p>
                       <a:r>
-                        <a:rPr lang="en-US" sz="1500" dirty="0" err="1"/>
+                        <a:rPr lang="en-US" sz="1400" dirty="0" err="1"/>
                         <a:t>Hoeffding’s</a:t>
                       </a:r>
                       <a:r>
-                        <a:rPr lang="en-US" sz="1500" dirty="0"/>
+                        <a:rPr lang="en-US" sz="1400" dirty="0"/>
                         <a:t> Test</a:t>
                       </a:r>
                     </a:p>
@@ -4474,7 +4476,7 @@
                     <a:lstStyle/>
                     <a:p>
                       <a:r>
-                        <a:rPr lang="en-US" sz="1500" dirty="0"/>
+                        <a:rPr lang="en-US" sz="1400" dirty="0"/>
                         <a:t>Pearson’s Correlation Test</a:t>
                       </a:r>
                     </a:p>
@@ -4494,7 +4496,7 @@
                     <a:lstStyle/>
                     <a:p>
                       <a:r>
-                        <a:rPr lang="en-US" sz="1500" dirty="0"/>
+                        <a:rPr lang="en-US" sz="1400" dirty="0"/>
                         <a:t>4</a:t>
                       </a:r>
                     </a:p>
@@ -4507,7 +4509,7 @@
                     <a:lstStyle/>
                     <a:p>
                       <a:r>
-                        <a:rPr lang="en-US" sz="1300" dirty="0">
+                        <a:rPr lang="en-US" sz="1200" dirty="0">
                           <a:solidFill>
                             <a:srgbClr val="545454"/>
                           </a:solidFill>
@@ -4525,7 +4527,7 @@
                     <a:lstStyle/>
                     <a:p>
                       <a:r>
-                        <a:rPr lang="en-US" sz="1500" dirty="0"/>
+                        <a:rPr lang="en-US" sz="1400" dirty="0"/>
                         <a:t>Happiness is normally distributed</a:t>
                       </a:r>
                     </a:p>
@@ -4538,7 +4540,7 @@
                     <a:lstStyle/>
                     <a:p>
                       <a:r>
-                        <a:rPr lang="en-US" sz="1500" dirty="0"/>
+                        <a:rPr lang="en-US" sz="1400" dirty="0"/>
                         <a:t>Happiness is not normally distributed</a:t>
                       </a:r>
                     </a:p>
@@ -4551,10 +4553,10 @@
                     <a:lstStyle/>
                     <a:p>
                       <a:r>
-                        <a:rPr lang="en-US" sz="1500" dirty="0"/>
+                        <a:rPr lang="en-US" sz="1400" dirty="0"/>
                         <a:t>Lilliefors Test for Normality (a type of one-sample Kolmogorov-Smirnov test)</a:t>
                       </a:r>
-                      <a:endParaRPr lang="en-US" sz="1500" dirty="0">
+                      <a:endParaRPr lang="en-US" sz="1400" dirty="0">
                         <a:solidFill>
                           <a:srgbClr val="FF0000"/>
                         </a:solidFill>
@@ -4569,7 +4571,7 @@
                     <a:lstStyle/>
                     <a:p>
                       <a:r>
-                        <a:rPr lang="en-US" sz="1500" dirty="0"/>
+                        <a:rPr lang="en-US" sz="1400" dirty="0"/>
                         <a:t>Shapiro-Wilk Test</a:t>
                       </a:r>
                     </a:p>
@@ -4589,7 +4591,7 @@
                     <a:lstStyle/>
                     <a:p>
                       <a:r>
-                        <a:rPr lang="en-US" sz="1500" dirty="0"/>
+                        <a:rPr lang="en-US" sz="1400" dirty="0"/>
                         <a:t>5</a:t>
                       </a:r>
                     </a:p>
@@ -4602,7 +4604,7 @@
                     <a:lstStyle/>
                     <a:p>
                       <a:r>
-                        <a:rPr lang="en-US" sz="1300" dirty="0" err="1">
+                        <a:rPr lang="en-US" sz="1200" dirty="0" err="1">
                           <a:solidFill>
                             <a:srgbClr val="545454"/>
                           </a:solidFill>
@@ -4611,7 +4613,7 @@
                         <a:t>HDI_cat</a:t>
                       </a:r>
                       <a:r>
-                        <a:rPr lang="en-US" sz="1500" dirty="0">
+                        <a:rPr lang="en-US" sz="1400" dirty="0">
                           <a:solidFill>
                             <a:schemeClr val="tx1"/>
                           </a:solidFill>
@@ -4620,7 +4622,7 @@
                         <a:t>, log(</a:t>
                       </a:r>
                       <a:r>
-                        <a:rPr lang="en-US" sz="1300" dirty="0" err="1">
+                        <a:rPr lang="en-US" sz="1200" dirty="0" err="1">
                           <a:solidFill>
                             <a:srgbClr val="545454"/>
                           </a:solidFill>
@@ -4629,7 +4631,7 @@
                         <a:t>infantmort</a:t>
                       </a:r>
                       <a:r>
-                        <a:rPr lang="en-US" sz="1500" dirty="0">
+                        <a:rPr lang="en-US" sz="1400" dirty="0">
                           <a:solidFill>
                             <a:schemeClr val="tx1"/>
                           </a:solidFill>
@@ -4637,7 +4639,7 @@
                         </a:rPr>
                         <a:t>)</a:t>
                       </a:r>
-                      <a:endParaRPr lang="en-US" sz="1500" dirty="0">
+                      <a:endParaRPr lang="en-US" sz="1400" dirty="0">
                         <a:solidFill>
                           <a:srgbClr val="545454"/>
                         </a:solidFill>
@@ -4653,7 +4655,7 @@
                     <a:lstStyle/>
                     <a:p>
                       <a:r>
-                        <a:rPr lang="en-US" sz="1500" dirty="0"/>
+                        <a:rPr lang="en-US" sz="1400" dirty="0"/>
                         <a:t>Log infant mortality rate is the same across human development categories</a:t>
                       </a:r>
                     </a:p>
@@ -4666,10 +4668,10 @@
                     <a:lstStyle/>
                     <a:p>
                       <a:r>
-                        <a:rPr lang="en-US" sz="1500" dirty="0"/>
+                        <a:rPr lang="en-US" sz="1400" dirty="0"/>
                         <a:t>Log infant mortality rate differs by human development category</a:t>
                       </a:r>
-                      <a:endParaRPr lang="en-US" sz="1500" dirty="0">
+                      <a:endParaRPr lang="en-US" sz="1400" dirty="0">
                         <a:solidFill>
                           <a:srgbClr val="FF0000"/>
                         </a:solidFill>
@@ -4684,7 +4686,7 @@
                     <a:lstStyle/>
                     <a:p>
                       <a:r>
-                        <a:rPr lang="en-US" sz="1500" dirty="0"/>
+                        <a:rPr lang="en-US" sz="1400" dirty="0"/>
                         <a:t>Permutation F-Test</a:t>
                       </a:r>
                     </a:p>
@@ -4697,7 +4699,7 @@
                     <a:lstStyle/>
                     <a:p>
                       <a:r>
-                        <a:rPr lang="en-US" sz="1500" dirty="0"/>
+                        <a:rPr lang="en-US" sz="1400" dirty="0"/>
                         <a:t>ANOVA</a:t>
                       </a:r>
                     </a:p>
@@ -4707,6 +4709,165 @@
                 <a:extLst>
                   <a:ext uri="{0D108BD9-81ED-4DB2-BD59-A6C34878D82A}">
                     <a16:rowId xmlns:a16="http://schemas.microsoft.com/office/drawing/2014/main" val="3210183669"/>
+                  </a:ext>
+                </a:extLst>
+              </a:tr>
+              <a:tr h="370840">
+                <a:tc>
+                  <a:txBody>
+                    <a:bodyPr/>
+                    <a:lstStyle/>
+                    <a:p>
+                      <a:r>
+                        <a:rPr lang="en-US" sz="1400" dirty="0"/>
+                        <a:t>6</a:t>
+                      </a:r>
+                    </a:p>
+                  </a:txBody>
+                  <a:tcPr/>
+                </a:tc>
+                <a:tc>
+                  <a:txBody>
+                    <a:bodyPr/>
+                    <a:lstStyle/>
+                    <a:p>
+                      <a:r>
+                        <a:rPr kumimoji="0" lang="en-US" sz="1200" b="0" i="0" u="none" strike="noStrike" kern="1200" cap="none" spc="0" normalizeH="0" baseline="0" noProof="0" dirty="0" err="1">
+                          <a:ln>
+                            <a:noFill/>
+                          </a:ln>
+                          <a:solidFill>
+                            <a:srgbClr val="545454"/>
+                          </a:solidFill>
+                          <a:effectLst/>
+                          <a:uLnTx/>
+                          <a:uFillTx/>
+                          <a:latin typeface="Lucida Console" panose="020B0609040504020204" pitchFamily="49" charset="0"/>
+                          <a:ea typeface="+mn-ea"/>
+                          <a:cs typeface="+mn-cs"/>
+                        </a:rPr>
+                        <a:t>HDI_cat</a:t>
+                      </a:r>
+                      <a:r>
+                        <a:rPr kumimoji="0" lang="en-US" sz="1400" b="0" i="0" u="none" strike="noStrike" kern="1200" cap="none" spc="0" normalizeH="0" baseline="0" noProof="0" dirty="0">
+                          <a:ln>
+                            <a:noFill/>
+                          </a:ln>
+                          <a:solidFill>
+                            <a:prstClr val="black"/>
+                          </a:solidFill>
+                          <a:effectLst/>
+                          <a:uLnTx/>
+                          <a:uFillTx/>
+                          <a:latin typeface="+mn-lt"/>
+                          <a:ea typeface="+mn-ea"/>
+                          <a:cs typeface="+mn-cs"/>
+                        </a:rPr>
+                        <a:t>, </a:t>
+                      </a:r>
+                      <a:r>
+                        <a:rPr kumimoji="0" lang="en-US" sz="1200" b="0" i="0" u="none" strike="noStrike" kern="1200" cap="none" spc="0" normalizeH="0" baseline="0" noProof="0" dirty="0">
+                          <a:ln>
+                            <a:noFill/>
+                          </a:ln>
+                          <a:solidFill>
+                            <a:srgbClr val="545454"/>
+                          </a:solidFill>
+                          <a:effectLst/>
+                          <a:uLnTx/>
+                          <a:uFillTx/>
+                          <a:latin typeface="Lucida Console" panose="020B0609040504020204" pitchFamily="49" charset="0"/>
+                          <a:ea typeface="+mn-ea"/>
+                          <a:cs typeface="+mn-cs"/>
+                        </a:rPr>
+                        <a:t>happiness</a:t>
+                      </a:r>
+                      <a:endParaRPr lang="en-US" sz="1400" dirty="0">
+                        <a:solidFill>
+                          <a:srgbClr val="545454"/>
+                        </a:solidFill>
+                        <a:latin typeface="Lucida Console" panose="020B0609040504020204" pitchFamily="49" charset="0"/>
+                      </a:endParaRPr>
+                    </a:p>
+                  </a:txBody>
+                  <a:tcPr/>
+                </a:tc>
+                <a:tc>
+                  <a:txBody>
+                    <a:bodyPr/>
+                    <a:lstStyle/>
+                    <a:p>
+                      <a:r>
+                        <a:rPr lang="en-US" sz="1400" dirty="0"/>
+                        <a:t>There is no difference in scale for happiness score across Medium and High HDI categories</a:t>
+                      </a:r>
+                    </a:p>
+                  </a:txBody>
+                  <a:tcPr/>
+                </a:tc>
+                <a:tc>
+                  <a:txBody>
+                    <a:bodyPr/>
+                    <a:lstStyle/>
+                    <a:p>
+                      <a:r>
+                        <a:rPr lang="en-US" sz="1400" dirty="0"/>
+                        <a:t>Happiness score differs in scale across Medium and High HDI categories</a:t>
+                      </a:r>
+                      <a:endParaRPr lang="en-US" sz="1400" dirty="0">
+                        <a:solidFill>
+                          <a:srgbClr val="FF0000"/>
+                        </a:solidFill>
+                      </a:endParaRPr>
+                    </a:p>
+                  </a:txBody>
+                  <a:tcPr/>
+                </a:tc>
+                <a:tc>
+                  <a:txBody>
+                    <a:bodyPr/>
+                    <a:lstStyle/>
+                    <a:p>
+                      <a:r>
+                        <a:rPr lang="en-US" sz="1400" dirty="0"/>
+                        <a:t>Wilcoxon Rank-Sum Test (check assumptions), Ansari-Bradley Test</a:t>
+                      </a:r>
+                    </a:p>
+                  </a:txBody>
+                  <a:tcPr/>
+                </a:tc>
+                <a:tc>
+                  <a:txBody>
+                    <a:bodyPr/>
+                    <a:lstStyle/>
+                    <a:p>
+                      <a:r>
+                        <a:rPr lang="en-US" sz="1400" dirty="0"/>
+                        <a:t>Two-Sample </a:t>
+                      </a:r>
+                      <a:r>
+                        <a:rPr lang="en-US" sz="1400" i="1" dirty="0"/>
+                        <a:t>t</a:t>
+                      </a:r>
+                      <a:r>
+                        <a:rPr lang="en-US" sz="1400" dirty="0"/>
+                        <a:t>-Test (check assumptions), </a:t>
+                      </a:r>
+                      <a:r>
+                        <a:rPr lang="en-US" sz="1400" dirty="0" err="1"/>
+                        <a:t>Levene’s</a:t>
+                      </a:r>
+                      <a:r>
+                        <a:rPr lang="en-US" sz="1400" dirty="0"/>
+                        <a:t> Test for Homogeneity</a:t>
+                      </a:r>
+                    </a:p>
+                  </a:txBody>
+                  <a:tcPr/>
+                </a:tc>
+                <a:extLst>
+                  <a:ext uri="{0D108BD9-81ED-4DB2-BD59-A6C34878D82A}">
+                    <a16:rowId xmlns:a16="http://schemas.microsoft.com/office/drawing/2014/main" val="3482405875"/>
                   </a:ext>
                 </a:extLst>
               </a:tr>
@@ -9673,6 +9834,620 @@
           <p:cNvPr id="2" name="Title 1">
             <a:extLst>
               <a:ext uri="{FF2B5EF4-FFF2-40B4-BE49-F238E27FC236}">
+                <a16:creationId xmlns:a16="http://schemas.microsoft.com/office/drawing/2014/main" id="{9C375C1D-A60F-47D9-82DB-79EDD0A16512}"/>
+              </a:ext>
+            </a:extLst>
+          </p:cNvPr>
+          <p:cNvSpPr>
+            <a:spLocks noGrp="1"/>
+          </p:cNvSpPr>
+          <p:nvPr>
+            <p:ph type="title"/>
+          </p:nvPr>
+        </p:nvSpPr>
+        <p:spPr/>
+        <p:txBody>
+          <a:bodyPr/>
+          <a:lstStyle/>
+          <a:p>
+            <a:r>
+              <a:rPr lang="en-US" dirty="0"/>
+              <a:t>ANALYSIS 6</a:t>
+            </a:r>
+          </a:p>
+        </p:txBody>
+      </p:sp>
+      <p:sp>
+        <p:nvSpPr>
+          <p:cNvPr id="3" name="Content Placeholder 2">
+            <a:extLst>
+              <a:ext uri="{FF2B5EF4-FFF2-40B4-BE49-F238E27FC236}">
+                <a16:creationId xmlns:a16="http://schemas.microsoft.com/office/drawing/2014/main" id="{7A2BAD76-95DD-43BA-8566-7768201FE42A}"/>
+              </a:ext>
+            </a:extLst>
+          </p:cNvPr>
+          <p:cNvSpPr>
+            <a:spLocks noGrp="1"/>
+          </p:cNvSpPr>
+          <p:nvPr>
+            <p:ph idx="1"/>
+          </p:nvPr>
+        </p:nvSpPr>
+        <p:spPr>
+          <a:xfrm>
+            <a:off x="476285" y="1358791"/>
+            <a:ext cx="11213722" cy="5087944"/>
+          </a:xfrm>
+        </p:spPr>
+        <p:txBody>
+          <a:bodyPr>
+            <a:normAutofit fontScale="62500" lnSpcReduction="20000"/>
+          </a:bodyPr>
+          <a:lstStyle/>
+          <a:p>
+            <a:pPr>
+              <a:lnSpc>
+                <a:spcPct val="105000"/>
+              </a:lnSpc>
+            </a:pPr>
+            <a:r>
+              <a:rPr lang="en-US" dirty="0"/>
+              <a:t>Testing for difference in </a:t>
+            </a:r>
+            <a:r>
+              <a:rPr lang="en-US" sz="2600" dirty="0">
+                <a:solidFill>
+                  <a:srgbClr val="545454"/>
+                </a:solidFill>
+                <a:latin typeface="Lucida Console" panose="020B0609040504020204" pitchFamily="49" charset="0"/>
+              </a:rPr>
+              <a:t>happiness</a:t>
+            </a:r>
+            <a:r>
+              <a:rPr lang="en-US" dirty="0"/>
+              <a:t> scale across Medium and High levels of </a:t>
+            </a:r>
+            <a:r>
+              <a:rPr lang="en-US" sz="2600" dirty="0" err="1">
+                <a:solidFill>
+                  <a:srgbClr val="545454"/>
+                </a:solidFill>
+                <a:latin typeface="Lucida Console" panose="020B0609040504020204" pitchFamily="49" charset="0"/>
+              </a:rPr>
+              <a:t>HDI_cat</a:t>
+            </a:r>
+            <a:endParaRPr lang="en-US" sz="2600" dirty="0"/>
+          </a:p>
+          <a:p>
+            <a:pPr lvl="1">
+              <a:lnSpc>
+                <a:spcPct val="105000"/>
+              </a:lnSpc>
+            </a:pPr>
+            <a:r>
+              <a:rPr lang="en-US" dirty="0"/>
+              <a:t>Requires checking assumption that locations do not differ (nonparametric: two-sample Wilcoxon Rank-Sum Test, nonparametric:  two-sample </a:t>
+            </a:r>
+            <a:r>
+              <a:rPr lang="en-US" i="1" dirty="0"/>
+              <a:t>t</a:t>
+            </a:r>
+            <a:r>
+              <a:rPr lang="en-US" dirty="0"/>
+              <a:t>-test)</a:t>
+            </a:r>
+          </a:p>
+          <a:p>
+            <a:pPr lvl="1">
+              <a:lnSpc>
+                <a:spcPct val="105000"/>
+              </a:lnSpc>
+            </a:pPr>
+            <a:r>
+              <a:rPr lang="en-US" dirty="0"/>
+              <a:t>Both tests yielded nonsignificant </a:t>
+            </a:r>
+            <a:r>
+              <a:rPr lang="en-US" i="1" dirty="0"/>
+              <a:t>p</a:t>
+            </a:r>
+            <a:r>
+              <a:rPr lang="en-US" dirty="0"/>
+              <a:t>-values (</a:t>
+            </a:r>
+            <a:r>
+              <a:rPr lang="en-US" i="1" dirty="0" err="1"/>
+              <a:t>p</a:t>
+            </a:r>
+            <a:r>
+              <a:rPr lang="en-US" i="1" baseline="-25000" dirty="0" err="1"/>
+              <a:t>Wilcoxon</a:t>
+            </a:r>
+            <a:r>
+              <a:rPr lang="en-US" dirty="0"/>
+              <a:t> = 0.280; </a:t>
+            </a:r>
+            <a:r>
+              <a:rPr lang="en-US" i="1" dirty="0" err="1"/>
+              <a:t>p</a:t>
+            </a:r>
+            <a:r>
+              <a:rPr lang="en-US" i="1" baseline="-25000" dirty="0" err="1"/>
+              <a:t>t</a:t>
+            </a:r>
+            <a:r>
+              <a:rPr lang="en-US" dirty="0"/>
+              <a:t> = 0.249) so fail to reject the assumption of equal locations</a:t>
+            </a:r>
+          </a:p>
+          <a:p>
+            <a:pPr>
+              <a:lnSpc>
+                <a:spcPct val="105000"/>
+              </a:lnSpc>
+            </a:pPr>
+            <a:r>
+              <a:rPr lang="en-US" dirty="0"/>
+              <a:t>Nonparametric test via </a:t>
+            </a:r>
+            <a:r>
+              <a:rPr lang="en-US" sz="2600" dirty="0" err="1">
+                <a:solidFill>
+                  <a:srgbClr val="545454"/>
+                </a:solidFill>
+                <a:latin typeface="Lucida Console" panose="020B0609040504020204" pitchFamily="49" charset="0"/>
+              </a:rPr>
+              <a:t>ansari.test</a:t>
+            </a:r>
+            <a:r>
+              <a:rPr lang="en-US" sz="2600" dirty="0">
+                <a:solidFill>
+                  <a:srgbClr val="545454"/>
+                </a:solidFill>
+                <a:latin typeface="Lucida Console" panose="020B0609040504020204" pitchFamily="49" charset="0"/>
+              </a:rPr>
+              <a:t>()</a:t>
+            </a:r>
+          </a:p>
+          <a:p>
+            <a:pPr lvl="1">
+              <a:lnSpc>
+                <a:spcPct val="105000"/>
+              </a:lnSpc>
+            </a:pPr>
+            <a:r>
+              <a:rPr lang="en-US" i="1" dirty="0" err="1"/>
+              <a:t>p</a:t>
+            </a:r>
+            <a:r>
+              <a:rPr lang="en-US" i="1" baseline="-25000" dirty="0" err="1"/>
+              <a:t>AB</a:t>
+            </a:r>
+            <a:r>
+              <a:rPr lang="en-US" dirty="0"/>
+              <a:t> = 0.753</a:t>
+            </a:r>
+          </a:p>
+          <a:p>
+            <a:pPr>
+              <a:lnSpc>
+                <a:spcPct val="105000"/>
+              </a:lnSpc>
+            </a:pPr>
+            <a:r>
+              <a:rPr lang="en-US" dirty="0"/>
+              <a:t>Parametric test via </a:t>
+            </a:r>
+            <a:r>
+              <a:rPr lang="en-US" sz="2600" dirty="0">
+                <a:solidFill>
+                  <a:srgbClr val="545454"/>
+                </a:solidFill>
+                <a:latin typeface="Lucida Console" panose="020B0609040504020204" pitchFamily="49" charset="0"/>
+              </a:rPr>
+              <a:t>car::</a:t>
+            </a:r>
+            <a:r>
+              <a:rPr lang="en-US" sz="2600" dirty="0" err="1">
+                <a:solidFill>
+                  <a:srgbClr val="545454"/>
+                </a:solidFill>
+                <a:latin typeface="Lucida Console" panose="020B0609040504020204" pitchFamily="49" charset="0"/>
+              </a:rPr>
+              <a:t>leveneTest</a:t>
+            </a:r>
+            <a:r>
+              <a:rPr lang="en-US" sz="2600" dirty="0">
+                <a:solidFill>
+                  <a:srgbClr val="545454"/>
+                </a:solidFill>
+                <a:latin typeface="Lucida Console" panose="020B0609040504020204" pitchFamily="49" charset="0"/>
+              </a:rPr>
+              <a:t>()</a:t>
+            </a:r>
+          </a:p>
+          <a:p>
+            <a:pPr lvl="1">
+              <a:lnSpc>
+                <a:spcPct val="105000"/>
+              </a:lnSpc>
+            </a:pPr>
+            <a:r>
+              <a:rPr lang="en-US" i="1" dirty="0" err="1"/>
+              <a:t>p</a:t>
+            </a:r>
+            <a:r>
+              <a:rPr lang="en-US" i="1" baseline="-25000" dirty="0" err="1"/>
+              <a:t>Levene</a:t>
+            </a:r>
+            <a:r>
+              <a:rPr lang="en-US" i="1" baseline="-25000" dirty="0"/>
+              <a:t> </a:t>
+            </a:r>
+            <a:r>
+              <a:rPr lang="en-US" dirty="0"/>
+              <a:t>= 0.389</a:t>
+            </a:r>
+          </a:p>
+          <a:p>
+            <a:pPr>
+              <a:lnSpc>
+                <a:spcPct val="105000"/>
+              </a:lnSpc>
+            </a:pPr>
+            <a:r>
+              <a:rPr lang="en-US" dirty="0"/>
+              <a:t>Conclusion:  at the </a:t>
+            </a:r>
+            <a:r>
+              <a:rPr lang="el-GR" i="1" dirty="0"/>
+              <a:t>α</a:t>
+            </a:r>
+            <a:r>
+              <a:rPr lang="en-US" dirty="0"/>
+              <a:t> = 0.05 level, there is insufficient evidence of a difference in scale for </a:t>
+            </a:r>
+            <a:r>
+              <a:rPr lang="en-US" sz="2500" dirty="0">
+                <a:solidFill>
+                  <a:srgbClr val="545454"/>
+                </a:solidFill>
+                <a:latin typeface="Lucida Console" panose="020B0609040504020204" pitchFamily="49" charset="0"/>
+              </a:rPr>
+              <a:t>happiness</a:t>
+            </a:r>
+            <a:r>
+              <a:rPr lang="en-US" dirty="0"/>
+              <a:t> across the Medium and High HDI categories</a:t>
+            </a:r>
+          </a:p>
+          <a:p>
+            <a:pPr>
+              <a:lnSpc>
+                <a:spcPct val="105000"/>
+              </a:lnSpc>
+            </a:pPr>
+            <a:r>
+              <a:rPr lang="en-US" dirty="0"/>
+              <a:t>All tests assume independence (satisfied by the data)</a:t>
+            </a:r>
+          </a:p>
+          <a:p>
+            <a:pPr>
+              <a:lnSpc>
+                <a:spcPct val="105000"/>
+              </a:lnSpc>
+            </a:pPr>
+            <a:r>
+              <a:rPr lang="en-US" i="1" dirty="0"/>
+              <a:t>T</a:t>
+            </a:r>
+            <a:r>
+              <a:rPr lang="en-US" dirty="0"/>
+              <a:t>-test and </a:t>
+            </a:r>
+            <a:r>
+              <a:rPr lang="en-US" dirty="0" err="1"/>
+              <a:t>Levene’s</a:t>
+            </a:r>
+            <a:r>
+              <a:rPr lang="en-US" dirty="0"/>
+              <a:t> Test assume normality (also satisfied) </a:t>
+            </a:r>
+          </a:p>
+          <a:p>
+            <a:pPr>
+              <a:lnSpc>
+                <a:spcPct val="105000"/>
+              </a:lnSpc>
+            </a:pPr>
+            <a:r>
+              <a:rPr lang="en-US" dirty="0"/>
+              <a:t>Boxplots seem to suggest difference in scale, but this is not supported by either Ansari-Bradley or </a:t>
+            </a:r>
+            <a:r>
+              <a:rPr lang="en-US" dirty="0" err="1"/>
+              <a:t>Levene</a:t>
+            </a:r>
+            <a:r>
+              <a:rPr lang="en-US" dirty="0"/>
+              <a:t> (see next slide)</a:t>
+            </a:r>
+          </a:p>
+          <a:p>
+            <a:pPr>
+              <a:lnSpc>
+                <a:spcPct val="105000"/>
+              </a:lnSpc>
+            </a:pPr>
+            <a:r>
+              <a:rPr lang="en-US" dirty="0"/>
+              <a:t>Both the nonparametric and parametric approaches are appropriate in this case</a:t>
+            </a:r>
+          </a:p>
+        </p:txBody>
+      </p:sp>
+    </p:spTree>
+    <p:extLst>
+      <p:ext uri="{BB962C8B-B14F-4D97-AF65-F5344CB8AC3E}">
+        <p14:creationId xmlns:p14="http://schemas.microsoft.com/office/powerpoint/2010/main" val="2439155406"/>
+      </p:ext>
+    </p:extLst>
+  </p:cSld>
+  <p:clrMapOvr>
+    <a:masterClrMapping/>
+  </p:clrMapOvr>
+</p:sld>
+</file>
+
+<file path=ppt/slides/slide19.xml><?xml version="1.0" encoding="utf-8"?>
+<p:sld xmlns:a="http://schemas.openxmlformats.org/drawingml/2006/main" xmlns:r="http://schemas.openxmlformats.org/officeDocument/2006/relationships" xmlns:p="http://schemas.openxmlformats.org/presentationml/2006/main">
+  <p:cSld>
+    <p:spTree>
+      <p:nvGrpSpPr>
+        <p:cNvPr id="1" name=""/>
+        <p:cNvGrpSpPr/>
+        <p:nvPr/>
+      </p:nvGrpSpPr>
+      <p:grpSpPr>
+        <a:xfrm>
+          <a:off x="0" y="0"/>
+          <a:ext cx="0" cy="0"/>
+          <a:chOff x="0" y="0"/>
+          <a:chExt cx="0" cy="0"/>
+        </a:xfrm>
+      </p:grpSpPr>
+      <p:sp>
+        <p:nvSpPr>
+          <p:cNvPr id="2" name="Title 1">
+            <a:extLst>
+              <a:ext uri="{FF2B5EF4-FFF2-40B4-BE49-F238E27FC236}">
+                <a16:creationId xmlns:a16="http://schemas.microsoft.com/office/drawing/2014/main" id="{9C375C1D-A60F-47D9-82DB-79EDD0A16512}"/>
+              </a:ext>
+            </a:extLst>
+          </p:cNvPr>
+          <p:cNvSpPr>
+            <a:spLocks noGrp="1"/>
+          </p:cNvSpPr>
+          <p:nvPr>
+            <p:ph type="title"/>
+          </p:nvPr>
+        </p:nvSpPr>
+        <p:spPr/>
+        <p:txBody>
+          <a:bodyPr/>
+          <a:lstStyle/>
+          <a:p>
+            <a:r>
+              <a:rPr lang="en-US" dirty="0"/>
+              <a:t>ANALYSIS 6</a:t>
+            </a:r>
+          </a:p>
+        </p:txBody>
+      </p:sp>
+      <p:sp>
+        <p:nvSpPr>
+          <p:cNvPr id="5" name="TextBox 4">
+            <a:extLst>
+              <a:ext uri="{FF2B5EF4-FFF2-40B4-BE49-F238E27FC236}">
+                <a16:creationId xmlns:a16="http://schemas.microsoft.com/office/drawing/2014/main" id="{8E375F77-84DB-4FC0-99AB-ED4D29C50289}"/>
+              </a:ext>
+            </a:extLst>
+          </p:cNvPr>
+          <p:cNvSpPr txBox="1"/>
+          <p:nvPr/>
+        </p:nvSpPr>
+        <p:spPr>
+          <a:xfrm>
+            <a:off x="1253975" y="1653323"/>
+            <a:ext cx="5381493" cy="369332"/>
+          </a:xfrm>
+          <a:prstGeom prst="rect">
+            <a:avLst/>
+          </a:prstGeom>
+          <a:noFill/>
+        </p:spPr>
+        <p:txBody>
+          <a:bodyPr wrap="square" rtlCol="0">
+            <a:spAutoFit/>
+          </a:bodyPr>
+          <a:lstStyle/>
+          <a:p>
+            <a:r>
+              <a:rPr lang="en-US" b="1" dirty="0">
+                <a:solidFill>
+                  <a:srgbClr val="545454"/>
+                </a:solidFill>
+                <a:latin typeface="Calibri" panose="020F0502020204030204" pitchFamily="34" charset="0"/>
+                <a:cs typeface="Calibri" panose="020F0502020204030204" pitchFamily="34" charset="0"/>
+              </a:rPr>
+              <a:t>Happiness Score by Medium and High HDI Categories</a:t>
+            </a:r>
+          </a:p>
+        </p:txBody>
+      </p:sp>
+      <p:pic>
+        <p:nvPicPr>
+          <p:cNvPr id="3" name="Picture 2">
+            <a:extLst>
+              <a:ext uri="{FF2B5EF4-FFF2-40B4-BE49-F238E27FC236}">
+                <a16:creationId xmlns:a16="http://schemas.microsoft.com/office/drawing/2014/main" id="{BA9745F0-7A78-4E16-B98D-0677C9B76A15}"/>
+              </a:ext>
+            </a:extLst>
+          </p:cNvPr>
+          <p:cNvPicPr>
+            <a:picLocks noChangeAspect="1"/>
+          </p:cNvPicPr>
+          <p:nvPr/>
+        </p:nvPicPr>
+        <p:blipFill rotWithShape="1">
+          <a:blip r:embed="rId2"/>
+          <a:srcRect t="8466"/>
+          <a:stretch/>
+        </p:blipFill>
+        <p:spPr>
+          <a:xfrm>
+            <a:off x="862716" y="2057400"/>
+            <a:ext cx="10552176" cy="3863576"/>
+          </a:xfrm>
+          <a:prstGeom prst="rect">
+            <a:avLst/>
+          </a:prstGeom>
+        </p:spPr>
+      </p:pic>
+    </p:spTree>
+    <p:extLst>
+      <p:ext uri="{BB962C8B-B14F-4D97-AF65-F5344CB8AC3E}">
+        <p14:creationId xmlns:p14="http://schemas.microsoft.com/office/powerpoint/2010/main" val="2408750774"/>
+      </p:ext>
+    </p:extLst>
+  </p:cSld>
+  <p:clrMapOvr>
+    <a:masterClrMapping/>
+  </p:clrMapOvr>
+</p:sld>
+</file>
+
+<file path=ppt/slides/slide2.xml><?xml version="1.0" encoding="utf-8"?>
+<p:sld xmlns:a="http://schemas.openxmlformats.org/drawingml/2006/main" xmlns:r="http://schemas.openxmlformats.org/officeDocument/2006/relationships" xmlns:p="http://schemas.openxmlformats.org/presentationml/2006/main">
+  <p:cSld>
+    <p:spTree>
+      <p:nvGrpSpPr>
+        <p:cNvPr id="1" name=""/>
+        <p:cNvGrpSpPr/>
+        <p:nvPr/>
+      </p:nvGrpSpPr>
+      <p:grpSpPr>
+        <a:xfrm>
+          <a:off x="0" y="0"/>
+          <a:ext cx="0" cy="0"/>
+          <a:chOff x="0" y="0"/>
+          <a:chExt cx="0" cy="0"/>
+        </a:xfrm>
+      </p:grpSpPr>
+      <p:sp>
+        <p:nvSpPr>
+          <p:cNvPr id="2" name="Title 1">
+            <a:extLst>
+              <a:ext uri="{FF2B5EF4-FFF2-40B4-BE49-F238E27FC236}">
+                <a16:creationId xmlns:a16="http://schemas.microsoft.com/office/drawing/2014/main" id="{7F4CC3D0-0CA1-49D1-A58D-ED170897A490}"/>
+              </a:ext>
+            </a:extLst>
+          </p:cNvPr>
+          <p:cNvSpPr>
+            <a:spLocks noGrp="1"/>
+          </p:cNvSpPr>
+          <p:nvPr>
+            <p:ph type="title"/>
+          </p:nvPr>
+        </p:nvSpPr>
+        <p:spPr/>
+        <p:txBody>
+          <a:bodyPr/>
+          <a:lstStyle/>
+          <a:p>
+            <a:r>
+              <a:rPr lang="en-US" dirty="0"/>
+              <a:t>BACKGROUND</a:t>
+            </a:r>
+          </a:p>
+        </p:txBody>
+      </p:sp>
+      <p:sp>
+        <p:nvSpPr>
+          <p:cNvPr id="3" name="Content Placeholder 2">
+            <a:extLst>
+              <a:ext uri="{FF2B5EF4-FFF2-40B4-BE49-F238E27FC236}">
+                <a16:creationId xmlns:a16="http://schemas.microsoft.com/office/drawing/2014/main" id="{32F52577-0D70-4F76-A5F5-16B90F38E66F}"/>
+              </a:ext>
+            </a:extLst>
+          </p:cNvPr>
+          <p:cNvSpPr>
+            <a:spLocks noGrp="1"/>
+          </p:cNvSpPr>
+          <p:nvPr>
+            <p:ph idx="1"/>
+          </p:nvPr>
+        </p:nvSpPr>
+        <p:spPr/>
+        <p:txBody>
+          <a:bodyPr/>
+          <a:lstStyle/>
+          <a:p>
+            <a:r>
+              <a:rPr lang="en-US" dirty="0"/>
+              <a:t>With increasing globalization, it’s important to understand how the United States compares to other countries on key Quality of Life (QoL) measures</a:t>
+            </a:r>
+          </a:p>
+          <a:p>
+            <a:r>
+              <a:rPr lang="en-US" dirty="0"/>
+              <a:t>This requires investigating the QoL measures and understanding how they may be related</a:t>
+            </a:r>
+          </a:p>
+          <a:p>
+            <a:r>
+              <a:rPr lang="en-US" dirty="0"/>
+              <a:t>Traditional parametric approaches may be inappropriate if their assumptions are not met, but nonparametric methods can be applied</a:t>
+            </a:r>
+          </a:p>
+        </p:txBody>
+      </p:sp>
+    </p:spTree>
+    <p:extLst>
+      <p:ext uri="{BB962C8B-B14F-4D97-AF65-F5344CB8AC3E}">
+        <p14:creationId xmlns:p14="http://schemas.microsoft.com/office/powerpoint/2010/main" val="2720812227"/>
+      </p:ext>
+    </p:extLst>
+  </p:cSld>
+  <p:clrMapOvr>
+    <a:masterClrMapping/>
+  </p:clrMapOvr>
+</p:sld>
+</file>
+
+<file path=ppt/slides/slide20.xml><?xml version="1.0" encoding="utf-8"?>
+<p:sld xmlns:a="http://schemas.openxmlformats.org/drawingml/2006/main" xmlns:r="http://schemas.openxmlformats.org/officeDocument/2006/relationships" xmlns:p="http://schemas.openxmlformats.org/presentationml/2006/main">
+  <p:cSld>
+    <p:spTree>
+      <p:nvGrpSpPr>
+        <p:cNvPr id="1" name=""/>
+        <p:cNvGrpSpPr/>
+        <p:nvPr/>
+      </p:nvGrpSpPr>
+      <p:grpSpPr>
+        <a:xfrm>
+          <a:off x="0" y="0"/>
+          <a:ext cx="0" cy="0"/>
+          <a:chOff x="0" y="0"/>
+          <a:chExt cx="0" cy="0"/>
+        </a:xfrm>
+      </p:grpSpPr>
+      <p:sp>
+        <p:nvSpPr>
+          <p:cNvPr id="2" name="Title 1">
+            <a:extLst>
+              <a:ext uri="{FF2B5EF4-FFF2-40B4-BE49-F238E27FC236}">
                 <a16:creationId xmlns:a16="http://schemas.microsoft.com/office/drawing/2014/main" id="{B04F0108-959F-4C9F-97EE-3FF4CCAB861D}"/>
               </a:ext>
             </a:extLst>
@@ -9712,14 +10487,14 @@
             <p:ph idx="1"/>
             <p:extLst>
               <p:ext uri="{D42A27DB-BD31-4B8C-83A1-F6EECF244321}">
-                <p14:modId xmlns:p14="http://schemas.microsoft.com/office/powerpoint/2010/main" val="3564480593"/>
+                <p14:modId xmlns:p14="http://schemas.microsoft.com/office/powerpoint/2010/main" val="4292465341"/>
               </p:ext>
             </p:extLst>
           </p:nvPr>
         </p:nvGraphicFramePr>
         <p:xfrm>
-          <a:off x="3352800" y="1717487"/>
-          <a:ext cx="5486400" cy="3423025"/>
+          <a:off x="3352800" y="1288829"/>
+          <a:ext cx="5486400" cy="4002145"/>
         </p:xfrm>
         <a:graphic>
           <a:graphicData uri="http://schemas.openxmlformats.org/drawingml/2006/table">
@@ -10145,6 +10920,75 @@
                       </a:r>
                     </a:p>
                   </a:txBody>
+                  <a:tcPr anchor="ctr"/>
+                </a:tc>
+                <a:tc>
+                  <a:txBody>
+                    <a:bodyPr/>
+                    <a:lstStyle/>
+                    <a:p>
+                      <a:pPr algn="ctr"/>
+                      <a:r>
+                        <a:rPr lang="en-US" sz="3200" dirty="0">
+                          <a:solidFill>
+                            <a:srgbClr val="00B050"/>
+                          </a:solidFill>
+                          <a:latin typeface="Wingdings" panose="05000000000000000000" pitchFamily="2" charset="2"/>
+                        </a:rPr>
+                        <a:t>J</a:t>
+                      </a:r>
+                      <a:endParaRPr lang="en-US" sz="3200" dirty="0">
+                        <a:solidFill>
+                          <a:srgbClr val="00B050"/>
+                        </a:solidFill>
+                      </a:endParaRPr>
+                    </a:p>
+                  </a:txBody>
+                  <a:tcPr anchor="ctr"/>
+                </a:tc>
+                <a:tc>
+                  <a:txBody>
+                    <a:bodyPr/>
+                    <a:lstStyle/>
+                    <a:p>
+                      <a:pPr algn="ctr"/>
+                      <a:r>
+                        <a:rPr lang="en-US" sz="3200" dirty="0">
+                          <a:solidFill>
+                            <a:schemeClr val="accent5"/>
+                          </a:solidFill>
+                          <a:latin typeface="Wingdings" panose="05000000000000000000" pitchFamily="2" charset="2"/>
+                        </a:rPr>
+                        <a:t>L</a:t>
+                      </a:r>
+                      <a:endParaRPr lang="en-US" sz="3200" dirty="0">
+                        <a:solidFill>
+                          <a:schemeClr val="accent5"/>
+                        </a:solidFill>
+                      </a:endParaRPr>
+                    </a:p>
+                  </a:txBody>
+                  <a:tcPr anchor="ctr"/>
+                </a:tc>
+                <a:extLst>
+                  <a:ext uri="{0D108BD9-81ED-4DB2-BD59-A6C34878D82A}">
+                    <a16:rowId xmlns:a16="http://schemas.microsoft.com/office/drawing/2014/main" val="3517384796"/>
+                  </a:ext>
+                </a:extLst>
+              </a:tr>
+              <a:tr h="527425">
+                <a:tc>
+                  <a:txBody>
+                    <a:bodyPr/>
+                    <a:lstStyle/>
+                    <a:p>
+                      <a:pPr algn="ctr"/>
+                      <a:r>
+                        <a:rPr lang="en-US" dirty="0"/>
+                        <a:t>6</a:t>
+                      </a:r>
+                    </a:p>
+                  </a:txBody>
                   <a:tcPr anchor="ctr">
                     <a:lnB w="38100" cap="flat" cmpd="sng" algn="ctr">
                       <a:solidFill>
@@ -10198,13 +11042,21 @@
                     <a:p>
                       <a:pPr algn="ctr"/>
                       <a:r>
-                        <a:rPr lang="en-US" sz="3200" dirty="0">
+                        <a:rPr kumimoji="0" lang="en-US" sz="3200" b="0" i="0" u="none" strike="noStrike" kern="1200" cap="none" spc="0" normalizeH="0" baseline="0" noProof="0" dirty="0">
+                          <a:ln>
+                            <a:noFill/>
+                          </a:ln>
                           <a:solidFill>
-                            <a:schemeClr val="accent5"/>
+                            <a:srgbClr val="00B050"/>
                           </a:solidFill>
+                          <a:effectLst/>
+                          <a:uLnTx/>
+                          <a:uFillTx/>
                           <a:latin typeface="Wingdings" panose="05000000000000000000" pitchFamily="2" charset="2"/>
+                          <a:ea typeface="+mn-ea"/>
+                          <a:cs typeface="+mn-cs"/>
                         </a:rPr>
-                        <a:t>L</a:t>
+                        <a:t>J</a:t>
                       </a:r>
                       <a:endParaRPr lang="en-US" sz="3200" dirty="0">
                         <a:solidFill>
@@ -10227,7 +11079,7 @@
                 </a:tc>
                 <a:extLst>
                   <a:ext uri="{0D108BD9-81ED-4DB2-BD59-A6C34878D82A}">
-                    <a16:rowId xmlns:a16="http://schemas.microsoft.com/office/drawing/2014/main" val="3517384796"/>
+                    <a16:rowId xmlns:a16="http://schemas.microsoft.com/office/drawing/2014/main" val="2291048545"/>
                   </a:ext>
                 </a:extLst>
               </a:tr>
@@ -10283,7 +11135,7 @@
 </p:sld>
 </file>
 
-<file path=ppt/slides/slide19.xml><?xml version="1.0" encoding="utf-8"?>
+<file path=ppt/slides/slide21.xml><?xml version="1.0" encoding="utf-8"?>
 <p:sld xmlns:a="http://schemas.openxmlformats.org/drawingml/2006/main" xmlns:r="http://schemas.openxmlformats.org/officeDocument/2006/relationships" xmlns:p="http://schemas.openxmlformats.org/presentationml/2006/main">
   <p:cSld>
     <p:spTree>
@@ -10357,7 +11209,7 @@
           <a:p>
             <a:r>
               <a:rPr lang="en-US" dirty="0"/>
-              <a:t>Parametric methods were only appropriate in 2/5 (40%) analyses</a:t>
+              <a:t>Parametric methods were only appropriate in 3/6 analyses</a:t>
             </a:r>
           </a:p>
           <a:p>
@@ -10391,105 +11243,7 @@
 </p:sld>
 </file>
 
-<file path=ppt/slides/slide2.xml><?xml version="1.0" encoding="utf-8"?>
-<p:sld xmlns:a="http://schemas.openxmlformats.org/drawingml/2006/main" xmlns:r="http://schemas.openxmlformats.org/officeDocument/2006/relationships" xmlns:p="http://schemas.openxmlformats.org/presentationml/2006/main">
-  <p:cSld>
-    <p:spTree>
-      <p:nvGrpSpPr>
-        <p:cNvPr id="1" name=""/>
-        <p:cNvGrpSpPr/>
-        <p:nvPr/>
-      </p:nvGrpSpPr>
-      <p:grpSpPr>
-        <a:xfrm>
-          <a:off x="0" y="0"/>
-          <a:ext cx="0" cy="0"/>
-          <a:chOff x="0" y="0"/>
-          <a:chExt cx="0" cy="0"/>
-        </a:xfrm>
-      </p:grpSpPr>
-      <p:sp>
-        <p:nvSpPr>
-          <p:cNvPr id="2" name="Title 1">
-            <a:extLst>
-              <a:ext uri="{FF2B5EF4-FFF2-40B4-BE49-F238E27FC236}">
-                <a16:creationId xmlns:a16="http://schemas.microsoft.com/office/drawing/2014/main" id="{7F4CC3D0-0CA1-49D1-A58D-ED170897A490}"/>
-              </a:ext>
-            </a:extLst>
-          </p:cNvPr>
-          <p:cNvSpPr>
-            <a:spLocks noGrp="1"/>
-          </p:cNvSpPr>
-          <p:nvPr>
-            <p:ph type="title"/>
-          </p:nvPr>
-        </p:nvSpPr>
-        <p:spPr/>
-        <p:txBody>
-          <a:bodyPr/>
-          <a:lstStyle/>
-          <a:p>
-            <a:r>
-              <a:rPr lang="en-US" dirty="0"/>
-              <a:t>BACKGROUND</a:t>
-            </a:r>
-          </a:p>
-        </p:txBody>
-      </p:sp>
-      <p:sp>
-        <p:nvSpPr>
-          <p:cNvPr id="3" name="Content Placeholder 2">
-            <a:extLst>
-              <a:ext uri="{FF2B5EF4-FFF2-40B4-BE49-F238E27FC236}">
-                <a16:creationId xmlns:a16="http://schemas.microsoft.com/office/drawing/2014/main" id="{32F52577-0D70-4F76-A5F5-16B90F38E66F}"/>
-              </a:ext>
-            </a:extLst>
-          </p:cNvPr>
-          <p:cNvSpPr>
-            <a:spLocks noGrp="1"/>
-          </p:cNvSpPr>
-          <p:nvPr>
-            <p:ph idx="1"/>
-          </p:nvPr>
-        </p:nvSpPr>
-        <p:spPr/>
-        <p:txBody>
-          <a:bodyPr/>
-          <a:lstStyle/>
-          <a:p>
-            <a:r>
-              <a:rPr lang="en-US" dirty="0"/>
-              <a:t>With increasing globalization, it’s important to understand how the United States compares to other countries on key Quality of Life (QoL) measures</a:t>
-            </a:r>
-          </a:p>
-          <a:p>
-            <a:r>
-              <a:rPr lang="en-US" dirty="0"/>
-              <a:t>This requires investigating the QoL measures and understanding how they may be related</a:t>
-            </a:r>
-          </a:p>
-          <a:p>
-            <a:r>
-              <a:rPr lang="en-US" dirty="0"/>
-              <a:t>Traditional parametric approaches may be inappropriate if their assumptions are not met, but nonparametric methods can be applied</a:t>
-            </a:r>
-          </a:p>
-        </p:txBody>
-      </p:sp>
-    </p:spTree>
-    <p:extLst>
-      <p:ext uri="{BB962C8B-B14F-4D97-AF65-F5344CB8AC3E}">
-        <p14:creationId xmlns:p14="http://schemas.microsoft.com/office/powerpoint/2010/main" val="2720812227"/>
-      </p:ext>
-    </p:extLst>
-  </p:cSld>
-  <p:clrMapOvr>
-    <a:masterClrMapping/>
-  </p:clrMapOvr>
-</p:sld>
-</file>
-
-<file path=ppt/slides/slide20.xml><?xml version="1.0" encoding="utf-8"?>
+<file path=ppt/slides/slide22.xml><?xml version="1.0" encoding="utf-8"?>
 <p:sld xmlns:a="http://schemas.openxmlformats.org/drawingml/2006/main" xmlns:r="http://schemas.openxmlformats.org/officeDocument/2006/relationships" xmlns:p="http://schemas.openxmlformats.org/presentationml/2006/main">
   <p:cSld>
     <p:spTree>
@@ -10905,7 +11659,7 @@
 </p:sld>
 </file>
 
-<file path=ppt/slides/slide21.xml><?xml version="1.0" encoding="utf-8"?>
+<file path=ppt/slides/slide23.xml><?xml version="1.0" encoding="utf-8"?>
 <p:sld xmlns:a="http://schemas.openxmlformats.org/drawingml/2006/main" xmlns:r="http://schemas.openxmlformats.org/officeDocument/2006/relationships" xmlns:p="http://schemas.openxmlformats.org/presentationml/2006/main">
   <p:cSld>
     <p:spTree>
@@ -11107,7 +11861,7 @@
 </p:sld>
 </file>
 
-<file path=ppt/slides/slide22.xml><?xml version="1.0" encoding="utf-8"?>
+<file path=ppt/slides/slide24.xml><?xml version="1.0" encoding="utf-8"?>
 <p:sld xmlns:a="http://schemas.openxmlformats.org/drawingml/2006/main" xmlns:r="http://schemas.openxmlformats.org/officeDocument/2006/relationships" xmlns:p="http://schemas.openxmlformats.org/presentationml/2006/main">
   <p:cSld>
     <p:spTree>
@@ -11205,7 +11959,7 @@
 </p:sld>
 </file>
 
-<file path=ppt/slides/slide23.xml><?xml version="1.0" encoding="utf-8"?>
+<file path=ppt/slides/slide25.xml><?xml version="1.0" encoding="utf-8"?>
 <p:sld xmlns:a="http://schemas.openxmlformats.org/drawingml/2006/main" xmlns:r="http://schemas.openxmlformats.org/officeDocument/2006/relationships" xmlns:p="http://schemas.openxmlformats.org/presentationml/2006/main">
   <p:cSld>
     <p:spTree>
@@ -11479,7 +12233,7 @@
 </p:sld>
 </file>
 
-<file path=ppt/slides/slide24.xml><?xml version="1.0" encoding="utf-8"?>
+<file path=ppt/slides/slide26.xml><?xml version="1.0" encoding="utf-8"?>
 <p:sld xmlns:a="http://schemas.openxmlformats.org/drawingml/2006/main" xmlns:r="http://schemas.openxmlformats.org/officeDocument/2006/relationships" xmlns:p="http://schemas.openxmlformats.org/presentationml/2006/main">
   <p:cSld>
     <p:spTree>
@@ -11825,7 +12579,7 @@
             </a:pPr>
             <a:r>
               <a:rPr lang="en-US" dirty="0"/>
-              <a:t>Perform 5 parallel analyses using nonparametric methods and their parametric equivalents</a:t>
+              <a:t>Perform 6 parallel analyses using nonparametric methods and their parametric equivalents</a:t>
             </a:r>
           </a:p>
           <a:p>
@@ -11947,7 +12701,7 @@
             <p:ph idx="1"/>
             <p:extLst>
               <p:ext uri="{D42A27DB-BD31-4B8C-83A1-F6EECF244321}">
-                <p14:modId xmlns:p14="http://schemas.microsoft.com/office/powerpoint/2010/main" val="1062473317"/>
+                <p14:modId xmlns:p14="http://schemas.microsoft.com/office/powerpoint/2010/main" val="3251347925"/>
               </p:ext>
             </p:extLst>
           </p:nvPr>
@@ -12040,7 +12794,7 @@
                       <a:r>
                         <a:rPr lang="en-US" sz="1400" b="0" dirty="0">
                           <a:solidFill>
-                            <a:srgbClr val="404040"/>
+                            <a:srgbClr val="545454"/>
                           </a:solidFill>
                           <a:latin typeface="Lucida Console" panose="020B0609040504020204" pitchFamily="49" charset="0"/>
                         </a:rPr>
@@ -12075,7 +12829,7 @@
                       <a:r>
                         <a:rPr lang="en-US" sz="1400" dirty="0" err="1">
                           <a:solidFill>
-                            <a:srgbClr val="404040"/>
+                            <a:srgbClr val="545454"/>
                           </a:solidFill>
                           <a:latin typeface="Lucida Console" panose="020B0609040504020204" pitchFamily="49" charset="0"/>
                         </a:rPr>
@@ -12108,7 +12862,7 @@
                       <a:r>
                         <a:rPr lang="en-US" sz="1400" b="0" dirty="0" err="1">
                           <a:solidFill>
-                            <a:srgbClr val="404040"/>
+                            <a:srgbClr val="545454"/>
                           </a:solidFill>
                           <a:latin typeface="Lucida Console" panose="020B0609040504020204" pitchFamily="49" charset="0"/>
                         </a:rPr>
@@ -12116,7 +12870,7 @@
                       </a:r>
                       <a:endParaRPr lang="en-US" sz="1400" b="0" dirty="0">
                         <a:solidFill>
-                          <a:srgbClr val="404040"/>
+                          <a:srgbClr val="545454"/>
                         </a:solidFill>
                         <a:latin typeface="Lucida Console" panose="020B0609040504020204" pitchFamily="49" charset="0"/>
                       </a:endParaRPr>
@@ -12186,7 +12940,7 @@
                       <a:r>
                         <a:rPr lang="en-US" sz="1400" b="0" dirty="0" err="1">
                           <a:solidFill>
-                            <a:srgbClr val="404040"/>
+                            <a:srgbClr val="545454"/>
                           </a:solidFill>
                           <a:latin typeface="Lucida Console" panose="020B0609040504020204" pitchFamily="49" charset="0"/>
                         </a:rPr>
@@ -12194,7 +12948,7 @@
                       </a:r>
                       <a:endParaRPr lang="en-US" sz="1400" b="0" dirty="0">
                         <a:solidFill>
-                          <a:srgbClr val="404040"/>
+                          <a:srgbClr val="545454"/>
                         </a:solidFill>
                         <a:latin typeface="Lucida Console" panose="020B0609040504020204" pitchFamily="49" charset="0"/>
                       </a:endParaRPr>
@@ -12264,7 +13018,7 @@
                       <a:r>
                         <a:rPr lang="en-US" sz="1400" b="0" dirty="0">
                           <a:solidFill>
-                            <a:srgbClr val="404040"/>
+                            <a:srgbClr val="545454"/>
                           </a:solidFill>
                           <a:latin typeface="Lucida Console" panose="020B0609040504020204" pitchFamily="49" charset="0"/>
                         </a:rPr>
@@ -12323,7 +13077,7 @@
                       <a:r>
                         <a:rPr lang="en-US" sz="1400" b="0" dirty="0" err="1">
                           <a:solidFill>
-                            <a:srgbClr val="404040"/>
+                            <a:srgbClr val="545454"/>
                           </a:solidFill>
                           <a:latin typeface="Lucida Console" panose="020B0609040504020204" pitchFamily="49" charset="0"/>
                         </a:rPr>
@@ -12331,7 +13085,7 @@
                       </a:r>
                       <a:endParaRPr lang="en-US" sz="1400" b="0" dirty="0">
                         <a:solidFill>
-                          <a:srgbClr val="404040"/>
+                          <a:srgbClr val="545454"/>
                         </a:solidFill>
                         <a:latin typeface="Lucida Console" panose="020B0609040504020204" pitchFamily="49" charset="0"/>
                       </a:endParaRPr>
@@ -12388,7 +13142,7 @@
                       <a:r>
                         <a:rPr lang="en-US" sz="1400" b="0" dirty="0">
                           <a:solidFill>
-                            <a:srgbClr val="404040"/>
+                            <a:srgbClr val="545454"/>
                           </a:solidFill>
                           <a:latin typeface="Lucida Console" panose="020B0609040504020204" pitchFamily="49" charset="0"/>
                         </a:rPr>
@@ -12447,7 +13201,7 @@
                       <a:r>
                         <a:rPr lang="en-US" sz="1400" b="0" dirty="0" err="1">
                           <a:solidFill>
-                            <a:srgbClr val="404040"/>
+                            <a:srgbClr val="545454"/>
                           </a:solidFill>
                           <a:latin typeface="Lucida Console" panose="020B0609040504020204" pitchFamily="49" charset="0"/>
                         </a:rPr>
@@ -12455,7 +13209,7 @@
                       </a:r>
                       <a:endParaRPr lang="en-US" sz="1400" b="0" dirty="0">
                         <a:solidFill>
-                          <a:srgbClr val="404040"/>
+                          <a:srgbClr val="545454"/>
                         </a:solidFill>
                         <a:latin typeface="Lucida Console" panose="020B0609040504020204" pitchFamily="49" charset="0"/>
                       </a:endParaRPr>
@@ -12512,7 +13266,7 @@
                       <a:r>
                         <a:rPr lang="en-US" sz="1400" b="0" dirty="0" err="1">
                           <a:solidFill>
-                            <a:srgbClr val="404040"/>
+                            <a:srgbClr val="545454"/>
                           </a:solidFill>
                           <a:latin typeface="Lucida Console" panose="020B0609040504020204" pitchFamily="49" charset="0"/>
                         </a:rPr>
@@ -12520,7 +13274,7 @@
                       </a:r>
                       <a:endParaRPr lang="en-US" sz="1400" b="0" dirty="0">
                         <a:solidFill>
-                          <a:srgbClr val="404040"/>
+                          <a:srgbClr val="545454"/>
                         </a:solidFill>
                         <a:latin typeface="Lucida Console" panose="020B0609040504020204" pitchFamily="49" charset="0"/>
                       </a:endParaRPr>
@@ -12577,7 +13331,7 @@
                       <a:r>
                         <a:rPr lang="en-US" sz="1400" b="0" dirty="0" err="1">
                           <a:solidFill>
-                            <a:srgbClr val="404040"/>
+                            <a:srgbClr val="545454"/>
                           </a:solidFill>
                           <a:latin typeface="Lucida Console" panose="020B0609040504020204" pitchFamily="49" charset="0"/>
                         </a:rPr>
@@ -12585,7 +13339,7 @@
                       </a:r>
                       <a:endParaRPr lang="en-US" sz="1400" b="0" dirty="0">
                         <a:solidFill>
-                          <a:srgbClr val="404040"/>
+                          <a:srgbClr val="545454"/>
                         </a:solidFill>
                         <a:latin typeface="Lucida Console" panose="020B0609040504020204" pitchFamily="49" charset="0"/>
                       </a:endParaRPr>
@@ -12642,7 +13396,7 @@
                       <a:r>
                         <a:rPr lang="en-US" sz="1400" b="0" dirty="0" err="1">
                           <a:solidFill>
-                            <a:srgbClr val="404040"/>
+                            <a:srgbClr val="545454"/>
                           </a:solidFill>
                           <a:latin typeface="Lucida Console" panose="020B0609040504020204" pitchFamily="49" charset="0"/>
                         </a:rPr>
@@ -12650,7 +13404,7 @@
                       </a:r>
                       <a:endParaRPr lang="en-US" sz="1400" b="0" dirty="0">
                         <a:solidFill>
-                          <a:srgbClr val="404040"/>
+                          <a:srgbClr val="545454"/>
                         </a:solidFill>
                         <a:latin typeface="Lucida Console" panose="020B0609040504020204" pitchFamily="49" charset="0"/>
                       </a:endParaRPr>
@@ -13679,7 +14433,7 @@
         <p:spPr>
           <a:xfrm>
             <a:off x="475903" y="1288829"/>
-            <a:ext cx="4256518" cy="5016758"/>
+            <a:ext cx="4256518" cy="5509200"/>
           </a:xfrm>
           <a:prstGeom prst="rect">
             <a:avLst/>
@@ -13909,6 +14663,39 @@
             <a:r>
               <a:rPr lang="en-US" sz="1600" dirty="0"/>
               <a:t> (clear difference by category)</a:t>
+            </a:r>
+          </a:p>
+          <a:p>
+            <a:pPr marL="742950" lvl="1" indent="-285750">
+              <a:buSzPct val="80000"/>
+              <a:buFont typeface="Courier New" panose="02070309020205020404" pitchFamily="49" charset="0"/>
+              <a:buChar char="o"/>
+            </a:pPr>
+            <a:r>
+              <a:rPr lang="en-US" sz="1600" dirty="0">
+                <a:solidFill>
+                  <a:srgbClr val="545454"/>
+                </a:solidFill>
+                <a:latin typeface="Lucida Console" panose="020B0609040504020204" pitchFamily="49" charset="0"/>
+              </a:rPr>
+              <a:t>happiness</a:t>
+            </a:r>
+            <a:r>
+              <a:rPr lang="en-US" sz="1600" dirty="0"/>
+              <a:t> and </a:t>
+            </a:r>
+            <a:r>
+              <a:rPr lang="en-US" sz="1600" dirty="0" err="1">
+                <a:solidFill>
+                  <a:srgbClr val="545454"/>
+                </a:solidFill>
+                <a:latin typeface="Lucida Console" panose="020B0609040504020204" pitchFamily="49" charset="0"/>
+              </a:rPr>
+              <a:t>HDI_cat</a:t>
+            </a:r>
+            <a:r>
+              <a:rPr lang="en-US" sz="1600" dirty="0"/>
+              <a:t> (similar in Medium and High categories)</a:t>
             </a:r>
           </a:p>
         </p:txBody>
@@ -14074,6 +14861,58 @@
           <a:xfrm>
             <a:off x="9527447" y="1983240"/>
             <a:ext cx="713631" cy="562231"/>
+          </a:xfrm>
+          <a:prstGeom prst="rect">
+            <a:avLst/>
+          </a:prstGeom>
+          <a:noFill/>
+          <a:ln w="19050">
+            <a:solidFill>
+              <a:schemeClr val="accent2"/>
+            </a:solidFill>
+          </a:ln>
+        </p:spPr>
+        <p:style>
+          <a:lnRef idx="2">
+            <a:schemeClr val="accent1">
+              <a:shade val="50000"/>
+            </a:schemeClr>
+          </a:lnRef>
+          <a:fillRef idx="1">
+            <a:schemeClr val="accent1"/>
+          </a:fillRef>
+          <a:effectRef idx="0">
+            <a:schemeClr val="accent1"/>
+          </a:effectRef>
+          <a:fontRef idx="minor">
+            <a:schemeClr val="lt1"/>
+          </a:fontRef>
+        </p:style>
+        <p:txBody>
+          <a:bodyPr rtlCol="0" anchor="ctr"/>
+          <a:lstStyle/>
+          <a:p>
+            <a:pPr algn="ctr"/>
+            <a:endParaRPr lang="en-US"/>
+          </a:p>
+        </p:txBody>
+      </p:sp>
+      <p:sp>
+        <p:nvSpPr>
+          <p:cNvPr id="10" name="Rectangle 9">
+            <a:extLst>
+              <a:ext uri="{FF2B5EF4-FFF2-40B4-BE49-F238E27FC236}">
+                <a16:creationId xmlns:a16="http://schemas.microsoft.com/office/drawing/2014/main" id="{B8A2FF4E-F42F-4856-B628-4E8095A6DB9F}"/>
+              </a:ext>
+            </a:extLst>
+          </p:cNvPr>
+          <p:cNvSpPr/>
+          <p:nvPr/>
+        </p:nvSpPr>
+        <p:spPr>
+          <a:xfrm>
+            <a:off x="8023860" y="1983240"/>
+            <a:ext cx="784994" cy="562231"/>
           </a:xfrm>
           <a:prstGeom prst="rect">
             <a:avLst/>

</xml_diff>

<commit_message>
Minor edits to slide deck
</commit_message>
<xml_diff>
--- a/Prioli_Final_Proj.pptx
+++ b/Prioli_Final_Proj.pptx
@@ -32,8 +32,8 @@
     <p:sldId id="264" r:id="rId23"/>
     <p:sldId id="280" r:id="rId24"/>
     <p:sldId id="281" r:id="rId25"/>
-    <p:sldId id="261" r:id="rId26"/>
-    <p:sldId id="262" r:id="rId27"/>
+    <p:sldId id="262" r:id="rId26"/>
+    <p:sldId id="261" r:id="rId27"/>
   </p:sldIdLst>
   <p:sldSz cx="12192000" cy="6858000"/>
   <p:notesSz cx="6858000" cy="9144000"/>
@@ -233,7 +233,7 @@
           <a:p>
             <a:fld id="{4EE169DE-67F4-4753-9B1C-F1A309C78068}" type="datetimeFigureOut">
               <a:rPr lang="en-US" smtClean="0"/>
-              <a:t>12/15/2018</a:t>
+              <a:t>12/16/2018</a:t>
             </a:fld>
             <a:endParaRPr lang="en-US"/>
           </a:p>
@@ -700,7 +700,7 @@
           <a:p>
             <a:fld id="{CF647BC4-379F-449B-8ACB-1D0356C51E22}" type="datetimeFigureOut">
               <a:rPr lang="en-US" smtClean="0"/>
-              <a:t>12/15/2018</a:t>
+              <a:t>12/16/2018</a:t>
             </a:fld>
             <a:endParaRPr lang="en-US"/>
           </a:p>
@@ -890,7 +890,7 @@
           <a:p>
             <a:fld id="{CF647BC4-379F-449B-8ACB-1D0356C51E22}" type="datetimeFigureOut">
               <a:rPr lang="en-US" smtClean="0"/>
-              <a:t>12/15/2018</a:t>
+              <a:t>12/16/2018</a:t>
             </a:fld>
             <a:endParaRPr lang="en-US"/>
           </a:p>
@@ -1070,7 +1070,7 @@
           <a:p>
             <a:fld id="{CF647BC4-379F-449B-8ACB-1D0356C51E22}" type="datetimeFigureOut">
               <a:rPr lang="en-US" smtClean="0"/>
-              <a:t>12/15/2018</a:t>
+              <a:t>12/16/2018</a:t>
             </a:fld>
             <a:endParaRPr lang="en-US"/>
           </a:p>
@@ -1261,7 +1261,7 @@
           <a:p>
             <a:fld id="{CF647BC4-379F-449B-8ACB-1D0356C51E22}" type="datetimeFigureOut">
               <a:rPr lang="en-US" smtClean="0"/>
-              <a:t>12/15/2018</a:t>
+              <a:t>12/16/2018</a:t>
             </a:fld>
             <a:endParaRPr lang="en-US"/>
           </a:p>
@@ -1517,7 +1517,7 @@
           <a:p>
             <a:fld id="{CF647BC4-379F-449B-8ACB-1D0356C51E22}" type="datetimeFigureOut">
               <a:rPr lang="en-US" smtClean="0"/>
-              <a:t>12/15/2018</a:t>
+              <a:t>12/16/2018</a:t>
             </a:fld>
             <a:endParaRPr lang="en-US"/>
           </a:p>
@@ -1805,7 +1805,7 @@
           <a:p>
             <a:fld id="{CF647BC4-379F-449B-8ACB-1D0356C51E22}" type="datetimeFigureOut">
               <a:rPr lang="en-US" smtClean="0"/>
-              <a:t>12/15/2018</a:t>
+              <a:t>12/16/2018</a:t>
             </a:fld>
             <a:endParaRPr lang="en-US"/>
           </a:p>
@@ -2243,7 +2243,7 @@
           <a:p>
             <a:fld id="{CF647BC4-379F-449B-8ACB-1D0356C51E22}" type="datetimeFigureOut">
               <a:rPr lang="en-US" smtClean="0"/>
-              <a:t>12/15/2018</a:t>
+              <a:t>12/16/2018</a:t>
             </a:fld>
             <a:endParaRPr lang="en-US"/>
           </a:p>
@@ -2361,7 +2361,7 @@
           <a:p>
             <a:fld id="{CF647BC4-379F-449B-8ACB-1D0356C51E22}" type="datetimeFigureOut">
               <a:rPr lang="en-US" smtClean="0"/>
-              <a:t>12/15/2018</a:t>
+              <a:t>12/16/2018</a:t>
             </a:fld>
             <a:endParaRPr lang="en-US"/>
           </a:p>
@@ -2456,7 +2456,7 @@
           <a:p>
             <a:fld id="{CF647BC4-379F-449B-8ACB-1D0356C51E22}" type="datetimeFigureOut">
               <a:rPr lang="en-US" smtClean="0"/>
-              <a:t>12/15/2018</a:t>
+              <a:t>12/16/2018</a:t>
             </a:fld>
             <a:endParaRPr lang="en-US"/>
           </a:p>
@@ -2812,7 +2812,7 @@
           <a:p>
             <a:fld id="{CF647BC4-379F-449B-8ACB-1D0356C51E22}" type="datetimeFigureOut">
               <a:rPr lang="en-US" smtClean="0"/>
-              <a:t>12/15/2018</a:t>
+              <a:t>12/16/2018</a:t>
             </a:fld>
             <a:endParaRPr lang="en-US"/>
           </a:p>
@@ -3128,7 +3128,7 @@
           <a:p>
             <a:fld id="{CF647BC4-379F-449B-8ACB-1D0356C51E22}" type="datetimeFigureOut">
               <a:rPr lang="en-US" smtClean="0"/>
-              <a:t>12/15/2018</a:t>
+              <a:t>12/16/2018</a:t>
             </a:fld>
             <a:endParaRPr lang="en-US"/>
           </a:p>
@@ -3360,7 +3360,7 @@
             <a:fld id="{CF647BC4-379F-449B-8ACB-1D0356C51E22}" type="datetimeFigureOut">
               <a:rPr lang="en-US" smtClean="0"/>
               <a:pPr/>
-              <a:t>12/15/2018</a:t>
+              <a:t>12/16/2018</a:t>
             </a:fld>
             <a:endParaRPr lang="en-US"/>
           </a:p>
@@ -9905,7 +9905,7 @@
             </a:r>
             <a:r>
               <a:rPr lang="en-US" dirty="0"/>
-              <a:t> scale across Medium and High levels of </a:t>
+              <a:t> score across Medium and High levels of </a:t>
             </a:r>
             <a:r>
               <a:rPr lang="en-US" sz="2600" dirty="0" err="1">
@@ -9926,7 +9926,7 @@
             </a:pPr>
             <a:r>
               <a:rPr lang="en-US" dirty="0"/>
-              <a:t>Requires checking assumption that locations do not differ (nonparametric: two-sample Wilcoxon Rank-Sum Test, nonparametric:  two-sample </a:t>
+              <a:t>Requires checking assumption that locations do not differ (nonparametric: two-sample Wilcoxon Rank-Sum Test, parametric:  two-sample </a:t>
             </a:r>
             <a:r>
               <a:rPr lang="en-US" i="1" dirty="0"/>
@@ -10397,6 +10397,13 @@
             <a:r>
               <a:rPr lang="en-US" dirty="0"/>
               <a:t>With increasing globalization, it’s important to understand how the United States compares to other countries on key Quality of Life (QoL) measures</a:t>
+            </a:r>
+          </a:p>
+          <a:p>
+            <a:pPr lvl="1"/>
+            <a:r>
+              <a:rPr lang="en-US" dirty="0"/>
+              <a:t>This is the aim of my MAT 8790 project</a:t>
             </a:r>
           </a:p>
           <a:p>
@@ -11981,280 +11988,6 @@
           <p:cNvPr id="2" name="Title 1">
             <a:extLst>
               <a:ext uri="{FF2B5EF4-FFF2-40B4-BE49-F238E27FC236}">
-                <a16:creationId xmlns:a16="http://schemas.microsoft.com/office/drawing/2014/main" id="{6DC7B1ED-694E-40A6-8BFD-E0658AE4A81F}"/>
-              </a:ext>
-            </a:extLst>
-          </p:cNvPr>
-          <p:cNvSpPr>
-            <a:spLocks noGrp="1"/>
-          </p:cNvSpPr>
-          <p:nvPr>
-            <p:ph type="title"/>
-          </p:nvPr>
-        </p:nvSpPr>
-        <p:spPr/>
-        <p:txBody>
-          <a:bodyPr/>
-          <a:lstStyle/>
-          <a:p>
-            <a:r>
-              <a:rPr lang="en-US" dirty="0"/>
-              <a:t>REFERENCES</a:t>
-            </a:r>
-          </a:p>
-        </p:txBody>
-      </p:sp>
-      <p:sp>
-        <p:nvSpPr>
-          <p:cNvPr id="3" name="Content Placeholder 2">
-            <a:extLst>
-              <a:ext uri="{FF2B5EF4-FFF2-40B4-BE49-F238E27FC236}">
-                <a16:creationId xmlns:a16="http://schemas.microsoft.com/office/drawing/2014/main" id="{DEFE95A9-4EBA-4FD5-900B-D5815B5F15E8}"/>
-              </a:ext>
-            </a:extLst>
-          </p:cNvPr>
-          <p:cNvSpPr>
-            <a:spLocks noGrp="1"/>
-          </p:cNvSpPr>
-          <p:nvPr>
-            <p:ph idx="1"/>
-          </p:nvPr>
-        </p:nvSpPr>
-        <p:spPr/>
-        <p:txBody>
-          <a:bodyPr>
-            <a:normAutofit/>
-          </a:bodyPr>
-          <a:lstStyle/>
-          <a:p>
-            <a:pPr marL="347663" indent="-347663">
-              <a:lnSpc>
-                <a:spcPct val="100000"/>
-              </a:lnSpc>
-              <a:spcBef>
-                <a:spcPts val="0"/>
-              </a:spcBef>
-              <a:buFont typeface="+mj-lt"/>
-              <a:buAutoNum type="arabicPeriod"/>
-            </a:pPr>
-            <a:r>
-              <a:rPr lang="en-US" sz="1600" dirty="0"/>
-              <a:t>Helliwell, John F., Richard Layard, and Jeffrey D. Sachs. 2018. “World Happiness Report.” http://worldhappiness.report/ed/2018/.</a:t>
-            </a:r>
-          </a:p>
-          <a:p>
-            <a:pPr marL="347663" indent="-347663">
-              <a:lnSpc>
-                <a:spcPct val="100000"/>
-              </a:lnSpc>
-              <a:spcBef>
-                <a:spcPts val="0"/>
-              </a:spcBef>
-              <a:buFont typeface="+mj-lt"/>
-              <a:buAutoNum type="arabicPeriod"/>
-            </a:pPr>
-            <a:r>
-              <a:rPr lang="en-US" sz="1600" dirty="0"/>
-              <a:t>James, Gareth, Daniela Witten, Trevor Hastie, and Robert </a:t>
-            </a:r>
-            <a:r>
-              <a:rPr lang="en-US" sz="1600" dirty="0" err="1"/>
-              <a:t>Tibshirani</a:t>
-            </a:r>
-            <a:r>
-              <a:rPr lang="en-US" sz="1600" dirty="0"/>
-              <a:t>. 2013. “An Introduction to Statistical Learning.” Springer. https://www-bcf.usc.edu/~gareth/ISL/.</a:t>
-            </a:r>
-          </a:p>
-          <a:p>
-            <a:pPr marL="347663" indent="-347663">
-              <a:lnSpc>
-                <a:spcPct val="100000"/>
-              </a:lnSpc>
-              <a:spcBef>
-                <a:spcPts val="0"/>
-              </a:spcBef>
-              <a:buFont typeface="+mj-lt"/>
-              <a:buAutoNum type="arabicPeriod"/>
-            </a:pPr>
-            <a:r>
-              <a:rPr lang="en-US" sz="1600" dirty="0"/>
-              <a:t>Murphy, Sherry L., </a:t>
-            </a:r>
-            <a:r>
-              <a:rPr lang="en-US" sz="1600" dirty="0" err="1"/>
-              <a:t>Jiaquan</a:t>
-            </a:r>
-            <a:r>
-              <a:rPr lang="en-US" sz="1600" dirty="0"/>
-              <a:t> Xu, Kenneth D. </a:t>
-            </a:r>
-            <a:r>
-              <a:rPr lang="en-US" sz="1600" dirty="0" err="1"/>
-              <a:t>Kochanek</a:t>
-            </a:r>
-            <a:r>
-              <a:rPr lang="en-US" sz="1600" dirty="0"/>
-              <a:t>, and Elizabeth Arias. 2018. “Mortality in the United States, 2017. NCHS Data Brief, No 328.” National Center for Health Statistics. https://www.cdc.gov/nchs/products/databriefs/db328.htm.</a:t>
-            </a:r>
-          </a:p>
-          <a:p>
-            <a:pPr marL="347663" indent="-347663">
-              <a:lnSpc>
-                <a:spcPct val="100000"/>
-              </a:lnSpc>
-              <a:spcBef>
-                <a:spcPts val="0"/>
-              </a:spcBef>
-              <a:buFont typeface="+mj-lt"/>
-              <a:buAutoNum type="arabicPeriod"/>
-            </a:pPr>
-            <a:r>
-              <a:rPr lang="en-US" sz="1600" dirty="0"/>
-              <a:t>Prioli, Katherine M. 2018. “MAT_8790_Final_Project.” https://github.com/kmprioliPROF/MAT_8790_Final_Project.</a:t>
-            </a:r>
-          </a:p>
-          <a:p>
-            <a:pPr marL="347663" indent="-347663">
-              <a:lnSpc>
-                <a:spcPct val="100000"/>
-              </a:lnSpc>
-              <a:spcBef>
-                <a:spcPts val="0"/>
-              </a:spcBef>
-              <a:buFont typeface="+mj-lt"/>
-              <a:buAutoNum type="arabicPeriod"/>
-            </a:pPr>
-            <a:r>
-              <a:rPr lang="en-US" sz="1600" dirty="0"/>
-              <a:t>Social Progress Imperative. 2018. “Social Progress Index.” https://www.socialprogress.org/?tab=4.</a:t>
-            </a:r>
-          </a:p>
-          <a:p>
-            <a:pPr marL="347663" indent="-347663">
-              <a:lnSpc>
-                <a:spcPct val="100000"/>
-              </a:lnSpc>
-              <a:spcBef>
-                <a:spcPts val="0"/>
-              </a:spcBef>
-              <a:buFont typeface="+mj-lt"/>
-              <a:buAutoNum type="arabicPeriod"/>
-            </a:pPr>
-            <a:r>
-              <a:rPr lang="en-US" sz="1600" dirty="0"/>
-              <a:t>The United Nations Development </a:t>
-            </a:r>
-            <a:r>
-              <a:rPr lang="en-US" sz="1600" dirty="0" err="1"/>
-              <a:t>Programme</a:t>
-            </a:r>
-            <a:r>
-              <a:rPr lang="en-US" sz="1600" dirty="0"/>
-              <a:t>. 2018. “Human Development Index.” http://hdr.undp.org/en/data.</a:t>
-            </a:r>
-          </a:p>
-          <a:p>
-            <a:pPr marL="347663" indent="-347663">
-              <a:lnSpc>
-                <a:spcPct val="100000"/>
-              </a:lnSpc>
-              <a:spcBef>
-                <a:spcPts val="0"/>
-              </a:spcBef>
-              <a:buFont typeface="+mj-lt"/>
-              <a:buAutoNum type="arabicPeriod"/>
-            </a:pPr>
-            <a:r>
-              <a:rPr lang="en-US" sz="1600" dirty="0"/>
-              <a:t>The World Bank. 2018. “Gross Domestic Product.” https://data.worldbank.org/indicator/ny.gdp.mktp.cd?view=map&amp;year_high_desc=true.</a:t>
-            </a:r>
-          </a:p>
-          <a:p>
-            <a:pPr marL="347663" indent="-347663">
-              <a:lnSpc>
-                <a:spcPct val="100000"/>
-              </a:lnSpc>
-              <a:spcBef>
-                <a:spcPts val="0"/>
-              </a:spcBef>
-              <a:buFont typeface="+mj-lt"/>
-              <a:buAutoNum type="arabicPeriod"/>
-            </a:pPr>
-            <a:r>
-              <a:rPr lang="en-US" sz="1600" dirty="0"/>
-              <a:t>World Economic Forum. 2016. “Gender Equality.” http://reports.weforum.org/global-gender-gap-report-2016/rankings/.</a:t>
-            </a:r>
-          </a:p>
-          <a:p>
-            <a:pPr marL="347663" indent="-347663">
-              <a:lnSpc>
-                <a:spcPct val="100000"/>
-              </a:lnSpc>
-              <a:spcBef>
-                <a:spcPts val="0"/>
-              </a:spcBef>
-              <a:buFont typeface="+mj-lt"/>
-              <a:buAutoNum type="arabicPeriod"/>
-            </a:pPr>
-            <a:r>
-              <a:rPr lang="en-US" sz="1600" dirty="0"/>
-              <a:t>World Health Organization. 2018a. “Life Expectancy.” http://apps.who.int/gho/data/view.main.SDG2016LEXv?lang=en.</a:t>
-            </a:r>
-          </a:p>
-          <a:p>
-            <a:pPr marL="347663" indent="-347663">
-              <a:lnSpc>
-                <a:spcPct val="100000"/>
-              </a:lnSpc>
-              <a:spcBef>
-                <a:spcPts val="0"/>
-              </a:spcBef>
-              <a:buFont typeface="+mj-lt"/>
-              <a:buAutoNum type="arabicPeriod"/>
-            </a:pPr>
-            <a:r>
-              <a:rPr lang="en-US" sz="1600" dirty="0"/>
-              <a:t>World Health Organization. 2018b. “Probability of Dying Per 1000 Live Births.” http://apps.who.int/gho/data/view.main.182?lang=en.</a:t>
-            </a:r>
-          </a:p>
-        </p:txBody>
-      </p:sp>
-    </p:spTree>
-    <p:extLst>
-      <p:ext uri="{BB962C8B-B14F-4D97-AF65-F5344CB8AC3E}">
-        <p14:creationId xmlns:p14="http://schemas.microsoft.com/office/powerpoint/2010/main" val="4229999681"/>
-      </p:ext>
-    </p:extLst>
-  </p:cSld>
-  <p:clrMapOvr>
-    <a:masterClrMapping/>
-  </p:clrMapOvr>
-</p:sld>
-</file>
-
-<file path=ppt/slides/slide26.xml><?xml version="1.0" encoding="utf-8"?>
-<p:sld xmlns:a="http://schemas.openxmlformats.org/drawingml/2006/main" xmlns:r="http://schemas.openxmlformats.org/officeDocument/2006/relationships" xmlns:p="http://schemas.openxmlformats.org/presentationml/2006/main">
-  <p:cSld>
-    <p:spTree>
-      <p:nvGrpSpPr>
-        <p:cNvPr id="1" name=""/>
-        <p:cNvGrpSpPr/>
-        <p:nvPr/>
-      </p:nvGrpSpPr>
-      <p:grpSpPr>
-        <a:xfrm>
-          <a:off x="0" y="0"/>
-          <a:ext cx="0" cy="0"/>
-          <a:chOff x="0" y="0"/>
-          <a:chExt cx="0" cy="0"/>
-        </a:xfrm>
-      </p:grpSpPr>
-      <p:sp>
-        <p:nvSpPr>
-          <p:cNvPr id="2" name="Title 1">
-            <a:extLst>
-              <a:ext uri="{FF2B5EF4-FFF2-40B4-BE49-F238E27FC236}">
                 <a16:creationId xmlns:a16="http://schemas.microsoft.com/office/drawing/2014/main" id="{0879B350-2EF4-446D-81EA-088D5EA1B2AF}"/>
               </a:ext>
             </a:extLst>
@@ -12372,6 +12105,280 @@
     <p:extLst>
       <p:ext uri="{BB962C8B-B14F-4D97-AF65-F5344CB8AC3E}">
         <p14:creationId xmlns:p14="http://schemas.microsoft.com/office/powerpoint/2010/main" val="3235795678"/>
+      </p:ext>
+    </p:extLst>
+  </p:cSld>
+  <p:clrMapOvr>
+    <a:masterClrMapping/>
+  </p:clrMapOvr>
+</p:sld>
+</file>
+
+<file path=ppt/slides/slide26.xml><?xml version="1.0" encoding="utf-8"?>
+<p:sld xmlns:a="http://schemas.openxmlformats.org/drawingml/2006/main" xmlns:r="http://schemas.openxmlformats.org/officeDocument/2006/relationships" xmlns:p="http://schemas.openxmlformats.org/presentationml/2006/main">
+  <p:cSld>
+    <p:spTree>
+      <p:nvGrpSpPr>
+        <p:cNvPr id="1" name=""/>
+        <p:cNvGrpSpPr/>
+        <p:nvPr/>
+      </p:nvGrpSpPr>
+      <p:grpSpPr>
+        <a:xfrm>
+          <a:off x="0" y="0"/>
+          <a:ext cx="0" cy="0"/>
+          <a:chOff x="0" y="0"/>
+          <a:chExt cx="0" cy="0"/>
+        </a:xfrm>
+      </p:grpSpPr>
+      <p:sp>
+        <p:nvSpPr>
+          <p:cNvPr id="2" name="Title 1">
+            <a:extLst>
+              <a:ext uri="{FF2B5EF4-FFF2-40B4-BE49-F238E27FC236}">
+                <a16:creationId xmlns:a16="http://schemas.microsoft.com/office/drawing/2014/main" id="{6DC7B1ED-694E-40A6-8BFD-E0658AE4A81F}"/>
+              </a:ext>
+            </a:extLst>
+          </p:cNvPr>
+          <p:cNvSpPr>
+            <a:spLocks noGrp="1"/>
+          </p:cNvSpPr>
+          <p:nvPr>
+            <p:ph type="title"/>
+          </p:nvPr>
+        </p:nvSpPr>
+        <p:spPr/>
+        <p:txBody>
+          <a:bodyPr/>
+          <a:lstStyle/>
+          <a:p>
+            <a:r>
+              <a:rPr lang="en-US" dirty="0"/>
+              <a:t>REFERENCES</a:t>
+            </a:r>
+          </a:p>
+        </p:txBody>
+      </p:sp>
+      <p:sp>
+        <p:nvSpPr>
+          <p:cNvPr id="3" name="Content Placeholder 2">
+            <a:extLst>
+              <a:ext uri="{FF2B5EF4-FFF2-40B4-BE49-F238E27FC236}">
+                <a16:creationId xmlns:a16="http://schemas.microsoft.com/office/drawing/2014/main" id="{DEFE95A9-4EBA-4FD5-900B-D5815B5F15E8}"/>
+              </a:ext>
+            </a:extLst>
+          </p:cNvPr>
+          <p:cNvSpPr>
+            <a:spLocks noGrp="1"/>
+          </p:cNvSpPr>
+          <p:nvPr>
+            <p:ph idx="1"/>
+          </p:nvPr>
+        </p:nvSpPr>
+        <p:spPr/>
+        <p:txBody>
+          <a:bodyPr>
+            <a:normAutofit/>
+          </a:bodyPr>
+          <a:lstStyle/>
+          <a:p>
+            <a:pPr marL="347663" indent="-347663">
+              <a:lnSpc>
+                <a:spcPct val="100000"/>
+              </a:lnSpc>
+              <a:spcBef>
+                <a:spcPts val="0"/>
+              </a:spcBef>
+              <a:buFont typeface="+mj-lt"/>
+              <a:buAutoNum type="arabicPeriod"/>
+            </a:pPr>
+            <a:r>
+              <a:rPr lang="en-US" sz="1600" dirty="0"/>
+              <a:t>Helliwell, John F., Richard Layard, and Jeffrey D. Sachs. 2018. “World Happiness Report.” http://worldhappiness.report/ed/2018/.</a:t>
+            </a:r>
+          </a:p>
+          <a:p>
+            <a:pPr marL="347663" indent="-347663">
+              <a:lnSpc>
+                <a:spcPct val="100000"/>
+              </a:lnSpc>
+              <a:spcBef>
+                <a:spcPts val="0"/>
+              </a:spcBef>
+              <a:buFont typeface="+mj-lt"/>
+              <a:buAutoNum type="arabicPeriod"/>
+            </a:pPr>
+            <a:r>
+              <a:rPr lang="en-US" sz="1600" dirty="0"/>
+              <a:t>James, Gareth, Daniela Witten, Trevor Hastie, and Robert </a:t>
+            </a:r>
+            <a:r>
+              <a:rPr lang="en-US" sz="1600" dirty="0" err="1"/>
+              <a:t>Tibshirani</a:t>
+            </a:r>
+            <a:r>
+              <a:rPr lang="en-US" sz="1600" dirty="0"/>
+              <a:t>. 2013. “An Introduction to Statistical Learning.” Springer. https://www-bcf.usc.edu/~gareth/ISL/.</a:t>
+            </a:r>
+          </a:p>
+          <a:p>
+            <a:pPr marL="347663" indent="-347663">
+              <a:lnSpc>
+                <a:spcPct val="100000"/>
+              </a:lnSpc>
+              <a:spcBef>
+                <a:spcPts val="0"/>
+              </a:spcBef>
+              <a:buFont typeface="+mj-lt"/>
+              <a:buAutoNum type="arabicPeriod"/>
+            </a:pPr>
+            <a:r>
+              <a:rPr lang="en-US" sz="1600" dirty="0"/>
+              <a:t>Murphy, Sherry L., </a:t>
+            </a:r>
+            <a:r>
+              <a:rPr lang="en-US" sz="1600" dirty="0" err="1"/>
+              <a:t>Jiaquan</a:t>
+            </a:r>
+            <a:r>
+              <a:rPr lang="en-US" sz="1600" dirty="0"/>
+              <a:t> Xu, Kenneth D. </a:t>
+            </a:r>
+            <a:r>
+              <a:rPr lang="en-US" sz="1600" dirty="0" err="1"/>
+              <a:t>Kochanek</a:t>
+            </a:r>
+            <a:r>
+              <a:rPr lang="en-US" sz="1600" dirty="0"/>
+              <a:t>, and Elizabeth Arias. 2018. “Mortality in the United States, 2017. NCHS Data Brief, No 328.” National Center for Health Statistics. https://www.cdc.gov/nchs/products/databriefs/db328.htm.</a:t>
+            </a:r>
+          </a:p>
+          <a:p>
+            <a:pPr marL="347663" indent="-347663">
+              <a:lnSpc>
+                <a:spcPct val="100000"/>
+              </a:lnSpc>
+              <a:spcBef>
+                <a:spcPts val="0"/>
+              </a:spcBef>
+              <a:buFont typeface="+mj-lt"/>
+              <a:buAutoNum type="arabicPeriod"/>
+            </a:pPr>
+            <a:r>
+              <a:rPr lang="en-US" sz="1600" dirty="0"/>
+              <a:t>Prioli, Katherine M. 2018. “MAT_8790_Final_Project.” https://github.com/kmprioliPROF/MAT_8790_Final_Project.</a:t>
+            </a:r>
+          </a:p>
+          <a:p>
+            <a:pPr marL="347663" indent="-347663">
+              <a:lnSpc>
+                <a:spcPct val="100000"/>
+              </a:lnSpc>
+              <a:spcBef>
+                <a:spcPts val="0"/>
+              </a:spcBef>
+              <a:buFont typeface="+mj-lt"/>
+              <a:buAutoNum type="arabicPeriod"/>
+            </a:pPr>
+            <a:r>
+              <a:rPr lang="en-US" sz="1600" dirty="0"/>
+              <a:t>Social Progress Imperative. 2018. “Social Progress Index.” https://www.socialprogress.org/?tab=4.</a:t>
+            </a:r>
+          </a:p>
+          <a:p>
+            <a:pPr marL="347663" indent="-347663">
+              <a:lnSpc>
+                <a:spcPct val="100000"/>
+              </a:lnSpc>
+              <a:spcBef>
+                <a:spcPts val="0"/>
+              </a:spcBef>
+              <a:buFont typeface="+mj-lt"/>
+              <a:buAutoNum type="arabicPeriod"/>
+            </a:pPr>
+            <a:r>
+              <a:rPr lang="en-US" sz="1600" dirty="0"/>
+              <a:t>The United Nations Development </a:t>
+            </a:r>
+            <a:r>
+              <a:rPr lang="en-US" sz="1600" dirty="0" err="1"/>
+              <a:t>Programme</a:t>
+            </a:r>
+            <a:r>
+              <a:rPr lang="en-US" sz="1600" dirty="0"/>
+              <a:t>. 2018. “Human Development Index.” http://hdr.undp.org/en/data.</a:t>
+            </a:r>
+          </a:p>
+          <a:p>
+            <a:pPr marL="347663" indent="-347663">
+              <a:lnSpc>
+                <a:spcPct val="100000"/>
+              </a:lnSpc>
+              <a:spcBef>
+                <a:spcPts val="0"/>
+              </a:spcBef>
+              <a:buFont typeface="+mj-lt"/>
+              <a:buAutoNum type="arabicPeriod"/>
+            </a:pPr>
+            <a:r>
+              <a:rPr lang="en-US" sz="1600" dirty="0"/>
+              <a:t>The World Bank. 2018. “Gross Domestic Product.” https://data.worldbank.org/indicator/ny.gdp.mktp.cd?view=map&amp;year_high_desc=true.</a:t>
+            </a:r>
+          </a:p>
+          <a:p>
+            <a:pPr marL="347663" indent="-347663">
+              <a:lnSpc>
+                <a:spcPct val="100000"/>
+              </a:lnSpc>
+              <a:spcBef>
+                <a:spcPts val="0"/>
+              </a:spcBef>
+              <a:buFont typeface="+mj-lt"/>
+              <a:buAutoNum type="arabicPeriod"/>
+            </a:pPr>
+            <a:r>
+              <a:rPr lang="en-US" sz="1600" dirty="0"/>
+              <a:t>World Economic Forum. 2016. “Gender Equality.” http://reports.weforum.org/global-gender-gap-report-2016/rankings/.</a:t>
+            </a:r>
+          </a:p>
+          <a:p>
+            <a:pPr marL="347663" indent="-347663">
+              <a:lnSpc>
+                <a:spcPct val="100000"/>
+              </a:lnSpc>
+              <a:spcBef>
+                <a:spcPts val="0"/>
+              </a:spcBef>
+              <a:buFont typeface="+mj-lt"/>
+              <a:buAutoNum type="arabicPeriod"/>
+            </a:pPr>
+            <a:r>
+              <a:rPr lang="en-US" sz="1600" dirty="0"/>
+              <a:t>World Health Organization. 2018a. “Life Expectancy.” http://apps.who.int/gho/data/view.main.SDG2016LEXv?lang=en.</a:t>
+            </a:r>
+          </a:p>
+          <a:p>
+            <a:pPr marL="347663" indent="-347663">
+              <a:lnSpc>
+                <a:spcPct val="100000"/>
+              </a:lnSpc>
+              <a:spcBef>
+                <a:spcPts val="0"/>
+              </a:spcBef>
+              <a:buFont typeface="+mj-lt"/>
+              <a:buAutoNum type="arabicPeriod"/>
+            </a:pPr>
+            <a:r>
+              <a:rPr lang="en-US" sz="1600" dirty="0"/>
+              <a:t>World Health Organization. 2018b. “Probability of Dying Per 1000 Live Births.” http://apps.who.int/gho/data/view.main.182?lang=en.</a:t>
+            </a:r>
+          </a:p>
+        </p:txBody>
+      </p:sp>
+    </p:spTree>
+    <p:extLst>
+      <p:ext uri="{BB962C8B-B14F-4D97-AF65-F5344CB8AC3E}">
+        <p14:creationId xmlns:p14="http://schemas.microsoft.com/office/powerpoint/2010/main" val="4229999681"/>
       </p:ext>
     </p:extLst>
   </p:cSld>
@@ -13486,7 +13493,7 @@
           <a:p>
             <a:r>
               <a:rPr lang="en-US" sz="1500" dirty="0"/>
-              <a:t>Note:  this dataset was originally created for the MAT 8790 final project.</a:t>
+              <a:t>Note:  this dataset was originally created for the MAT 8790 final project.  Countries with missing data were excluded from the analytic dataset.</a:t>
             </a:r>
           </a:p>
         </p:txBody>

</xml_diff>